<commit_message>
Updates or Autumn 2023: Use Pluto `present()` feature
</commit_message>
<xml_diff>
--- a/slides/MDPs to POMDPs.pptx
+++ b/slides/MDPs to POMDPs.pptx
@@ -5,7 +5,7 @@
     <p:sldMasterId id="2147483660" r:id="rId1"/>
   </p:sldMasterIdLst>
   <p:notesMasterIdLst>
-    <p:notesMasterId r:id="rId25"/>
+    <p:notesMasterId r:id="rId26"/>
   </p:notesMasterIdLst>
   <p:sldIdLst>
     <p:sldId id="375" r:id="rId2"/>
@@ -31,6 +31,7 @@
     <p:sldId id="511" r:id="rId22"/>
     <p:sldId id="512" r:id="rId23"/>
     <p:sldId id="502" r:id="rId24"/>
+    <p:sldId id="513" r:id="rId25"/>
   </p:sldIdLst>
   <p:sldSz cx="12192000" cy="6858000"/>
   <p:notesSz cx="6858000" cy="9144000"/>
@@ -2801,6 +2802,150 @@
     <p:extLst>
       <p:ext uri="{BB962C8B-B14F-4D97-AF65-F5344CB8AC3E}">
         <p14:creationId xmlns:p14="http://schemas.microsoft.com/office/powerpoint/2010/main" val="4028614732"/>
+      </p:ext>
+    </p:extLst>
+  </p:cSld>
+  <p:clrMapOvr>
+    <a:masterClrMapping/>
+  </p:clrMapOvr>
+</p:notes>
+</file>
+
+<file path=ppt/notesSlides/notesSlide24.xml><?xml version="1.0" encoding="utf-8"?>
+<p:notes xmlns:a="http://schemas.openxmlformats.org/drawingml/2006/main" xmlns:r="http://schemas.openxmlformats.org/officeDocument/2006/relationships" xmlns:p="http://schemas.openxmlformats.org/presentationml/2006/main">
+  <p:cSld>
+    <p:spTree>
+      <p:nvGrpSpPr>
+        <p:cNvPr id="1" name=""/>
+        <p:cNvGrpSpPr/>
+        <p:nvPr/>
+      </p:nvGrpSpPr>
+      <p:grpSpPr>
+        <a:xfrm>
+          <a:off x="0" y="0"/>
+          <a:ext cx="0" cy="0"/>
+          <a:chOff x="0" y="0"/>
+          <a:chExt cx="0" cy="0"/>
+        </a:xfrm>
+      </p:grpSpPr>
+      <p:sp>
+        <p:nvSpPr>
+          <p:cNvPr id="2" name="Slide Image Placeholder 1"/>
+          <p:cNvSpPr>
+            <a:spLocks noGrp="1" noRot="1" noChangeAspect="1"/>
+          </p:cNvSpPr>
+          <p:nvPr>
+            <p:ph type="sldImg"/>
+          </p:nvPr>
+        </p:nvSpPr>
+        <p:spPr/>
+      </p:sp>
+      <p:sp>
+        <p:nvSpPr>
+          <p:cNvPr id="3" name="Notes Placeholder 2"/>
+          <p:cNvSpPr>
+            <a:spLocks noGrp="1"/>
+          </p:cNvSpPr>
+          <p:nvPr>
+            <p:ph type="body" idx="1"/>
+          </p:nvPr>
+        </p:nvSpPr>
+        <p:spPr/>
+        <p:txBody>
+          <a:bodyPr/>
+          <a:lstStyle/>
+          <a:p>
+            <a:endParaRPr lang="en-US" dirty="0"/>
+          </a:p>
+        </p:txBody>
+      </p:sp>
+      <p:sp>
+        <p:nvSpPr>
+          <p:cNvPr id="4" name="Slide Number Placeholder 3"/>
+          <p:cNvSpPr>
+            <a:spLocks noGrp="1"/>
+          </p:cNvSpPr>
+          <p:nvPr>
+            <p:ph type="sldNum" sz="quarter" idx="5"/>
+          </p:nvPr>
+        </p:nvSpPr>
+        <p:spPr/>
+        <p:txBody>
+          <a:bodyPr/>
+          <a:lstStyle/>
+          <a:p>
+            <a:pPr marL="0" marR="0" lvl="0" indent="0" algn="r" defTabSz="914400" rtl="0" eaLnBrk="1" fontAlgn="auto" latinLnBrk="0" hangingPunct="1">
+              <a:lnSpc>
+                <a:spcPct val="100000"/>
+              </a:lnSpc>
+              <a:spcBef>
+                <a:spcPts val="0"/>
+              </a:spcBef>
+              <a:spcAft>
+                <a:spcPts val="0"/>
+              </a:spcAft>
+              <a:buClrTx/>
+              <a:buSzTx/>
+              <a:buFontTx/>
+              <a:buNone/>
+              <a:tabLst/>
+              <a:defRPr/>
+            </a:pPr>
+            <a:fld id="{6AADD3DB-480A-4C24-844A-3FE153DA14AD}" type="slidenum">
+              <a:rPr kumimoji="0" lang="en-US" sz="1200" b="0" i="0" u="none" strike="noStrike" kern="1200" cap="none" spc="0" normalizeH="0" baseline="0" noProof="0" smtClean="0">
+                <a:ln>
+                  <a:noFill/>
+                </a:ln>
+                <a:solidFill>
+                  <a:prstClr val="black"/>
+                </a:solidFill>
+                <a:effectLst/>
+                <a:uLnTx/>
+                <a:uFillTx/>
+                <a:latin typeface="Calibri" panose="020F0502020204030204"/>
+                <a:ea typeface="+mn-ea"/>
+                <a:cs typeface="+mn-cs"/>
+              </a:rPr>
+              <a:pPr marL="0" marR="0" lvl="0" indent="0" algn="r" defTabSz="914400" rtl="0" eaLnBrk="1" fontAlgn="auto" latinLnBrk="0" hangingPunct="1">
+                <a:lnSpc>
+                  <a:spcPct val="100000"/>
+                </a:lnSpc>
+                <a:spcBef>
+                  <a:spcPts val="0"/>
+                </a:spcBef>
+                <a:spcAft>
+                  <a:spcPts val="0"/>
+                </a:spcAft>
+                <a:buClrTx/>
+                <a:buSzTx/>
+                <a:buFontTx/>
+                <a:buNone/>
+                <a:tabLst/>
+                <a:defRPr/>
+              </a:pPr>
+              <a:t>24</a:t>
+            </a:fld>
+            <a:endParaRPr kumimoji="0" lang="en-US" sz="1200" b="0" i="0" u="none" strike="noStrike" kern="1200" cap="none" spc="0" normalizeH="0" baseline="0" noProof="0">
+              <a:ln>
+                <a:noFill/>
+              </a:ln>
+              <a:solidFill>
+                <a:prstClr val="black"/>
+              </a:solidFill>
+              <a:effectLst/>
+              <a:uLnTx/>
+              <a:uFillTx/>
+              <a:latin typeface="Calibri" panose="020F0502020204030204"/>
+              <a:ea typeface="+mn-ea"/>
+              <a:cs typeface="+mn-cs"/>
+            </a:endParaRPr>
+          </a:p>
+        </p:txBody>
+      </p:sp>
+    </p:spTree>
+    <p:extLst>
+      <p:ext uri="{BB962C8B-B14F-4D97-AF65-F5344CB8AC3E}">
+        <p14:creationId xmlns:p14="http://schemas.microsoft.com/office/powerpoint/2010/main" val="819298909"/>
       </p:ext>
     </p:extLst>
   </p:cSld>
@@ -7654,7 +7799,7 @@
           </p:cNvPicPr>
           <p:nvPr/>
         </p:nvPicPr>
-        <p:blipFill>
+        <p:blipFill rotWithShape="1">
           <a:blip r:embed="rId5" cstate="print">
             <a:alphaModFix/>
             <a:extLst>
@@ -7663,13 +7808,13 @@
               </a:ext>
             </a:extLst>
           </a:blip>
-          <a:srcRect/>
+          <a:srcRect b="2909"/>
           <a:stretch/>
         </p:blipFill>
         <p:spPr>
           <a:xfrm>
             <a:off x="2487286" y="990600"/>
-            <a:ext cx="6436541" cy="3971260"/>
+            <a:ext cx="6436541" cy="3855720"/>
           </a:xfrm>
           <a:prstGeom prst="rect">
             <a:avLst/>
@@ -20504,6 +20649,231 @@
 </p:sld>
 </file>
 
+<file path=ppt/slides/slide24.xml><?xml version="1.0" encoding="utf-8"?>
+<p:sld xmlns:a="http://schemas.openxmlformats.org/drawingml/2006/main" xmlns:r="http://schemas.openxmlformats.org/officeDocument/2006/relationships" xmlns:p="http://schemas.openxmlformats.org/presentationml/2006/main">
+  <p:cSld>
+    <p:bg>
+      <p:bgPr>
+        <a:solidFill>
+          <a:srgbClr val="000000"/>
+        </a:solidFill>
+        <a:effectLst/>
+      </p:bgPr>
+    </p:bg>
+    <p:spTree>
+      <p:nvGrpSpPr>
+        <p:cNvPr id="1" name=""/>
+        <p:cNvGrpSpPr/>
+        <p:nvPr/>
+      </p:nvGrpSpPr>
+      <p:grpSpPr>
+        <a:xfrm>
+          <a:off x="0" y="0"/>
+          <a:ext cx="0" cy="0"/>
+          <a:chOff x="0" y="0"/>
+          <a:chExt cx="0" cy="0"/>
+        </a:xfrm>
+      </p:grpSpPr>
+      <p:sp>
+        <p:nvSpPr>
+          <p:cNvPr id="3" name="TextBox 2">
+            <a:extLst>
+              <a:ext uri="{FF2B5EF4-FFF2-40B4-BE49-F238E27FC236}">
+                <a16:creationId xmlns:a16="http://schemas.microsoft.com/office/drawing/2014/main" id="{FE4F237B-BAA4-07B9-78F4-A29825A24B73}"/>
+              </a:ext>
+            </a:extLst>
+          </p:cNvPr>
+          <p:cNvSpPr txBox="1"/>
+          <p:nvPr/>
+        </p:nvSpPr>
+        <p:spPr>
+          <a:xfrm>
+            <a:off x="351972" y="228146"/>
+            <a:ext cx="10512877" cy="584775"/>
+          </a:xfrm>
+          <a:prstGeom prst="rect">
+            <a:avLst/>
+          </a:prstGeom>
+          <a:noFill/>
+          <a:effectLst>
+            <a:outerShdw blurRad="50800" dist="38100" dir="2700000" algn="tl" rotWithShape="0">
+              <a:prstClr val="black">
+                <a:alpha val="40000"/>
+              </a:prstClr>
+            </a:outerShdw>
+          </a:effectLst>
+        </p:spPr>
+        <p:txBody>
+          <a:bodyPr wrap="square">
+            <a:spAutoFit/>
+          </a:bodyPr>
+          <a:lstStyle/>
+          <a:p>
+            <a:pPr marL="0" marR="0" lvl="0" indent="0" algn="l" defTabSz="914400" rtl="0" eaLnBrk="1" fontAlgn="auto" latinLnBrk="0" hangingPunct="1">
+              <a:lnSpc>
+                <a:spcPct val="100000"/>
+              </a:lnSpc>
+              <a:spcBef>
+                <a:spcPts val="0"/>
+              </a:spcBef>
+              <a:spcAft>
+                <a:spcPts val="0"/>
+              </a:spcAft>
+              <a:buClrTx/>
+              <a:buSzTx/>
+              <a:buFontTx/>
+              <a:buNone/>
+              <a:tabLst/>
+              <a:defRPr/>
+            </a:pPr>
+            <a:r>
+              <a:rPr kumimoji="0" lang="en-US" sz="3200" b="1" i="0" u="none" strike="noStrike" kern="1200" cap="none" spc="0" normalizeH="0" baseline="0" noProof="0" dirty="0">
+                <a:ln>
+                  <a:noFill/>
+                </a:ln>
+                <a:solidFill>
+                  <a:srgbClr val="FFFFFF"/>
+                </a:solidFill>
+                <a:effectLst/>
+                <a:uLnTx/>
+                <a:uFillTx/>
+                <a:latin typeface="Palatino Linotype" panose="02040502050505030304" pitchFamily="18" charset="0"/>
+                <a:ea typeface="+mn-ea"/>
+                <a:cs typeface="+mn-cs"/>
+              </a:rPr>
+              <a:t>Focus of this lesson: </a:t>
+            </a:r>
+            <a:r>
+              <a:rPr kumimoji="0" lang="en-US" sz="3200" i="0" u="none" strike="noStrike" kern="1200" cap="none" spc="0" normalizeH="0" baseline="0" noProof="0" dirty="0">
+                <a:ln>
+                  <a:noFill/>
+                </a:ln>
+                <a:solidFill>
+                  <a:srgbClr val="FFFFFF"/>
+                </a:solidFill>
+                <a:effectLst/>
+                <a:uLnTx/>
+                <a:uFillTx/>
+                <a:latin typeface="Palatino Linotype" panose="02040502050505030304" pitchFamily="18" charset="0"/>
+                <a:ea typeface="+mn-ea"/>
+                <a:cs typeface="+mn-cs"/>
+              </a:rPr>
+              <a:t>State uncertainty</a:t>
+            </a:r>
+            <a:endParaRPr kumimoji="0" lang="en-US" sz="3200" b="0" i="0" u="none" strike="noStrike" kern="1200" cap="none" spc="0" normalizeH="0" baseline="0" noProof="0" dirty="0">
+              <a:ln>
+                <a:noFill/>
+              </a:ln>
+              <a:solidFill>
+                <a:prstClr val="black"/>
+              </a:solidFill>
+              <a:effectLst/>
+              <a:uLnTx/>
+              <a:uFillTx/>
+              <a:latin typeface="Palatino Linotype" panose="02040502050505030304" pitchFamily="18" charset="0"/>
+              <a:ea typeface="+mn-ea"/>
+              <a:cs typeface="+mn-cs"/>
+            </a:endParaRPr>
+          </a:p>
+        </p:txBody>
+      </p:sp>
+      <p:sp>
+        <p:nvSpPr>
+          <p:cNvPr id="7" name="TextBox 6">
+            <a:extLst>
+              <a:ext uri="{FF2B5EF4-FFF2-40B4-BE49-F238E27FC236}">
+                <a16:creationId xmlns:a16="http://schemas.microsoft.com/office/drawing/2014/main" id="{11BFF263-DE6F-1DC8-865B-E4CED594336A}"/>
+              </a:ext>
+            </a:extLst>
+          </p:cNvPr>
+          <p:cNvSpPr txBox="1"/>
+          <p:nvPr/>
+        </p:nvSpPr>
+        <p:spPr>
+          <a:xfrm>
+            <a:off x="2458233" y="2793428"/>
+            <a:ext cx="7275533" cy="584775"/>
+          </a:xfrm>
+          <a:prstGeom prst="rect">
+            <a:avLst/>
+          </a:prstGeom>
+          <a:noFill/>
+        </p:spPr>
+        <p:txBody>
+          <a:bodyPr wrap="square">
+            <a:spAutoFit/>
+          </a:bodyPr>
+          <a:lstStyle/>
+          <a:p>
+            <a:pPr marL="0" marR="0" lvl="0" indent="0" algn="ctr" defTabSz="914400" rtl="0" eaLnBrk="1" fontAlgn="auto" latinLnBrk="0" hangingPunct="1">
+              <a:lnSpc>
+                <a:spcPct val="100000"/>
+              </a:lnSpc>
+              <a:spcBef>
+                <a:spcPts val="0"/>
+              </a:spcBef>
+              <a:spcAft>
+                <a:spcPts val="0"/>
+              </a:spcAft>
+              <a:buClrTx/>
+              <a:buSzTx/>
+              <a:buFontTx/>
+              <a:buNone/>
+              <a:tabLst/>
+              <a:defRPr/>
+            </a:pPr>
+            <a:r>
+              <a:rPr kumimoji="0" lang="en-GB" sz="3200" b="0" i="0" u="none" strike="noStrike" kern="0" cap="none" spc="0" normalizeH="0" baseline="0" noProof="0" dirty="0">
+                <a:ln>
+                  <a:noFill/>
+                </a:ln>
+                <a:solidFill>
+                  <a:prstClr val="white"/>
+                </a:solidFill>
+                <a:effectLst>
+                  <a:outerShdw blurRad="38100" dist="38100" dir="2700000" algn="tl">
+                    <a:srgbClr val="000000">
+                      <a:alpha val="43137"/>
+                    </a:srgbClr>
+                  </a:outerShdw>
+                </a:effectLst>
+                <a:uLnTx/>
+                <a:uFillTx/>
+                <a:latin typeface="Palatino Linotype"/>
+                <a:ea typeface="+mn-ea"/>
+                <a:cs typeface="+mn-cs"/>
+                <a:sym typeface="Palatino Linotype"/>
+              </a:rPr>
+              <a:t>How do we estimate the belief?</a:t>
+            </a:r>
+          </a:p>
+        </p:txBody>
+      </p:sp>
+    </p:spTree>
+    <p:extLst>
+      <p:ext uri="{BB962C8B-B14F-4D97-AF65-F5344CB8AC3E}">
+        <p14:creationId xmlns:p14="http://schemas.microsoft.com/office/powerpoint/2010/main" val="2051397563"/>
+      </p:ext>
+    </p:extLst>
+  </p:cSld>
+  <p:clrMapOvr>
+    <a:masterClrMapping/>
+  </p:clrMapOvr>
+  <mc:AlternateContent xmlns:mc="http://schemas.openxmlformats.org/markup-compatibility/2006">
+    <mc:Choice xmlns:p14="http://schemas.microsoft.com/office/powerpoint/2010/main" Requires="p14">
+      <p:transition spd="med" p14:dur="700">
+        <p:fade/>
+      </p:transition>
+    </mc:Choice>
+    <mc:Fallback>
+      <p:transition spd="med">
+        <p:fade/>
+      </p:transition>
+    </mc:Fallback>
+  </mc:AlternateContent>
+</p:sld>
+</file>
+
 <file path=ppt/slides/slide3.xml><?xml version="1.0" encoding="utf-8"?>
 <p:sld xmlns:a="http://schemas.openxmlformats.org/drawingml/2006/main" xmlns:r="http://schemas.openxmlformats.org/officeDocument/2006/relationships" xmlns:p="http://schemas.openxmlformats.org/presentationml/2006/main">
   <p:cSld>

</xml_diff>

<commit_message>
Updated obs for PowerPoint
</commit_message>
<xml_diff>
--- a/slides/MDPs to POMDPs.pptx
+++ b/slides/MDPs to POMDPs.pptx
@@ -240,7 +240,7 @@
           <a:p>
             <a:fld id="{C15D5F90-0918-4142-9ABA-85B04AA6C1A0}" type="datetimeFigureOut">
               <a:rPr lang="en-US" smtClean="0"/>
-              <a:t>11/13/2023</a:t>
+              <a:t>11/14/2023</a:t>
             </a:fld>
             <a:endParaRPr lang="en-US"/>
           </a:p>
@@ -4092,7 +4092,7 @@
           <a:p>
             <a:fld id="{846CE7D5-CF57-46EF-B807-FDD0502418D4}" type="datetimeFigureOut">
               <a:rPr lang="en-US" smtClean="0"/>
-              <a:t>11/13/2023</a:t>
+              <a:t>11/14/2023</a:t>
             </a:fld>
             <a:endParaRPr lang="en-US"/>
           </a:p>
@@ -4260,7 +4260,7 @@
           <a:p>
             <a:fld id="{846CE7D5-CF57-46EF-B807-FDD0502418D4}" type="datetimeFigureOut">
               <a:rPr lang="en-US" smtClean="0"/>
-              <a:t>11/13/2023</a:t>
+              <a:t>11/14/2023</a:t>
             </a:fld>
             <a:endParaRPr lang="en-US"/>
           </a:p>
@@ -4438,7 +4438,7 @@
           <a:p>
             <a:fld id="{846CE7D5-CF57-46EF-B807-FDD0502418D4}" type="datetimeFigureOut">
               <a:rPr lang="en-US" smtClean="0"/>
-              <a:t>11/13/2023</a:t>
+              <a:t>11/14/2023</a:t>
             </a:fld>
             <a:endParaRPr lang="en-US"/>
           </a:p>
@@ -4606,7 +4606,7 @@
           <a:p>
             <a:fld id="{846CE7D5-CF57-46EF-B807-FDD0502418D4}" type="datetimeFigureOut">
               <a:rPr lang="en-US" smtClean="0"/>
-              <a:t>11/13/2023</a:t>
+              <a:t>11/14/2023</a:t>
             </a:fld>
             <a:endParaRPr lang="en-US"/>
           </a:p>
@@ -4851,7 +4851,7 @@
           <a:p>
             <a:fld id="{846CE7D5-CF57-46EF-B807-FDD0502418D4}" type="datetimeFigureOut">
               <a:rPr lang="en-US" smtClean="0"/>
-              <a:t>11/13/2023</a:t>
+              <a:t>11/14/2023</a:t>
             </a:fld>
             <a:endParaRPr lang="en-US"/>
           </a:p>
@@ -5080,7 +5080,7 @@
           <a:p>
             <a:fld id="{846CE7D5-CF57-46EF-B807-FDD0502418D4}" type="datetimeFigureOut">
               <a:rPr lang="en-US" smtClean="0"/>
-              <a:t>11/13/2023</a:t>
+              <a:t>11/14/2023</a:t>
             </a:fld>
             <a:endParaRPr lang="en-US"/>
           </a:p>
@@ -5444,7 +5444,7 @@
           <a:p>
             <a:fld id="{846CE7D5-CF57-46EF-B807-FDD0502418D4}" type="datetimeFigureOut">
               <a:rPr lang="en-US" smtClean="0"/>
-              <a:t>11/13/2023</a:t>
+              <a:t>11/14/2023</a:t>
             </a:fld>
             <a:endParaRPr lang="en-US"/>
           </a:p>
@@ -5561,7 +5561,7 @@
           <a:p>
             <a:fld id="{846CE7D5-CF57-46EF-B807-FDD0502418D4}" type="datetimeFigureOut">
               <a:rPr lang="en-US" smtClean="0"/>
-              <a:t>11/13/2023</a:t>
+              <a:t>11/14/2023</a:t>
             </a:fld>
             <a:endParaRPr lang="en-US"/>
           </a:p>
@@ -5656,7 +5656,7 @@
           <a:p>
             <a:fld id="{846CE7D5-CF57-46EF-B807-FDD0502418D4}" type="datetimeFigureOut">
               <a:rPr lang="en-US" smtClean="0"/>
-              <a:t>11/13/2023</a:t>
+              <a:t>11/14/2023</a:t>
             </a:fld>
             <a:endParaRPr lang="en-US"/>
           </a:p>
@@ -5931,7 +5931,7 @@
           <a:p>
             <a:fld id="{846CE7D5-CF57-46EF-B807-FDD0502418D4}" type="datetimeFigureOut">
               <a:rPr lang="en-US" smtClean="0"/>
-              <a:t>11/13/2023</a:t>
+              <a:t>11/14/2023</a:t>
             </a:fld>
             <a:endParaRPr lang="en-US"/>
           </a:p>
@@ -6186,7 +6186,7 @@
           <a:p>
             <a:fld id="{846CE7D5-CF57-46EF-B807-FDD0502418D4}" type="datetimeFigureOut">
               <a:rPr lang="en-US" smtClean="0"/>
-              <a:t>11/13/2023</a:t>
+              <a:t>11/14/2023</a:t>
             </a:fld>
             <a:endParaRPr lang="en-US"/>
           </a:p>
@@ -6397,7 +6397,7 @@
           <a:p>
             <a:fld id="{846CE7D5-CF57-46EF-B807-FDD0502418D4}" type="datetimeFigureOut">
               <a:rPr lang="en-US" smtClean="0"/>
-              <a:t>11/13/2023</a:t>
+              <a:t>11/14/2023</a:t>
             </a:fld>
             <a:endParaRPr lang="en-US"/>
           </a:p>
@@ -6846,92 +6846,6 @@
           </a:prstGeom>
         </p:spPr>
       </p:pic>
-      <p:sp>
-        <p:nvSpPr>
-          <p:cNvPr id="3" name="TextBox 2">
-            <a:extLst>
-              <a:ext uri="{FF2B5EF4-FFF2-40B4-BE49-F238E27FC236}">
-                <a16:creationId xmlns:a16="http://schemas.microsoft.com/office/drawing/2014/main" id="{FE4F237B-BAA4-07B9-78F4-A29825A24B73}"/>
-              </a:ext>
-            </a:extLst>
-          </p:cNvPr>
-          <p:cNvSpPr txBox="1"/>
-          <p:nvPr/>
-        </p:nvSpPr>
-        <p:spPr>
-          <a:xfrm>
-            <a:off x="351972" y="228146"/>
-            <a:ext cx="10512877" cy="584775"/>
-          </a:xfrm>
-          <a:prstGeom prst="rect">
-            <a:avLst/>
-          </a:prstGeom>
-          <a:noFill/>
-          <a:effectLst>
-            <a:outerShdw blurRad="50800" dist="38100" dir="2700000" algn="tl" rotWithShape="0">
-              <a:prstClr val="black">
-                <a:alpha val="40000"/>
-              </a:prstClr>
-            </a:outerShdw>
-          </a:effectLst>
-        </p:spPr>
-        <p:txBody>
-          <a:bodyPr wrap="square">
-            <a:spAutoFit/>
-          </a:bodyPr>
-          <a:lstStyle/>
-          <a:p>
-            <a:pPr marL="0" marR="0" lvl="0" indent="0" algn="l" defTabSz="914400" rtl="0" eaLnBrk="1" fontAlgn="auto" latinLnBrk="0" hangingPunct="1">
-              <a:lnSpc>
-                <a:spcPct val="100000"/>
-              </a:lnSpc>
-              <a:spcBef>
-                <a:spcPts val="0"/>
-              </a:spcBef>
-              <a:spcAft>
-                <a:spcPts val="0"/>
-              </a:spcAft>
-              <a:buClrTx/>
-              <a:buSzTx/>
-              <a:buFontTx/>
-              <a:buNone/>
-              <a:tabLst/>
-              <a:defRPr/>
-            </a:pPr>
-            <a:r>
-              <a:rPr kumimoji="0" lang="en-US" sz="3200" b="1" i="0" u="none" strike="noStrike" kern="1200" cap="none" spc="0" normalizeH="0" baseline="0" noProof="0" dirty="0">
-                <a:ln>
-                  <a:noFill/>
-                </a:ln>
-                <a:solidFill>
-                  <a:srgbClr val="FFFFFF"/>
-                </a:solidFill>
-                <a:effectLst/>
-                <a:uLnTx/>
-                <a:uFillTx/>
-                <a:latin typeface="Palatino Linotype" panose="02040502050505030304" pitchFamily="18" charset="0"/>
-                <a:ea typeface="+mn-ea"/>
-                <a:cs typeface="+mn-cs"/>
-              </a:rPr>
-              <a:t>Markov decision process (MDP)</a:t>
-            </a:r>
-            <a:endParaRPr kumimoji="0" lang="en-US" sz="3200" b="0" i="0" u="none" strike="noStrike" kern="1200" cap="none" spc="0" normalizeH="0" baseline="0" noProof="0" dirty="0">
-              <a:ln>
-                <a:noFill/>
-              </a:ln>
-              <a:solidFill>
-                <a:prstClr val="black"/>
-              </a:solidFill>
-              <a:effectLst/>
-              <a:uLnTx/>
-              <a:uFillTx/>
-              <a:latin typeface="Palatino Linotype" panose="02040502050505030304" pitchFamily="18" charset="0"/>
-              <a:ea typeface="+mn-ea"/>
-              <a:cs typeface="+mn-cs"/>
-            </a:endParaRPr>
-          </a:p>
-        </p:txBody>
-      </p:sp>
       <p:cxnSp>
         <p:nvCxnSpPr>
           <p:cNvPr id="39" name="Straight Connector 38">
@@ -7214,6 +7128,143 @@
           </a:fontRef>
         </p:style>
       </p:cxnSp>
+      <p:sp>
+        <p:nvSpPr>
+          <p:cNvPr id="2" name="TextBox 1">
+            <a:extLst>
+              <a:ext uri="{FF2B5EF4-FFF2-40B4-BE49-F238E27FC236}">
+                <a16:creationId xmlns:a16="http://schemas.microsoft.com/office/drawing/2014/main" id="{5BCDA149-8A6D-EB68-EDD2-E2F6859D2284}"/>
+              </a:ext>
+            </a:extLst>
+          </p:cNvPr>
+          <p:cNvSpPr txBox="1"/>
+          <p:nvPr/>
+        </p:nvSpPr>
+        <p:spPr>
+          <a:xfrm>
+            <a:off x="351972" y="228146"/>
+            <a:ext cx="10512877" cy="584775"/>
+          </a:xfrm>
+          <a:prstGeom prst="rect">
+            <a:avLst/>
+          </a:prstGeom>
+          <a:noFill/>
+          <a:effectLst>
+            <a:outerShdw blurRad="50800" dist="38100" dir="2700000" algn="tl" rotWithShape="0">
+              <a:prstClr val="black">
+                <a:alpha val="40000"/>
+              </a:prstClr>
+            </a:outerShdw>
+          </a:effectLst>
+        </p:spPr>
+        <p:txBody>
+          <a:bodyPr wrap="square">
+            <a:spAutoFit/>
+          </a:bodyPr>
+          <a:lstStyle/>
+          <a:p>
+            <a:pPr marL="0" marR="0" lvl="0" indent="0" algn="l" defTabSz="914400" rtl="0" eaLnBrk="1" fontAlgn="auto" latinLnBrk="0" hangingPunct="1">
+              <a:lnSpc>
+                <a:spcPct val="100000"/>
+              </a:lnSpc>
+              <a:spcBef>
+                <a:spcPts val="0"/>
+              </a:spcBef>
+              <a:spcAft>
+                <a:spcPts val="0"/>
+              </a:spcAft>
+              <a:buClrTx/>
+              <a:buSzTx/>
+              <a:buFontTx/>
+              <a:buNone/>
+              <a:tabLst/>
+              <a:defRPr/>
+            </a:pPr>
+            <a:r>
+              <a:rPr kumimoji="0" lang="en-US" sz="3200" b="1" i="0" u="none" strike="noStrike" kern="1200" cap="none" spc="0" normalizeH="0" baseline="0" noProof="0" dirty="0">
+                <a:ln>
+                  <a:noFill/>
+                </a:ln>
+                <a:solidFill>
+                  <a:srgbClr val="FFFFFF"/>
+                </a:solidFill>
+                <a:effectLst/>
+                <a:uLnTx/>
+                <a:uFillTx/>
+                <a:latin typeface="Palatino Linotype" panose="02040502050505030304" pitchFamily="18" charset="0"/>
+                <a:ea typeface="+mn-ea"/>
+                <a:cs typeface="+mn-cs"/>
+              </a:rPr>
+              <a:t>MDP</a:t>
+            </a:r>
+            <a:r>
+              <a:rPr kumimoji="0" lang="en-US" sz="3200" i="0" u="none" strike="noStrike" kern="1200" cap="none" spc="0" normalizeH="0" baseline="0" noProof="0" dirty="0">
+                <a:ln>
+                  <a:noFill/>
+                </a:ln>
+                <a:solidFill>
+                  <a:srgbClr val="FFFFFF"/>
+                </a:solidFill>
+                <a:effectLst/>
+                <a:uLnTx/>
+                <a:uFillTx/>
+                <a:latin typeface="Palatino Linotype" panose="02040502050505030304" pitchFamily="18" charset="0"/>
+                <a:ea typeface="+mn-ea"/>
+                <a:cs typeface="+mn-cs"/>
+              </a:rPr>
+              <a:t>:</a:t>
+            </a:r>
+            <a:r>
+              <a:rPr kumimoji="0" lang="en-US" sz="3200" b="1" i="0" u="none" strike="noStrike" kern="1200" cap="none" spc="0" normalizeH="0" baseline="0" noProof="0" dirty="0">
+                <a:ln>
+                  <a:noFill/>
+                </a:ln>
+                <a:solidFill>
+                  <a:srgbClr val="FFFFFF"/>
+                </a:solidFill>
+                <a:effectLst/>
+                <a:uLnTx/>
+                <a:uFillTx/>
+                <a:latin typeface="Palatino Linotype" panose="02040502050505030304" pitchFamily="18" charset="0"/>
+                <a:ea typeface="+mn-ea"/>
+                <a:cs typeface="+mn-cs"/>
+              </a:rPr>
+              <a:t> </a:t>
+            </a:r>
+            <a:r>
+              <a:rPr kumimoji="0" lang="en-US" sz="3200" i="0" u="none" strike="noStrike" kern="1200" cap="none" spc="0" normalizeH="0" baseline="0" noProof="0" dirty="0">
+                <a:ln>
+                  <a:noFill/>
+                </a:ln>
+                <a:solidFill>
+                  <a:srgbClr val="FFFFFF"/>
+                </a:solidFill>
+                <a:effectLst/>
+                <a:uLnTx/>
+                <a:uFillTx/>
+                <a:latin typeface="Palatino Linotype" panose="02040502050505030304" pitchFamily="18" charset="0"/>
+                <a:ea typeface="+mn-ea"/>
+                <a:cs typeface="+mn-cs"/>
+              </a:rPr>
+              <a:t>Markov decision process</a:t>
+            </a:r>
+            <a:endParaRPr kumimoji="0" lang="en-US" sz="3200" i="0" u="none" strike="noStrike" kern="1200" cap="none" spc="0" normalizeH="0" baseline="0" noProof="0" dirty="0">
+              <a:ln>
+                <a:noFill/>
+              </a:ln>
+              <a:solidFill>
+                <a:prstClr val="black"/>
+              </a:solidFill>
+              <a:effectLst/>
+              <a:uLnTx/>
+              <a:uFillTx/>
+              <a:latin typeface="Palatino Linotype" panose="02040502050505030304" pitchFamily="18" charset="0"/>
+              <a:ea typeface="+mn-ea"/>
+              <a:cs typeface="+mn-cs"/>
+            </a:endParaRPr>
+          </a:p>
+        </p:txBody>
+      </p:sp>
     </p:spTree>
     <p:extLst>
       <p:ext uri="{BB962C8B-B14F-4D97-AF65-F5344CB8AC3E}">
@@ -7731,9 +7782,60 @@
                 <a:ea typeface="+mn-ea"/>
                 <a:cs typeface="+mn-cs"/>
               </a:rPr>
-              <a:t>Partially observable Markov decision process (POMDP)</a:t>
+              <a:t>POMDP</a:t>
             </a:r>
-            <a:endParaRPr kumimoji="0" lang="en-US" sz="3200" b="0" i="0" u="none" strike="noStrike" kern="1200" cap="none" spc="0" normalizeH="0" baseline="0" noProof="0" dirty="0">
+            <a:r>
+              <a:rPr kumimoji="0" lang="en-US" sz="3200" i="0" u="none" strike="noStrike" kern="1200" cap="none" spc="0" normalizeH="0" baseline="0" noProof="0" dirty="0">
+                <a:ln>
+                  <a:noFill/>
+                </a:ln>
+                <a:solidFill>
+                  <a:srgbClr val="FFFFFF"/>
+                </a:solidFill>
+                <a:effectLst/>
+                <a:uLnTx/>
+                <a:uFillTx/>
+                <a:latin typeface="Palatino Linotype" panose="02040502050505030304" pitchFamily="18" charset="0"/>
+                <a:ea typeface="+mn-ea"/>
+                <a:cs typeface="+mn-cs"/>
+              </a:rPr>
+              <a:t>:</a:t>
+            </a:r>
+            <a:r>
+              <a:rPr kumimoji="0" lang="en-US" sz="3200" b="1" i="0" u="none" strike="noStrike" kern="1200" cap="none" spc="0" normalizeH="0" baseline="0" noProof="0" dirty="0">
+                <a:ln>
+                  <a:noFill/>
+                </a:ln>
+                <a:solidFill>
+                  <a:srgbClr val="FFFFFF"/>
+                </a:solidFill>
+                <a:effectLst/>
+                <a:uLnTx/>
+                <a:uFillTx/>
+                <a:latin typeface="Palatino Linotype" panose="02040502050505030304" pitchFamily="18" charset="0"/>
+                <a:ea typeface="+mn-ea"/>
+                <a:cs typeface="+mn-cs"/>
+              </a:rPr>
+              <a:t> </a:t>
+            </a:r>
+            <a:r>
+              <a:rPr kumimoji="0" lang="en-US" sz="3200" i="0" u="none" strike="noStrike" kern="1200" cap="none" spc="0" normalizeH="0" baseline="0" noProof="0" dirty="0">
+                <a:ln>
+                  <a:noFill/>
+                </a:ln>
+                <a:solidFill>
+                  <a:srgbClr val="FFFFFF"/>
+                </a:solidFill>
+                <a:effectLst/>
+                <a:uLnTx/>
+                <a:uFillTx/>
+                <a:latin typeface="Palatino Linotype" panose="02040502050505030304" pitchFamily="18" charset="0"/>
+                <a:ea typeface="+mn-ea"/>
+                <a:cs typeface="+mn-cs"/>
+              </a:rPr>
+              <a:t>Partially observable Markov decision process</a:t>
+            </a:r>
+            <a:endParaRPr kumimoji="0" lang="en-US" sz="3200" i="0" u="none" strike="noStrike" kern="1200" cap="none" spc="0" normalizeH="0" baseline="0" noProof="0" dirty="0">
               <a:ln>
                 <a:noFill/>
               </a:ln>
@@ -7808,13 +7910,13 @@
               </a:ext>
             </a:extLst>
           </a:blip>
-          <a:srcRect b="2909"/>
+          <a:srcRect b="2894"/>
           <a:stretch/>
         </p:blipFill>
         <p:spPr>
           <a:xfrm>
             <a:off x="2487286" y="990600"/>
-            <a:ext cx="6436541" cy="3855720"/>
+            <a:ext cx="6436541" cy="3856318"/>
           </a:xfrm>
           <a:prstGeom prst="rect">
             <a:avLst/>
@@ -7907,93 +8009,6 @@
           </a:p>
         </p:txBody>
       </p:sp>
-      <p:sp>
-        <p:nvSpPr>
-          <p:cNvPr id="30" name="Oval 29">
-            <a:extLst>
-              <a:ext uri="{FF2B5EF4-FFF2-40B4-BE49-F238E27FC236}">
-                <a16:creationId xmlns:a16="http://schemas.microsoft.com/office/drawing/2014/main" id="{BCF4F8AF-AC77-D0EC-EABF-80F60857E251}"/>
-              </a:ext>
-            </a:extLst>
-          </p:cNvPr>
-          <p:cNvSpPr>
-            <a:spLocks noChangeAspect="1"/>
-          </p:cNvSpPr>
-          <p:nvPr/>
-        </p:nvSpPr>
-        <p:spPr>
-          <a:xfrm>
-            <a:off x="860803" y="4583696"/>
-            <a:ext cx="45720" cy="45720"/>
-          </a:xfrm>
-          <a:prstGeom prst="ellipse">
-            <a:avLst/>
-          </a:prstGeom>
-          <a:solidFill>
-            <a:srgbClr val="415762">
-              <a:alpha val="50196"/>
-            </a:srgbClr>
-          </a:solidFill>
-          <a:ln>
-            <a:solidFill>
-              <a:srgbClr val="19A3EA"/>
-            </a:solidFill>
-          </a:ln>
-        </p:spPr>
-        <p:style>
-          <a:lnRef idx="2">
-            <a:schemeClr val="accent1">
-              <a:shade val="15000"/>
-            </a:schemeClr>
-          </a:lnRef>
-          <a:fillRef idx="1">
-            <a:schemeClr val="accent1"/>
-          </a:fillRef>
-          <a:effectRef idx="0">
-            <a:schemeClr val="accent1"/>
-          </a:effectRef>
-          <a:fontRef idx="minor">
-            <a:schemeClr val="lt1"/>
-          </a:fontRef>
-        </p:style>
-        <p:txBody>
-          <a:bodyPr rtlCol="0" anchor="ctr"/>
-          <a:lstStyle/>
-          <a:p>
-            <a:pPr marL="0" marR="0" lvl="0" indent="0" algn="ctr" defTabSz="914400" rtl="0" eaLnBrk="1" fontAlgn="auto" latinLnBrk="0" hangingPunct="1">
-              <a:lnSpc>
-                <a:spcPct val="100000"/>
-              </a:lnSpc>
-              <a:spcBef>
-                <a:spcPts val="0"/>
-              </a:spcBef>
-              <a:spcAft>
-                <a:spcPts val="0"/>
-              </a:spcAft>
-              <a:buClrTx/>
-              <a:buSzTx/>
-              <a:buFontTx/>
-              <a:buNone/>
-              <a:tabLst/>
-              <a:defRPr/>
-            </a:pPr>
-            <a:endParaRPr kumimoji="0" lang="en-US" sz="1800" b="0" i="0" u="none" strike="noStrike" kern="1200" cap="none" spc="0" normalizeH="0" baseline="0" noProof="0" dirty="0">
-              <a:ln>
-                <a:noFill/>
-              </a:ln>
-              <a:solidFill>
-                <a:prstClr val="white"/>
-              </a:solidFill>
-              <a:effectLst/>
-              <a:uLnTx/>
-              <a:uFillTx/>
-              <a:latin typeface="Calibri" panose="020F0502020204030204"/>
-              <a:ea typeface="+mn-ea"/>
-              <a:cs typeface="+mn-cs"/>
-            </a:endParaRPr>
-          </a:p>
-        </p:txBody>
-      </p:sp>
       <p:grpSp>
         <p:nvGrpSpPr>
           <p:cNvPr id="2" name="Group 1">
@@ -8187,6 +8202,261 @@
           </p:style>
         </p:cxnSp>
       </p:grpSp>
+      <p:sp>
+        <p:nvSpPr>
+          <p:cNvPr id="16" name="Oval 15">
+            <a:extLst>
+              <a:ext uri="{FF2B5EF4-FFF2-40B4-BE49-F238E27FC236}">
+                <a16:creationId xmlns:a16="http://schemas.microsoft.com/office/drawing/2014/main" id="{735142C8-CA5E-CE96-5083-C5D643C356B7}"/>
+              </a:ext>
+            </a:extLst>
+          </p:cNvPr>
+          <p:cNvSpPr/>
+          <p:nvPr/>
+        </p:nvSpPr>
+        <p:spPr>
+          <a:xfrm>
+            <a:off x="857020" y="4583696"/>
+            <a:ext cx="45720" cy="45720"/>
+          </a:xfrm>
+          <a:prstGeom prst="ellipse">
+            <a:avLst/>
+          </a:prstGeom>
+          <a:solidFill>
+            <a:srgbClr val="415762">
+              <a:alpha val="50196"/>
+            </a:srgbClr>
+          </a:solidFill>
+          <a:ln w="6350">
+            <a:solidFill>
+              <a:srgbClr val="19A3EA"/>
+            </a:solidFill>
+          </a:ln>
+        </p:spPr>
+        <p:style>
+          <a:lnRef idx="2">
+            <a:schemeClr val="accent1">
+              <a:shade val="15000"/>
+            </a:schemeClr>
+          </a:lnRef>
+          <a:fillRef idx="1">
+            <a:schemeClr val="accent1"/>
+          </a:fillRef>
+          <a:effectRef idx="0">
+            <a:schemeClr val="accent1"/>
+          </a:effectRef>
+          <a:fontRef idx="minor">
+            <a:schemeClr val="lt1"/>
+          </a:fontRef>
+        </p:style>
+        <p:txBody>
+          <a:bodyPr rtlCol="0" anchor="ctr"/>
+          <a:lstStyle/>
+          <a:p>
+            <a:pPr marL="0" marR="0" lvl="0" indent="0" algn="ctr" defTabSz="914400" rtl="0" eaLnBrk="1" fontAlgn="auto" latinLnBrk="0" hangingPunct="1">
+              <a:lnSpc>
+                <a:spcPct val="100000"/>
+              </a:lnSpc>
+              <a:spcBef>
+                <a:spcPts val="0"/>
+              </a:spcBef>
+              <a:spcAft>
+                <a:spcPts val="0"/>
+              </a:spcAft>
+              <a:buClrTx/>
+              <a:buSzTx/>
+              <a:buFontTx/>
+              <a:buNone/>
+              <a:tabLst/>
+              <a:defRPr/>
+            </a:pPr>
+            <a:endParaRPr kumimoji="0" lang="en-US" sz="1800" b="0" i="0" u="none" strike="noStrike" kern="1200" cap="none" spc="0" normalizeH="0" baseline="0" noProof="0">
+              <a:ln>
+                <a:noFill/>
+              </a:ln>
+              <a:solidFill>
+                <a:prstClr val="white"/>
+              </a:solidFill>
+              <a:effectLst/>
+              <a:uLnTx/>
+              <a:uFillTx/>
+              <a:latin typeface="Calibri" panose="020F0502020204030204"/>
+              <a:ea typeface="+mn-ea"/>
+              <a:cs typeface="+mn-cs"/>
+            </a:endParaRPr>
+          </a:p>
+        </p:txBody>
+      </p:sp>
+      <p:sp>
+        <p:nvSpPr>
+          <p:cNvPr id="18" name="Oval 17">
+            <a:extLst>
+              <a:ext uri="{FF2B5EF4-FFF2-40B4-BE49-F238E27FC236}">
+                <a16:creationId xmlns:a16="http://schemas.microsoft.com/office/drawing/2014/main" id="{76F4C101-D50E-F57E-4DB7-FB5C5971B9C0}"/>
+              </a:ext>
+            </a:extLst>
+          </p:cNvPr>
+          <p:cNvSpPr/>
+          <p:nvPr/>
+        </p:nvSpPr>
+        <p:spPr>
+          <a:xfrm>
+            <a:off x="926343" y="4721808"/>
+            <a:ext cx="45720" cy="45720"/>
+          </a:xfrm>
+          <a:prstGeom prst="ellipse">
+            <a:avLst/>
+          </a:prstGeom>
+          <a:solidFill>
+            <a:srgbClr val="415762">
+              <a:alpha val="50196"/>
+            </a:srgbClr>
+          </a:solidFill>
+          <a:ln w="6350">
+            <a:solidFill>
+              <a:srgbClr val="19A3EA"/>
+            </a:solidFill>
+          </a:ln>
+        </p:spPr>
+        <p:style>
+          <a:lnRef idx="2">
+            <a:schemeClr val="accent1">
+              <a:shade val="15000"/>
+            </a:schemeClr>
+          </a:lnRef>
+          <a:fillRef idx="1">
+            <a:schemeClr val="accent1"/>
+          </a:fillRef>
+          <a:effectRef idx="0">
+            <a:schemeClr val="accent1"/>
+          </a:effectRef>
+          <a:fontRef idx="minor">
+            <a:schemeClr val="lt1"/>
+          </a:fontRef>
+        </p:style>
+        <p:txBody>
+          <a:bodyPr rtlCol="0" anchor="ctr"/>
+          <a:lstStyle/>
+          <a:p>
+            <a:pPr marL="0" marR="0" lvl="0" indent="0" algn="ctr" defTabSz="914400" rtl="0" eaLnBrk="1" fontAlgn="auto" latinLnBrk="0" hangingPunct="1">
+              <a:lnSpc>
+                <a:spcPct val="100000"/>
+              </a:lnSpc>
+              <a:spcBef>
+                <a:spcPts val="0"/>
+              </a:spcBef>
+              <a:spcAft>
+                <a:spcPts val="0"/>
+              </a:spcAft>
+              <a:buClrTx/>
+              <a:buSzTx/>
+              <a:buFontTx/>
+              <a:buNone/>
+              <a:tabLst/>
+              <a:defRPr/>
+            </a:pPr>
+            <a:endParaRPr kumimoji="0" lang="en-US" sz="1800" b="0" i="0" u="none" strike="noStrike" kern="1200" cap="none" spc="0" normalizeH="0" baseline="0" noProof="0">
+              <a:ln>
+                <a:noFill/>
+              </a:ln>
+              <a:solidFill>
+                <a:prstClr val="white"/>
+              </a:solidFill>
+              <a:effectLst/>
+              <a:uLnTx/>
+              <a:uFillTx/>
+              <a:latin typeface="Calibri" panose="020F0502020204030204"/>
+              <a:ea typeface="+mn-ea"/>
+              <a:cs typeface="+mn-cs"/>
+            </a:endParaRPr>
+          </a:p>
+        </p:txBody>
+      </p:sp>
+      <p:sp>
+        <p:nvSpPr>
+          <p:cNvPr id="20" name="Oval 19">
+            <a:extLst>
+              <a:ext uri="{FF2B5EF4-FFF2-40B4-BE49-F238E27FC236}">
+                <a16:creationId xmlns:a16="http://schemas.microsoft.com/office/drawing/2014/main" id="{30A75F93-1380-C4EA-2315-E536906946D3}"/>
+              </a:ext>
+            </a:extLst>
+          </p:cNvPr>
+          <p:cNvSpPr/>
+          <p:nvPr/>
+        </p:nvSpPr>
+        <p:spPr>
+          <a:xfrm>
+            <a:off x="794855" y="4651323"/>
+            <a:ext cx="45720" cy="45720"/>
+          </a:xfrm>
+          <a:prstGeom prst="ellipse">
+            <a:avLst/>
+          </a:prstGeom>
+          <a:solidFill>
+            <a:srgbClr val="415762">
+              <a:alpha val="50196"/>
+            </a:srgbClr>
+          </a:solidFill>
+          <a:ln w="6350">
+            <a:solidFill>
+              <a:srgbClr val="19A3EA"/>
+            </a:solidFill>
+          </a:ln>
+        </p:spPr>
+        <p:style>
+          <a:lnRef idx="2">
+            <a:schemeClr val="accent1">
+              <a:shade val="15000"/>
+            </a:schemeClr>
+          </a:lnRef>
+          <a:fillRef idx="1">
+            <a:schemeClr val="accent1"/>
+          </a:fillRef>
+          <a:effectRef idx="0">
+            <a:schemeClr val="accent1"/>
+          </a:effectRef>
+          <a:fontRef idx="minor">
+            <a:schemeClr val="lt1"/>
+          </a:fontRef>
+        </p:style>
+        <p:txBody>
+          <a:bodyPr rtlCol="0" anchor="ctr"/>
+          <a:lstStyle/>
+          <a:p>
+            <a:pPr marL="0" marR="0" lvl="0" indent="0" algn="ctr" defTabSz="914400" rtl="0" eaLnBrk="1" fontAlgn="auto" latinLnBrk="0" hangingPunct="1">
+              <a:lnSpc>
+                <a:spcPct val="100000"/>
+              </a:lnSpc>
+              <a:spcBef>
+                <a:spcPts val="0"/>
+              </a:spcBef>
+              <a:spcAft>
+                <a:spcPts val="0"/>
+              </a:spcAft>
+              <a:buClrTx/>
+              <a:buSzTx/>
+              <a:buFontTx/>
+              <a:buNone/>
+              <a:tabLst/>
+              <a:defRPr/>
+            </a:pPr>
+            <a:endParaRPr kumimoji="0" lang="en-US" sz="1800" b="0" i="0" u="none" strike="noStrike" kern="1200" cap="none" spc="0" normalizeH="0" baseline="0" noProof="0">
+              <a:ln>
+                <a:noFill/>
+              </a:ln>
+              <a:solidFill>
+                <a:prstClr val="white"/>
+              </a:solidFill>
+              <a:effectLst/>
+              <a:uLnTx/>
+              <a:uFillTx/>
+              <a:latin typeface="Calibri" panose="020F0502020204030204"/>
+              <a:ea typeface="+mn-ea"/>
+              <a:cs typeface="+mn-cs"/>
+            </a:endParaRPr>
+          </a:p>
+        </p:txBody>
+      </p:sp>
     </p:spTree>
     <p:extLst>
       <p:ext uri="{BB962C8B-B14F-4D97-AF65-F5344CB8AC3E}">
@@ -8237,7 +8507,7 @@
                                   <p:childTnLst>
                                     <p:animEffect transition="out" filter="wipe(up)">
                                       <p:cBhvr>
-                                        <p:cTn id="6" dur="500"/>
+                                        <p:cTn id="6" dur="2000"/>
                                         <p:tgtEl>
                                           <p:spTgt spid="17"/>
                                         </p:tgtEl>
@@ -8247,7 +8517,7 @@
                                       <p:cBhvr>
                                         <p:cTn id="7" dur="1" fill="hold">
                                           <p:stCondLst>
-                                            <p:cond delay="499"/>
+                                            <p:cond delay="1999"/>
                                           </p:stCondLst>
                                         </p:cTn>
                                         <p:tgtEl>
@@ -8272,7 +8542,7 @@
                                   <p:childTnLst>
                                     <p:animEffect transition="out" filter="fade">
                                       <p:cBhvr>
-                                        <p:cTn id="9" dur="500"/>
+                                        <p:cTn id="9" dur="2000"/>
                                         <p:tgtEl>
                                           <p:spTgt spid="19"/>
                                         </p:tgtEl>
@@ -8282,7 +8552,7 @@
                                       <p:cBhvr>
                                         <p:cTn id="10" dur="1" fill="hold">
                                           <p:stCondLst>
-                                            <p:cond delay="499"/>
+                                            <p:cond delay="1999"/>
                                           </p:stCondLst>
                                         </p:cTn>
                                         <p:tgtEl>
@@ -8325,7 +8595,7 @@
                                     </p:set>
                                     <p:animEffect transition="in" filter="wipe(up)">
                                       <p:cBhvr>
-                                        <p:cTn id="13" dur="500"/>
+                                        <p:cTn id="13" dur="2000"/>
                                         <p:tgtEl>
                                           <p:spTgt spid="4"/>
                                         </p:tgtEl>
@@ -8366,7 +8636,7 @@
                                           </p:stCondLst>
                                         </p:cTn>
                                         <p:tgtEl>
-                                          <p:spTgt spid="30"/>
+                                          <p:spTgt spid="16"/>
                                         </p:tgtEl>
                                         <p:attrNameLst>
                                           <p:attrName>style.visibility</p:attrName>
@@ -8380,7 +8650,77 @@
                                       <p:cBhvr>
                                         <p:cTn id="18" dur="500"/>
                                         <p:tgtEl>
-                                          <p:spTgt spid="30"/>
+                                          <p:spTgt spid="16"/>
+                                        </p:tgtEl>
+                                      </p:cBhvr>
+                                    </p:animEffect>
+                                  </p:childTnLst>
+                                </p:cTn>
+                              </p:par>
+                              <p:par>
+                                <p:cTn id="19" presetID="10" presetClass="entr" presetSubtype="0" fill="hold" grpId="0" nodeType="withEffect">
+                                  <p:stCondLst>
+                                    <p:cond delay="0"/>
+                                  </p:stCondLst>
+                                  <p:childTnLst>
+                                    <p:set>
+                                      <p:cBhvr>
+                                        <p:cTn id="20" dur="1" fill="hold">
+                                          <p:stCondLst>
+                                            <p:cond delay="0"/>
+                                          </p:stCondLst>
+                                        </p:cTn>
+                                        <p:tgtEl>
+                                          <p:spTgt spid="18"/>
+                                        </p:tgtEl>
+                                        <p:attrNameLst>
+                                          <p:attrName>style.visibility</p:attrName>
+                                        </p:attrNameLst>
+                                      </p:cBhvr>
+                                      <p:to>
+                                        <p:strVal val="visible"/>
+                                      </p:to>
+                                    </p:set>
+                                    <p:animEffect transition="in" filter="fade">
+                                      <p:cBhvr>
+                                        <p:cTn id="21" dur="500"/>
+                                        <p:tgtEl>
+                                          <p:spTgt spid="18"/>
+                                        </p:tgtEl>
+                                      </p:cBhvr>
+                                    </p:animEffect>
+                                  </p:childTnLst>
+                                </p:cTn>
+                              </p:par>
+                              <p:par>
+                                <p:cTn id="22" presetID="10" presetClass="entr" presetSubtype="0" fill="hold" grpId="0" nodeType="withEffect">
+                                  <p:stCondLst>
+                                    <p:cond delay="0"/>
+                                  </p:stCondLst>
+                                  <p:childTnLst>
+                                    <p:set>
+                                      <p:cBhvr>
+                                        <p:cTn id="23" dur="1" fill="hold">
+                                          <p:stCondLst>
+                                            <p:cond delay="0"/>
+                                          </p:stCondLst>
+                                        </p:cTn>
+                                        <p:tgtEl>
+                                          <p:spTgt spid="20"/>
+                                        </p:tgtEl>
+                                        <p:attrNameLst>
+                                          <p:attrName>style.visibility</p:attrName>
+                                        </p:attrNameLst>
+                                      </p:cBhvr>
+                                      <p:to>
+                                        <p:strVal val="visible"/>
+                                      </p:to>
+                                    </p:set>
+                                    <p:animEffect transition="in" filter="fade">
+                                      <p:cBhvr>
+                                        <p:cTn id="24" dur="500"/>
+                                        <p:tgtEl>
+                                          <p:spTgt spid="20"/>
                                         </p:tgtEl>
                                       </p:cBhvr>
                                     </p:animEffect>
@@ -8416,7 +8756,9 @@
     </p:tnLst>
     <p:bldLst>
       <p:bldP spid="19" grpId="0" animBg="1"/>
-      <p:bldP spid="30" grpId="0" animBg="1"/>
+      <p:bldP spid="16" grpId="0" animBg="1"/>
+      <p:bldP spid="18" grpId="0" animBg="1"/>
+      <p:bldP spid="20" grpId="0" animBg="1"/>
     </p:bldLst>
   </p:timing>
 </p:sld>
@@ -8550,7 +8892,41 @@
                 <a:ea typeface="+mn-ea"/>
                 <a:cs typeface="+mn-cs"/>
               </a:rPr>
-              <a:t>State uncertainty: </a:t>
+              <a:t>State uncertainty</a:t>
+            </a:r>
+            <a:r>
+              <a:rPr kumimoji="0" lang="en-US" sz="3200" i="0" u="none" strike="noStrike" kern="1200" cap="none" spc="0" normalizeH="0" baseline="0" noProof="0" dirty="0">
+                <a:ln>
+                  <a:noFill/>
+                </a:ln>
+                <a:solidFill>
+                  <a:srgbClr val="FFFFFF"/>
+                </a:solidFill>
+                <a:effectLst/>
+                <a:uLnTx/>
+                <a:uFillTx/>
+                <a:latin typeface="Palatino Linotype" panose="02040502050505030304" pitchFamily="18" charset="0"/>
+                <a:ea typeface="+mn-ea"/>
+                <a:cs typeface="+mn-cs"/>
+              </a:rPr>
+              <a:t>:</a:t>
+            </a:r>
+            <a:r>
+              <a:rPr kumimoji="0" lang="en-US" sz="3200" b="1" i="0" u="none" strike="noStrike" kern="1200" cap="none" spc="0" normalizeH="0" baseline="0" noProof="0" dirty="0">
+                <a:ln>
+                  <a:noFill/>
+                </a:ln>
+                <a:solidFill>
+                  <a:srgbClr val="FFFFFF"/>
+                </a:solidFill>
+                <a:effectLst/>
+                <a:uLnTx/>
+                <a:uFillTx/>
+                <a:latin typeface="Palatino Linotype" panose="02040502050505030304" pitchFamily="18" charset="0"/>
+                <a:ea typeface="+mn-ea"/>
+                <a:cs typeface="+mn-cs"/>
+              </a:rPr>
+              <a:t> </a:t>
             </a:r>
             <a:r>
               <a:rPr kumimoji="0" lang="en-US" sz="3200" b="0" i="0" u="none" strike="noStrike" kern="1200" cap="none" spc="0" normalizeH="0" baseline="0" noProof="0" dirty="0">
@@ -9002,7 +9378,41 @@
                 <a:ea typeface="+mn-ea"/>
                 <a:cs typeface="+mn-cs"/>
               </a:rPr>
-              <a:t>State uncertainty: </a:t>
+              <a:t>State uncertainty</a:t>
+            </a:r>
+            <a:r>
+              <a:rPr kumimoji="0" lang="en-US" sz="3200" i="0" u="none" strike="noStrike" kern="1200" cap="none" spc="0" normalizeH="0" baseline="0" noProof="0" dirty="0">
+                <a:ln>
+                  <a:noFill/>
+                </a:ln>
+                <a:solidFill>
+                  <a:srgbClr val="FFFFFF"/>
+                </a:solidFill>
+                <a:effectLst/>
+                <a:uLnTx/>
+                <a:uFillTx/>
+                <a:latin typeface="Palatino Linotype" panose="02040502050505030304" pitchFamily="18" charset="0"/>
+                <a:ea typeface="+mn-ea"/>
+                <a:cs typeface="+mn-cs"/>
+              </a:rPr>
+              <a:t>:</a:t>
+            </a:r>
+            <a:r>
+              <a:rPr kumimoji="0" lang="en-US" sz="3200" b="1" i="0" u="none" strike="noStrike" kern="1200" cap="none" spc="0" normalizeH="0" baseline="0" noProof="0" dirty="0">
+                <a:ln>
+                  <a:noFill/>
+                </a:ln>
+                <a:solidFill>
+                  <a:srgbClr val="FFFFFF"/>
+                </a:solidFill>
+                <a:effectLst/>
+                <a:uLnTx/>
+                <a:uFillTx/>
+                <a:latin typeface="Palatino Linotype" panose="02040502050505030304" pitchFamily="18" charset="0"/>
+                <a:ea typeface="+mn-ea"/>
+                <a:cs typeface="+mn-cs"/>
+              </a:rPr>
+              <a:t> </a:t>
             </a:r>
             <a:r>
               <a:rPr kumimoji="0" lang="en-US" sz="3200" b="0" i="0" u="none" strike="noStrike" kern="1200" cap="none" spc="0" normalizeH="0" baseline="0" noProof="0" dirty="0">
@@ -10922,7 +11332,41 @@
                 <a:ea typeface="+mn-ea"/>
                 <a:cs typeface="+mn-cs"/>
               </a:rPr>
-              <a:t>State uncertainty: </a:t>
+              <a:t>State uncertainty</a:t>
+            </a:r>
+            <a:r>
+              <a:rPr kumimoji="0" lang="en-US" sz="3200" i="0" u="none" strike="noStrike" kern="1200" cap="none" spc="0" normalizeH="0" baseline="0" noProof="0" dirty="0">
+                <a:ln>
+                  <a:noFill/>
+                </a:ln>
+                <a:solidFill>
+                  <a:srgbClr val="FFFFFF"/>
+                </a:solidFill>
+                <a:effectLst/>
+                <a:uLnTx/>
+                <a:uFillTx/>
+                <a:latin typeface="Palatino Linotype" panose="02040502050505030304" pitchFamily="18" charset="0"/>
+                <a:ea typeface="+mn-ea"/>
+                <a:cs typeface="+mn-cs"/>
+              </a:rPr>
+              <a:t>:</a:t>
+            </a:r>
+            <a:r>
+              <a:rPr kumimoji="0" lang="en-US" sz="3200" b="1" i="0" u="none" strike="noStrike" kern="1200" cap="none" spc="0" normalizeH="0" baseline="0" noProof="0" dirty="0">
+                <a:ln>
+                  <a:noFill/>
+                </a:ln>
+                <a:solidFill>
+                  <a:srgbClr val="FFFFFF"/>
+                </a:solidFill>
+                <a:effectLst/>
+                <a:uLnTx/>
+                <a:uFillTx/>
+                <a:latin typeface="Palatino Linotype" panose="02040502050505030304" pitchFamily="18" charset="0"/>
+                <a:ea typeface="+mn-ea"/>
+                <a:cs typeface="+mn-cs"/>
+              </a:rPr>
+              <a:t> </a:t>
             </a:r>
             <a:r>
               <a:rPr kumimoji="0" lang="en-US" sz="3200" b="0" i="0" u="none" strike="noStrike" kern="1200" cap="none" spc="0" normalizeH="0" baseline="0" noProof="0" dirty="0">
@@ -14834,7 +15278,41 @@
                 <a:ea typeface="+mn-ea"/>
                 <a:cs typeface="+mn-cs"/>
               </a:rPr>
-              <a:t>Solution: </a:t>
+              <a:t>Solution</a:t>
+            </a:r>
+            <a:r>
+              <a:rPr kumimoji="0" lang="en-US" sz="3200" i="0" u="none" strike="noStrike" kern="1200" cap="none" spc="0" normalizeH="0" baseline="0" noProof="0" dirty="0">
+                <a:ln>
+                  <a:noFill/>
+                </a:ln>
+                <a:solidFill>
+                  <a:srgbClr val="FFFFFF"/>
+                </a:solidFill>
+                <a:effectLst/>
+                <a:uLnTx/>
+                <a:uFillTx/>
+                <a:latin typeface="Palatino Linotype" panose="02040502050505030304" pitchFamily="18" charset="0"/>
+                <a:ea typeface="+mn-ea"/>
+                <a:cs typeface="+mn-cs"/>
+              </a:rPr>
+              <a:t>:</a:t>
+            </a:r>
+            <a:r>
+              <a:rPr kumimoji="0" lang="en-US" sz="3200" b="1" i="0" u="none" strike="noStrike" kern="1200" cap="none" spc="0" normalizeH="0" baseline="0" noProof="0" dirty="0">
+                <a:ln>
+                  <a:noFill/>
+                </a:ln>
+                <a:solidFill>
+                  <a:srgbClr val="FFFFFF"/>
+                </a:solidFill>
+                <a:effectLst/>
+                <a:uLnTx/>
+                <a:uFillTx/>
+                <a:latin typeface="Palatino Linotype" panose="02040502050505030304" pitchFamily="18" charset="0"/>
+                <a:ea typeface="+mn-ea"/>
+                <a:cs typeface="+mn-cs"/>
+              </a:rPr>
+              <a:t> </a:t>
             </a:r>
             <a:r>
               <a:rPr kumimoji="0" lang="en-US" sz="3200" b="0" i="0" u="none" strike="noStrike" kern="1200" cap="none" spc="0" normalizeH="0" baseline="0" noProof="0" dirty="0">
@@ -15176,7 +15654,41 @@
                 <a:ea typeface="+mn-ea"/>
                 <a:cs typeface="+mn-cs"/>
               </a:rPr>
-              <a:t>Solution: </a:t>
+              <a:t>Solution</a:t>
+            </a:r>
+            <a:r>
+              <a:rPr kumimoji="0" lang="en-US" sz="3200" i="0" u="none" strike="noStrike" kern="1200" cap="none" spc="0" normalizeH="0" baseline="0" noProof="0" dirty="0">
+                <a:ln>
+                  <a:noFill/>
+                </a:ln>
+                <a:solidFill>
+                  <a:srgbClr val="FFFFFF"/>
+                </a:solidFill>
+                <a:effectLst/>
+                <a:uLnTx/>
+                <a:uFillTx/>
+                <a:latin typeface="Palatino Linotype" panose="02040502050505030304" pitchFamily="18" charset="0"/>
+                <a:ea typeface="+mn-ea"/>
+                <a:cs typeface="+mn-cs"/>
+              </a:rPr>
+              <a:t>:</a:t>
+            </a:r>
+            <a:r>
+              <a:rPr kumimoji="0" lang="en-US" sz="3200" b="1" i="0" u="none" strike="noStrike" kern="1200" cap="none" spc="0" normalizeH="0" baseline="0" noProof="0" dirty="0">
+                <a:ln>
+                  <a:noFill/>
+                </a:ln>
+                <a:solidFill>
+                  <a:srgbClr val="FFFFFF"/>
+                </a:solidFill>
+                <a:effectLst/>
+                <a:uLnTx/>
+                <a:uFillTx/>
+                <a:latin typeface="Palatino Linotype" panose="02040502050505030304" pitchFamily="18" charset="0"/>
+                <a:ea typeface="+mn-ea"/>
+                <a:cs typeface="+mn-cs"/>
+              </a:rPr>
+              <a:t> </a:t>
             </a:r>
             <a:r>
               <a:rPr kumimoji="0" lang="en-US" sz="3200" b="0" i="0" u="none" strike="noStrike" kern="1200" cap="none" spc="0" normalizeH="0" baseline="0" noProof="0" dirty="0">
@@ -17163,7 +17675,41 @@
                 <a:ea typeface="+mn-ea"/>
                 <a:cs typeface="+mn-cs"/>
               </a:rPr>
-              <a:t>Objective: </a:t>
+              <a:t>Objective</a:t>
+            </a:r>
+            <a:r>
+              <a:rPr kumimoji="0" lang="en-US" sz="3200" i="0" u="none" strike="noStrike" kern="1200" cap="none" spc="0" normalizeH="0" baseline="0" noProof="0" dirty="0">
+                <a:ln>
+                  <a:noFill/>
+                </a:ln>
+                <a:solidFill>
+                  <a:srgbClr val="FFFFFF"/>
+                </a:solidFill>
+                <a:effectLst/>
+                <a:uLnTx/>
+                <a:uFillTx/>
+                <a:latin typeface="Palatino Linotype" panose="02040502050505030304" pitchFamily="18" charset="0"/>
+                <a:ea typeface="+mn-ea"/>
+                <a:cs typeface="+mn-cs"/>
+              </a:rPr>
+              <a:t>:</a:t>
+            </a:r>
+            <a:r>
+              <a:rPr kumimoji="0" lang="en-US" sz="3200" b="1" i="0" u="none" strike="noStrike" kern="1200" cap="none" spc="0" normalizeH="0" baseline="0" noProof="0" dirty="0">
+                <a:ln>
+                  <a:noFill/>
+                </a:ln>
+                <a:solidFill>
+                  <a:srgbClr val="FFFFFF"/>
+                </a:solidFill>
+                <a:effectLst/>
+                <a:uLnTx/>
+                <a:uFillTx/>
+                <a:latin typeface="Palatino Linotype" panose="02040502050505030304" pitchFamily="18" charset="0"/>
+                <a:ea typeface="+mn-ea"/>
+                <a:cs typeface="+mn-cs"/>
+              </a:rPr>
+              <a:t> </a:t>
             </a:r>
             <a:r>
               <a:rPr kumimoji="0" lang="en-US" sz="3200" b="0" i="0" u="none" strike="noStrike" kern="1200" cap="none" spc="0" normalizeH="0" baseline="0" noProof="0" dirty="0">
@@ -17479,7 +18025,41 @@
                 <a:ea typeface="+mn-ea"/>
                 <a:cs typeface="+mn-cs"/>
               </a:rPr>
-              <a:t>Objective: </a:t>
+              <a:t>Objective</a:t>
+            </a:r>
+            <a:r>
+              <a:rPr kumimoji="0" lang="en-US" sz="3200" i="0" u="none" strike="noStrike" kern="1200" cap="none" spc="0" normalizeH="0" baseline="0" noProof="0" dirty="0">
+                <a:ln>
+                  <a:noFill/>
+                </a:ln>
+                <a:solidFill>
+                  <a:srgbClr val="FFFFFF"/>
+                </a:solidFill>
+                <a:effectLst/>
+                <a:uLnTx/>
+                <a:uFillTx/>
+                <a:latin typeface="Palatino Linotype" panose="02040502050505030304" pitchFamily="18" charset="0"/>
+                <a:ea typeface="+mn-ea"/>
+                <a:cs typeface="+mn-cs"/>
+              </a:rPr>
+              <a:t>:</a:t>
+            </a:r>
+            <a:r>
+              <a:rPr kumimoji="0" lang="en-US" sz="3200" b="1" i="0" u="none" strike="noStrike" kern="1200" cap="none" spc="0" normalizeH="0" baseline="0" noProof="0" dirty="0">
+                <a:ln>
+                  <a:noFill/>
+                </a:ln>
+                <a:solidFill>
+                  <a:srgbClr val="FFFFFF"/>
+                </a:solidFill>
+                <a:effectLst/>
+                <a:uLnTx/>
+                <a:uFillTx/>
+                <a:latin typeface="Palatino Linotype" panose="02040502050505030304" pitchFamily="18" charset="0"/>
+                <a:ea typeface="+mn-ea"/>
+                <a:cs typeface="+mn-cs"/>
+              </a:rPr>
+              <a:t> </a:t>
             </a:r>
             <a:r>
               <a:rPr kumimoji="0" lang="en-US" sz="3200" b="0" i="0" u="none" strike="noStrike" kern="1200" cap="none" spc="0" normalizeH="0" baseline="0" noProof="0" dirty="0">
@@ -17843,7 +18423,41 @@
                 <a:ea typeface="+mn-ea"/>
                 <a:cs typeface="+mn-cs"/>
               </a:rPr>
-              <a:t>Objective: </a:t>
+              <a:t>Objective</a:t>
+            </a:r>
+            <a:r>
+              <a:rPr kumimoji="0" lang="en-US" sz="3200" i="0" u="none" strike="noStrike" kern="1200" cap="none" spc="0" normalizeH="0" baseline="0" noProof="0" dirty="0">
+                <a:ln>
+                  <a:noFill/>
+                </a:ln>
+                <a:solidFill>
+                  <a:srgbClr val="FFFFFF"/>
+                </a:solidFill>
+                <a:effectLst/>
+                <a:uLnTx/>
+                <a:uFillTx/>
+                <a:latin typeface="Palatino Linotype" panose="02040502050505030304" pitchFamily="18" charset="0"/>
+                <a:ea typeface="+mn-ea"/>
+                <a:cs typeface="+mn-cs"/>
+              </a:rPr>
+              <a:t>:</a:t>
+            </a:r>
+            <a:r>
+              <a:rPr kumimoji="0" lang="en-US" sz="3200" b="1" i="0" u="none" strike="noStrike" kern="1200" cap="none" spc="0" normalizeH="0" baseline="0" noProof="0" dirty="0">
+                <a:ln>
+                  <a:noFill/>
+                </a:ln>
+                <a:solidFill>
+                  <a:srgbClr val="FFFFFF"/>
+                </a:solidFill>
+                <a:effectLst/>
+                <a:uLnTx/>
+                <a:uFillTx/>
+                <a:latin typeface="Palatino Linotype" panose="02040502050505030304" pitchFamily="18" charset="0"/>
+                <a:ea typeface="+mn-ea"/>
+                <a:cs typeface="+mn-cs"/>
+              </a:rPr>
+              <a:t> </a:t>
             </a:r>
             <a:r>
               <a:rPr kumimoji="0" lang="en-US" sz="3200" b="0" i="0" u="none" strike="noStrike" kern="1200" cap="none" spc="0" normalizeH="0" baseline="0" noProof="0" dirty="0">
@@ -18207,7 +18821,41 @@
                 <a:ea typeface="+mn-ea"/>
                 <a:cs typeface="+mn-cs"/>
               </a:rPr>
-              <a:t>Objective: </a:t>
+              <a:t>Objective</a:t>
+            </a:r>
+            <a:r>
+              <a:rPr kumimoji="0" lang="en-US" sz="3200" i="0" u="none" strike="noStrike" kern="1200" cap="none" spc="0" normalizeH="0" baseline="0" noProof="0" dirty="0">
+                <a:ln>
+                  <a:noFill/>
+                </a:ln>
+                <a:solidFill>
+                  <a:srgbClr val="FFFFFF"/>
+                </a:solidFill>
+                <a:effectLst/>
+                <a:uLnTx/>
+                <a:uFillTx/>
+                <a:latin typeface="Palatino Linotype" panose="02040502050505030304" pitchFamily="18" charset="0"/>
+                <a:ea typeface="+mn-ea"/>
+                <a:cs typeface="+mn-cs"/>
+              </a:rPr>
+              <a:t>:</a:t>
+            </a:r>
+            <a:r>
+              <a:rPr kumimoji="0" lang="en-US" sz="3200" b="1" i="0" u="none" strike="noStrike" kern="1200" cap="none" spc="0" normalizeH="0" baseline="0" noProof="0" dirty="0">
+                <a:ln>
+                  <a:noFill/>
+                </a:ln>
+                <a:solidFill>
+                  <a:srgbClr val="FFFFFF"/>
+                </a:solidFill>
+                <a:effectLst/>
+                <a:uLnTx/>
+                <a:uFillTx/>
+                <a:latin typeface="Palatino Linotype" panose="02040502050505030304" pitchFamily="18" charset="0"/>
+                <a:ea typeface="+mn-ea"/>
+                <a:cs typeface="+mn-cs"/>
+              </a:rPr>
+              <a:t> </a:t>
             </a:r>
             <a:r>
               <a:rPr kumimoji="0" lang="en-US" sz="3200" b="0" i="0" u="none" strike="noStrike" kern="1200" cap="none" spc="0" normalizeH="0" baseline="0" noProof="0" dirty="0">
@@ -18539,92 +19187,6 @@
           </a:prstGeom>
         </p:spPr>
       </p:pic>
-      <p:sp>
-        <p:nvSpPr>
-          <p:cNvPr id="3" name="TextBox 2">
-            <a:extLst>
-              <a:ext uri="{FF2B5EF4-FFF2-40B4-BE49-F238E27FC236}">
-                <a16:creationId xmlns:a16="http://schemas.microsoft.com/office/drawing/2014/main" id="{FE4F237B-BAA4-07B9-78F4-A29825A24B73}"/>
-              </a:ext>
-            </a:extLst>
-          </p:cNvPr>
-          <p:cNvSpPr txBox="1"/>
-          <p:nvPr/>
-        </p:nvSpPr>
-        <p:spPr>
-          <a:xfrm>
-            <a:off x="351972" y="228146"/>
-            <a:ext cx="10512877" cy="584775"/>
-          </a:xfrm>
-          <a:prstGeom prst="rect">
-            <a:avLst/>
-          </a:prstGeom>
-          <a:noFill/>
-          <a:effectLst>
-            <a:outerShdw blurRad="50800" dist="38100" dir="2700000" algn="tl" rotWithShape="0">
-              <a:prstClr val="black">
-                <a:alpha val="40000"/>
-              </a:prstClr>
-            </a:outerShdw>
-          </a:effectLst>
-        </p:spPr>
-        <p:txBody>
-          <a:bodyPr wrap="square">
-            <a:spAutoFit/>
-          </a:bodyPr>
-          <a:lstStyle/>
-          <a:p>
-            <a:pPr marL="0" marR="0" lvl="0" indent="0" algn="l" defTabSz="914400" rtl="0" eaLnBrk="1" fontAlgn="auto" latinLnBrk="0" hangingPunct="1">
-              <a:lnSpc>
-                <a:spcPct val="100000"/>
-              </a:lnSpc>
-              <a:spcBef>
-                <a:spcPts val="0"/>
-              </a:spcBef>
-              <a:spcAft>
-                <a:spcPts val="0"/>
-              </a:spcAft>
-              <a:buClrTx/>
-              <a:buSzTx/>
-              <a:buFontTx/>
-              <a:buNone/>
-              <a:tabLst/>
-              <a:defRPr/>
-            </a:pPr>
-            <a:r>
-              <a:rPr kumimoji="0" lang="en-US" sz="3200" b="1" i="0" u="none" strike="noStrike" kern="1200" cap="none" spc="0" normalizeH="0" baseline="0" noProof="0" dirty="0">
-                <a:ln>
-                  <a:noFill/>
-                </a:ln>
-                <a:solidFill>
-                  <a:srgbClr val="FFFFFF"/>
-                </a:solidFill>
-                <a:effectLst/>
-                <a:uLnTx/>
-                <a:uFillTx/>
-                <a:latin typeface="Palatino Linotype" panose="02040502050505030304" pitchFamily="18" charset="0"/>
-                <a:ea typeface="+mn-ea"/>
-                <a:cs typeface="+mn-cs"/>
-              </a:rPr>
-              <a:t>Markov decision process (MDP)</a:t>
-            </a:r>
-            <a:endParaRPr kumimoji="0" lang="en-US" sz="3200" b="0" i="0" u="none" strike="noStrike" kern="1200" cap="none" spc="0" normalizeH="0" baseline="0" noProof="0" dirty="0">
-              <a:ln>
-                <a:noFill/>
-              </a:ln>
-              <a:solidFill>
-                <a:prstClr val="black"/>
-              </a:solidFill>
-              <a:effectLst/>
-              <a:uLnTx/>
-              <a:uFillTx/>
-              <a:latin typeface="Palatino Linotype" panose="02040502050505030304" pitchFamily="18" charset="0"/>
-              <a:ea typeface="+mn-ea"/>
-              <a:cs typeface="+mn-cs"/>
-            </a:endParaRPr>
-          </a:p>
-        </p:txBody>
-      </p:sp>
       <p:sp>
         <p:nvSpPr>
           <p:cNvPr id="24" name="Rectangle 23">
@@ -19032,6 +19594,143 @@
           </a:fontRef>
         </p:style>
       </p:cxnSp>
+      <p:sp>
+        <p:nvSpPr>
+          <p:cNvPr id="6" name="TextBox 5">
+            <a:extLst>
+              <a:ext uri="{FF2B5EF4-FFF2-40B4-BE49-F238E27FC236}">
+                <a16:creationId xmlns:a16="http://schemas.microsoft.com/office/drawing/2014/main" id="{CC106404-28B8-C478-0920-1B2E3FD6B90F}"/>
+              </a:ext>
+            </a:extLst>
+          </p:cNvPr>
+          <p:cNvSpPr txBox="1"/>
+          <p:nvPr/>
+        </p:nvSpPr>
+        <p:spPr>
+          <a:xfrm>
+            <a:off x="351972" y="228146"/>
+            <a:ext cx="10512877" cy="584775"/>
+          </a:xfrm>
+          <a:prstGeom prst="rect">
+            <a:avLst/>
+          </a:prstGeom>
+          <a:noFill/>
+          <a:effectLst>
+            <a:outerShdw blurRad="50800" dist="38100" dir="2700000" algn="tl" rotWithShape="0">
+              <a:prstClr val="black">
+                <a:alpha val="40000"/>
+              </a:prstClr>
+            </a:outerShdw>
+          </a:effectLst>
+        </p:spPr>
+        <p:txBody>
+          <a:bodyPr wrap="square">
+            <a:spAutoFit/>
+          </a:bodyPr>
+          <a:lstStyle/>
+          <a:p>
+            <a:pPr marL="0" marR="0" lvl="0" indent="0" algn="l" defTabSz="914400" rtl="0" eaLnBrk="1" fontAlgn="auto" latinLnBrk="0" hangingPunct="1">
+              <a:lnSpc>
+                <a:spcPct val="100000"/>
+              </a:lnSpc>
+              <a:spcBef>
+                <a:spcPts val="0"/>
+              </a:spcBef>
+              <a:spcAft>
+                <a:spcPts val="0"/>
+              </a:spcAft>
+              <a:buClrTx/>
+              <a:buSzTx/>
+              <a:buFontTx/>
+              <a:buNone/>
+              <a:tabLst/>
+              <a:defRPr/>
+            </a:pPr>
+            <a:r>
+              <a:rPr kumimoji="0" lang="en-US" sz="3200" b="1" i="0" u="none" strike="noStrike" kern="1200" cap="none" spc="0" normalizeH="0" baseline="0" noProof="0" dirty="0">
+                <a:ln>
+                  <a:noFill/>
+                </a:ln>
+                <a:solidFill>
+                  <a:srgbClr val="FFFFFF"/>
+                </a:solidFill>
+                <a:effectLst/>
+                <a:uLnTx/>
+                <a:uFillTx/>
+                <a:latin typeface="Palatino Linotype" panose="02040502050505030304" pitchFamily="18" charset="0"/>
+                <a:ea typeface="+mn-ea"/>
+                <a:cs typeface="+mn-cs"/>
+              </a:rPr>
+              <a:t>MDP</a:t>
+            </a:r>
+            <a:r>
+              <a:rPr kumimoji="0" lang="en-US" sz="3200" i="0" u="none" strike="noStrike" kern="1200" cap="none" spc="0" normalizeH="0" baseline="0" noProof="0" dirty="0">
+                <a:ln>
+                  <a:noFill/>
+                </a:ln>
+                <a:solidFill>
+                  <a:srgbClr val="FFFFFF"/>
+                </a:solidFill>
+                <a:effectLst/>
+                <a:uLnTx/>
+                <a:uFillTx/>
+                <a:latin typeface="Palatino Linotype" panose="02040502050505030304" pitchFamily="18" charset="0"/>
+                <a:ea typeface="+mn-ea"/>
+                <a:cs typeface="+mn-cs"/>
+              </a:rPr>
+              <a:t>:</a:t>
+            </a:r>
+            <a:r>
+              <a:rPr kumimoji="0" lang="en-US" sz="3200" b="1" i="0" u="none" strike="noStrike" kern="1200" cap="none" spc="0" normalizeH="0" baseline="0" noProof="0" dirty="0">
+                <a:ln>
+                  <a:noFill/>
+                </a:ln>
+                <a:solidFill>
+                  <a:srgbClr val="FFFFFF"/>
+                </a:solidFill>
+                <a:effectLst/>
+                <a:uLnTx/>
+                <a:uFillTx/>
+                <a:latin typeface="Palatino Linotype" panose="02040502050505030304" pitchFamily="18" charset="0"/>
+                <a:ea typeface="+mn-ea"/>
+                <a:cs typeface="+mn-cs"/>
+              </a:rPr>
+              <a:t> </a:t>
+            </a:r>
+            <a:r>
+              <a:rPr kumimoji="0" lang="en-US" sz="3200" i="0" u="none" strike="noStrike" kern="1200" cap="none" spc="0" normalizeH="0" baseline="0" noProof="0" dirty="0">
+                <a:ln>
+                  <a:noFill/>
+                </a:ln>
+                <a:solidFill>
+                  <a:srgbClr val="FFFFFF"/>
+                </a:solidFill>
+                <a:effectLst/>
+                <a:uLnTx/>
+                <a:uFillTx/>
+                <a:latin typeface="Palatino Linotype" panose="02040502050505030304" pitchFamily="18" charset="0"/>
+                <a:ea typeface="+mn-ea"/>
+                <a:cs typeface="+mn-cs"/>
+              </a:rPr>
+              <a:t>Markov decision process</a:t>
+            </a:r>
+            <a:endParaRPr kumimoji="0" lang="en-US" sz="3200" i="0" u="none" strike="noStrike" kern="1200" cap="none" spc="0" normalizeH="0" baseline="0" noProof="0" dirty="0">
+              <a:ln>
+                <a:noFill/>
+              </a:ln>
+              <a:solidFill>
+                <a:prstClr val="black"/>
+              </a:solidFill>
+              <a:effectLst/>
+              <a:uLnTx/>
+              <a:uFillTx/>
+              <a:latin typeface="Palatino Linotype" panose="02040502050505030304" pitchFamily="18" charset="0"/>
+              <a:ea typeface="+mn-ea"/>
+              <a:cs typeface="+mn-cs"/>
+            </a:endParaRPr>
+          </a:p>
+        </p:txBody>
+      </p:sp>
     </p:spTree>
     <p:extLst>
       <p:ext uri="{BB962C8B-B14F-4D97-AF65-F5344CB8AC3E}">
@@ -19232,7 +19931,41 @@
                 <a:ea typeface="+mn-ea"/>
                 <a:cs typeface="+mn-cs"/>
               </a:rPr>
-              <a:t>Objective: </a:t>
+              <a:t>Objective</a:t>
+            </a:r>
+            <a:r>
+              <a:rPr kumimoji="0" lang="en-US" sz="3200" i="0" u="none" strike="noStrike" kern="1200" cap="none" spc="0" normalizeH="0" baseline="0" noProof="0" dirty="0">
+                <a:ln>
+                  <a:noFill/>
+                </a:ln>
+                <a:solidFill>
+                  <a:srgbClr val="FFFFFF"/>
+                </a:solidFill>
+                <a:effectLst/>
+                <a:uLnTx/>
+                <a:uFillTx/>
+                <a:latin typeface="Palatino Linotype" panose="02040502050505030304" pitchFamily="18" charset="0"/>
+                <a:ea typeface="+mn-ea"/>
+                <a:cs typeface="+mn-cs"/>
+              </a:rPr>
+              <a:t>:</a:t>
+            </a:r>
+            <a:r>
+              <a:rPr kumimoji="0" lang="en-US" sz="3200" b="1" i="0" u="none" strike="noStrike" kern="1200" cap="none" spc="0" normalizeH="0" baseline="0" noProof="0" dirty="0">
+                <a:ln>
+                  <a:noFill/>
+                </a:ln>
+                <a:solidFill>
+                  <a:srgbClr val="FFFFFF"/>
+                </a:solidFill>
+                <a:effectLst/>
+                <a:uLnTx/>
+                <a:uFillTx/>
+                <a:latin typeface="Palatino Linotype" panose="02040502050505030304" pitchFamily="18" charset="0"/>
+                <a:ea typeface="+mn-ea"/>
+                <a:cs typeface="+mn-cs"/>
+              </a:rPr>
+              <a:t> </a:t>
             </a:r>
             <a:r>
               <a:rPr kumimoji="0" lang="en-US" sz="3200" b="0" i="0" u="none" strike="noStrike" kern="1200" cap="none" spc="0" normalizeH="0" baseline="0" noProof="0" dirty="0">
@@ -19596,7 +20329,41 @@
                 <a:ea typeface="+mn-ea"/>
                 <a:cs typeface="+mn-cs"/>
               </a:rPr>
-              <a:t>Objective: </a:t>
+              <a:t>Objective</a:t>
+            </a:r>
+            <a:r>
+              <a:rPr kumimoji="0" lang="en-US" sz="3200" i="0" u="none" strike="noStrike" kern="1200" cap="none" spc="0" normalizeH="0" baseline="0" noProof="0" dirty="0">
+                <a:ln>
+                  <a:noFill/>
+                </a:ln>
+                <a:solidFill>
+                  <a:srgbClr val="FFFFFF"/>
+                </a:solidFill>
+                <a:effectLst/>
+                <a:uLnTx/>
+                <a:uFillTx/>
+                <a:latin typeface="Palatino Linotype" panose="02040502050505030304" pitchFamily="18" charset="0"/>
+                <a:ea typeface="+mn-ea"/>
+                <a:cs typeface="+mn-cs"/>
+              </a:rPr>
+              <a:t>:</a:t>
+            </a:r>
+            <a:r>
+              <a:rPr kumimoji="0" lang="en-US" sz="3200" b="1" i="0" u="none" strike="noStrike" kern="1200" cap="none" spc="0" normalizeH="0" baseline="0" noProof="0" dirty="0">
+                <a:ln>
+                  <a:noFill/>
+                </a:ln>
+                <a:solidFill>
+                  <a:srgbClr val="FFFFFF"/>
+                </a:solidFill>
+                <a:effectLst/>
+                <a:uLnTx/>
+                <a:uFillTx/>
+                <a:latin typeface="Palatino Linotype" panose="02040502050505030304" pitchFamily="18" charset="0"/>
+                <a:ea typeface="+mn-ea"/>
+                <a:cs typeface="+mn-cs"/>
+              </a:rPr>
+              <a:t> </a:t>
             </a:r>
             <a:r>
               <a:rPr kumimoji="0" lang="en-US" sz="3200" b="0" i="0" u="none" strike="noStrike" kern="1200" cap="none" spc="0" normalizeH="0" baseline="0" noProof="0" dirty="0">
@@ -19960,7 +20727,41 @@
                 <a:ea typeface="+mn-ea"/>
                 <a:cs typeface="+mn-cs"/>
               </a:rPr>
-              <a:t>Objective: </a:t>
+              <a:t>Objective</a:t>
+            </a:r>
+            <a:r>
+              <a:rPr kumimoji="0" lang="en-US" sz="3200" i="0" u="none" strike="noStrike" kern="1200" cap="none" spc="0" normalizeH="0" baseline="0" noProof="0" dirty="0">
+                <a:ln>
+                  <a:noFill/>
+                </a:ln>
+                <a:solidFill>
+                  <a:srgbClr val="FFFFFF"/>
+                </a:solidFill>
+                <a:effectLst/>
+                <a:uLnTx/>
+                <a:uFillTx/>
+                <a:latin typeface="Palatino Linotype" panose="02040502050505030304" pitchFamily="18" charset="0"/>
+                <a:ea typeface="+mn-ea"/>
+                <a:cs typeface="+mn-cs"/>
+              </a:rPr>
+              <a:t>:</a:t>
+            </a:r>
+            <a:r>
+              <a:rPr kumimoji="0" lang="en-US" sz="3200" b="1" i="0" u="none" strike="noStrike" kern="1200" cap="none" spc="0" normalizeH="0" baseline="0" noProof="0" dirty="0">
+                <a:ln>
+                  <a:noFill/>
+                </a:ln>
+                <a:solidFill>
+                  <a:srgbClr val="FFFFFF"/>
+                </a:solidFill>
+                <a:effectLst/>
+                <a:uLnTx/>
+                <a:uFillTx/>
+                <a:latin typeface="Palatino Linotype" panose="02040502050505030304" pitchFamily="18" charset="0"/>
+                <a:ea typeface="+mn-ea"/>
+                <a:cs typeface="+mn-cs"/>
+              </a:rPr>
+              <a:t> </a:t>
             </a:r>
             <a:r>
               <a:rPr kumimoji="0" lang="en-US" sz="3200" b="0" i="0" u="none" strike="noStrike" kern="1200" cap="none" spc="0" normalizeH="0" baseline="0" noProof="0" dirty="0">
@@ -20741,7 +21542,41 @@
                 <a:ea typeface="+mn-ea"/>
                 <a:cs typeface="+mn-cs"/>
               </a:rPr>
-              <a:t>Focus of this lesson: </a:t>
+              <a:t>Focus of this lesson</a:t>
+            </a:r>
+            <a:r>
+              <a:rPr kumimoji="0" lang="en-US" sz="3200" i="0" u="none" strike="noStrike" kern="1200" cap="none" spc="0" normalizeH="0" baseline="0" noProof="0" dirty="0">
+                <a:ln>
+                  <a:noFill/>
+                </a:ln>
+                <a:solidFill>
+                  <a:srgbClr val="FFFFFF"/>
+                </a:solidFill>
+                <a:effectLst/>
+                <a:uLnTx/>
+                <a:uFillTx/>
+                <a:latin typeface="Palatino Linotype" panose="02040502050505030304" pitchFamily="18" charset="0"/>
+                <a:ea typeface="+mn-ea"/>
+                <a:cs typeface="+mn-cs"/>
+              </a:rPr>
+              <a:t>:</a:t>
+            </a:r>
+            <a:r>
+              <a:rPr kumimoji="0" lang="en-US" sz="3200" b="1" i="0" u="none" strike="noStrike" kern="1200" cap="none" spc="0" normalizeH="0" baseline="0" noProof="0" dirty="0">
+                <a:ln>
+                  <a:noFill/>
+                </a:ln>
+                <a:solidFill>
+                  <a:srgbClr val="FFFFFF"/>
+                </a:solidFill>
+                <a:effectLst/>
+                <a:uLnTx/>
+                <a:uFillTx/>
+                <a:latin typeface="Palatino Linotype" panose="02040502050505030304" pitchFamily="18" charset="0"/>
+                <a:ea typeface="+mn-ea"/>
+                <a:cs typeface="+mn-cs"/>
+              </a:rPr>
+              <a:t> </a:t>
             </a:r>
             <a:r>
               <a:rPr kumimoji="0" lang="en-US" sz="3200" i="0" u="none" strike="noStrike" kern="1200" cap="none" spc="0" normalizeH="0" baseline="0" noProof="0" dirty="0">
@@ -20859,13 +21694,13 @@
   <p:clrMapOvr>
     <a:masterClrMapping/>
   </p:clrMapOvr>
-  <mc:AlternateContent xmlns:mc="http://schemas.openxmlformats.org/markup-compatibility/2006">
-    <mc:Choice xmlns:p14="http://schemas.microsoft.com/office/powerpoint/2010/main" Requires="p14">
+  <mc:AlternateContent xmlns:mc="http://schemas.openxmlformats.org/markup-compatibility/2006" xmlns:p14="http://schemas.microsoft.com/office/powerpoint/2010/main">
+    <mc:Choice Requires="p14">
       <p:transition spd="med" p14:dur="700">
         <p:fade/>
       </p:transition>
     </mc:Choice>
-    <mc:Fallback>
+    <mc:Fallback xmlns="">
       <p:transition spd="med">
         <p:fade/>
       </p:transition>
@@ -20934,92 +21769,6 @@
           </a:prstGeom>
         </p:spPr>
       </p:pic>
-      <p:sp>
-        <p:nvSpPr>
-          <p:cNvPr id="3" name="TextBox 2">
-            <a:extLst>
-              <a:ext uri="{FF2B5EF4-FFF2-40B4-BE49-F238E27FC236}">
-                <a16:creationId xmlns:a16="http://schemas.microsoft.com/office/drawing/2014/main" id="{FE4F237B-BAA4-07B9-78F4-A29825A24B73}"/>
-              </a:ext>
-            </a:extLst>
-          </p:cNvPr>
-          <p:cNvSpPr txBox="1"/>
-          <p:nvPr/>
-        </p:nvSpPr>
-        <p:spPr>
-          <a:xfrm>
-            <a:off x="351972" y="228146"/>
-            <a:ext cx="10512877" cy="584775"/>
-          </a:xfrm>
-          <a:prstGeom prst="rect">
-            <a:avLst/>
-          </a:prstGeom>
-          <a:noFill/>
-          <a:effectLst>
-            <a:outerShdw blurRad="50800" dist="38100" dir="2700000" algn="tl" rotWithShape="0">
-              <a:prstClr val="black">
-                <a:alpha val="40000"/>
-              </a:prstClr>
-            </a:outerShdw>
-          </a:effectLst>
-        </p:spPr>
-        <p:txBody>
-          <a:bodyPr wrap="square">
-            <a:spAutoFit/>
-          </a:bodyPr>
-          <a:lstStyle/>
-          <a:p>
-            <a:pPr marL="0" marR="0" lvl="0" indent="0" algn="l" defTabSz="914400" rtl="0" eaLnBrk="1" fontAlgn="auto" latinLnBrk="0" hangingPunct="1">
-              <a:lnSpc>
-                <a:spcPct val="100000"/>
-              </a:lnSpc>
-              <a:spcBef>
-                <a:spcPts val="0"/>
-              </a:spcBef>
-              <a:spcAft>
-                <a:spcPts val="0"/>
-              </a:spcAft>
-              <a:buClrTx/>
-              <a:buSzTx/>
-              <a:buFontTx/>
-              <a:buNone/>
-              <a:tabLst/>
-              <a:defRPr/>
-            </a:pPr>
-            <a:r>
-              <a:rPr kumimoji="0" lang="en-US" sz="3200" b="1" i="0" u="none" strike="noStrike" kern="1200" cap="none" spc="0" normalizeH="0" baseline="0" noProof="0" dirty="0">
-                <a:ln>
-                  <a:noFill/>
-                </a:ln>
-                <a:solidFill>
-                  <a:srgbClr val="FFFFFF"/>
-                </a:solidFill>
-                <a:effectLst/>
-                <a:uLnTx/>
-                <a:uFillTx/>
-                <a:latin typeface="Palatino Linotype" panose="02040502050505030304" pitchFamily="18" charset="0"/>
-                <a:ea typeface="+mn-ea"/>
-                <a:cs typeface="+mn-cs"/>
-              </a:rPr>
-              <a:t>Markov decision process (MDP)</a:t>
-            </a:r>
-            <a:endParaRPr kumimoji="0" lang="en-US" sz="3200" b="0" i="0" u="none" strike="noStrike" kern="1200" cap="none" spc="0" normalizeH="0" baseline="0" noProof="0" dirty="0">
-              <a:ln>
-                <a:noFill/>
-              </a:ln>
-              <a:solidFill>
-                <a:prstClr val="black"/>
-              </a:solidFill>
-              <a:effectLst/>
-              <a:uLnTx/>
-              <a:uFillTx/>
-              <a:latin typeface="Palatino Linotype" panose="02040502050505030304" pitchFamily="18" charset="0"/>
-              <a:ea typeface="+mn-ea"/>
-              <a:cs typeface="+mn-cs"/>
-            </a:endParaRPr>
-          </a:p>
-        </p:txBody>
-      </p:sp>
       <p:sp>
         <p:nvSpPr>
           <p:cNvPr id="14" name="Rectangle 13">
@@ -21724,6 +22473,143 @@
           </a:fontRef>
         </p:style>
       </p:cxnSp>
+      <p:sp>
+        <p:nvSpPr>
+          <p:cNvPr id="6" name="TextBox 5">
+            <a:extLst>
+              <a:ext uri="{FF2B5EF4-FFF2-40B4-BE49-F238E27FC236}">
+                <a16:creationId xmlns:a16="http://schemas.microsoft.com/office/drawing/2014/main" id="{55E01547-CDAE-0B27-C91B-69E3D02E643F}"/>
+              </a:ext>
+            </a:extLst>
+          </p:cNvPr>
+          <p:cNvSpPr txBox="1"/>
+          <p:nvPr/>
+        </p:nvSpPr>
+        <p:spPr>
+          <a:xfrm>
+            <a:off x="351972" y="228146"/>
+            <a:ext cx="10512877" cy="584775"/>
+          </a:xfrm>
+          <a:prstGeom prst="rect">
+            <a:avLst/>
+          </a:prstGeom>
+          <a:noFill/>
+          <a:effectLst>
+            <a:outerShdw blurRad="50800" dist="38100" dir="2700000" algn="tl" rotWithShape="0">
+              <a:prstClr val="black">
+                <a:alpha val="40000"/>
+              </a:prstClr>
+            </a:outerShdw>
+          </a:effectLst>
+        </p:spPr>
+        <p:txBody>
+          <a:bodyPr wrap="square">
+            <a:spAutoFit/>
+          </a:bodyPr>
+          <a:lstStyle/>
+          <a:p>
+            <a:pPr marL="0" marR="0" lvl="0" indent="0" algn="l" defTabSz="914400" rtl="0" eaLnBrk="1" fontAlgn="auto" latinLnBrk="0" hangingPunct="1">
+              <a:lnSpc>
+                <a:spcPct val="100000"/>
+              </a:lnSpc>
+              <a:spcBef>
+                <a:spcPts val="0"/>
+              </a:spcBef>
+              <a:spcAft>
+                <a:spcPts val="0"/>
+              </a:spcAft>
+              <a:buClrTx/>
+              <a:buSzTx/>
+              <a:buFontTx/>
+              <a:buNone/>
+              <a:tabLst/>
+              <a:defRPr/>
+            </a:pPr>
+            <a:r>
+              <a:rPr kumimoji="0" lang="en-US" sz="3200" b="1" i="0" u="none" strike="noStrike" kern="1200" cap="none" spc="0" normalizeH="0" baseline="0" noProof="0" dirty="0">
+                <a:ln>
+                  <a:noFill/>
+                </a:ln>
+                <a:solidFill>
+                  <a:srgbClr val="FFFFFF"/>
+                </a:solidFill>
+                <a:effectLst/>
+                <a:uLnTx/>
+                <a:uFillTx/>
+                <a:latin typeface="Palatino Linotype" panose="02040502050505030304" pitchFamily="18" charset="0"/>
+                <a:ea typeface="+mn-ea"/>
+                <a:cs typeface="+mn-cs"/>
+              </a:rPr>
+              <a:t>MDP</a:t>
+            </a:r>
+            <a:r>
+              <a:rPr kumimoji="0" lang="en-US" sz="3200" i="0" u="none" strike="noStrike" kern="1200" cap="none" spc="0" normalizeH="0" baseline="0" noProof="0" dirty="0">
+                <a:ln>
+                  <a:noFill/>
+                </a:ln>
+                <a:solidFill>
+                  <a:srgbClr val="FFFFFF"/>
+                </a:solidFill>
+                <a:effectLst/>
+                <a:uLnTx/>
+                <a:uFillTx/>
+                <a:latin typeface="Palatino Linotype" panose="02040502050505030304" pitchFamily="18" charset="0"/>
+                <a:ea typeface="+mn-ea"/>
+                <a:cs typeface="+mn-cs"/>
+              </a:rPr>
+              <a:t>:</a:t>
+            </a:r>
+            <a:r>
+              <a:rPr kumimoji="0" lang="en-US" sz="3200" b="1" i="0" u="none" strike="noStrike" kern="1200" cap="none" spc="0" normalizeH="0" baseline="0" noProof="0" dirty="0">
+                <a:ln>
+                  <a:noFill/>
+                </a:ln>
+                <a:solidFill>
+                  <a:srgbClr val="FFFFFF"/>
+                </a:solidFill>
+                <a:effectLst/>
+                <a:uLnTx/>
+                <a:uFillTx/>
+                <a:latin typeface="Palatino Linotype" panose="02040502050505030304" pitchFamily="18" charset="0"/>
+                <a:ea typeface="+mn-ea"/>
+                <a:cs typeface="+mn-cs"/>
+              </a:rPr>
+              <a:t> </a:t>
+            </a:r>
+            <a:r>
+              <a:rPr kumimoji="0" lang="en-US" sz="3200" i="0" u="none" strike="noStrike" kern="1200" cap="none" spc="0" normalizeH="0" baseline="0" noProof="0" dirty="0">
+                <a:ln>
+                  <a:noFill/>
+                </a:ln>
+                <a:solidFill>
+                  <a:srgbClr val="FFFFFF"/>
+                </a:solidFill>
+                <a:effectLst/>
+                <a:uLnTx/>
+                <a:uFillTx/>
+                <a:latin typeface="Palatino Linotype" panose="02040502050505030304" pitchFamily="18" charset="0"/>
+                <a:ea typeface="+mn-ea"/>
+                <a:cs typeface="+mn-cs"/>
+              </a:rPr>
+              <a:t>Markov decision process</a:t>
+            </a:r>
+            <a:endParaRPr kumimoji="0" lang="en-US" sz="3200" i="0" u="none" strike="noStrike" kern="1200" cap="none" spc="0" normalizeH="0" baseline="0" noProof="0" dirty="0">
+              <a:ln>
+                <a:noFill/>
+              </a:ln>
+              <a:solidFill>
+                <a:prstClr val="black"/>
+              </a:solidFill>
+              <a:effectLst/>
+              <a:uLnTx/>
+              <a:uFillTx/>
+              <a:latin typeface="Palatino Linotype" panose="02040502050505030304" pitchFamily="18" charset="0"/>
+              <a:ea typeface="+mn-ea"/>
+              <a:cs typeface="+mn-cs"/>
+            </a:endParaRPr>
+          </a:p>
+        </p:txBody>
+      </p:sp>
     </p:spTree>
     <p:extLst>
       <p:ext uri="{BB962C8B-B14F-4D97-AF65-F5344CB8AC3E}">
@@ -22033,92 +22919,6 @@
           </a:prstGeom>
         </p:spPr>
       </p:pic>
-      <p:sp>
-        <p:nvSpPr>
-          <p:cNvPr id="3" name="TextBox 2">
-            <a:extLst>
-              <a:ext uri="{FF2B5EF4-FFF2-40B4-BE49-F238E27FC236}">
-                <a16:creationId xmlns:a16="http://schemas.microsoft.com/office/drawing/2014/main" id="{FE4F237B-BAA4-07B9-78F4-A29825A24B73}"/>
-              </a:ext>
-            </a:extLst>
-          </p:cNvPr>
-          <p:cNvSpPr txBox="1"/>
-          <p:nvPr/>
-        </p:nvSpPr>
-        <p:spPr>
-          <a:xfrm>
-            <a:off x="351972" y="228146"/>
-            <a:ext cx="10512877" cy="584775"/>
-          </a:xfrm>
-          <a:prstGeom prst="rect">
-            <a:avLst/>
-          </a:prstGeom>
-          <a:noFill/>
-          <a:effectLst>
-            <a:outerShdw blurRad="50800" dist="38100" dir="2700000" algn="tl" rotWithShape="0">
-              <a:prstClr val="black">
-                <a:alpha val="40000"/>
-              </a:prstClr>
-            </a:outerShdw>
-          </a:effectLst>
-        </p:spPr>
-        <p:txBody>
-          <a:bodyPr wrap="square">
-            <a:spAutoFit/>
-          </a:bodyPr>
-          <a:lstStyle/>
-          <a:p>
-            <a:pPr marL="0" marR="0" lvl="0" indent="0" algn="l" defTabSz="914400" rtl="0" eaLnBrk="1" fontAlgn="auto" latinLnBrk="0" hangingPunct="1">
-              <a:lnSpc>
-                <a:spcPct val="100000"/>
-              </a:lnSpc>
-              <a:spcBef>
-                <a:spcPts val="0"/>
-              </a:spcBef>
-              <a:spcAft>
-                <a:spcPts val="0"/>
-              </a:spcAft>
-              <a:buClrTx/>
-              <a:buSzTx/>
-              <a:buFontTx/>
-              <a:buNone/>
-              <a:tabLst/>
-              <a:defRPr/>
-            </a:pPr>
-            <a:r>
-              <a:rPr kumimoji="0" lang="en-US" sz="3200" b="1" i="0" u="none" strike="noStrike" kern="1200" cap="none" spc="0" normalizeH="0" baseline="0" noProof="0" dirty="0">
-                <a:ln>
-                  <a:noFill/>
-                </a:ln>
-                <a:solidFill>
-                  <a:srgbClr val="FFFFFF"/>
-                </a:solidFill>
-                <a:effectLst/>
-                <a:uLnTx/>
-                <a:uFillTx/>
-                <a:latin typeface="Palatino Linotype" panose="02040502050505030304" pitchFamily="18" charset="0"/>
-                <a:ea typeface="+mn-ea"/>
-                <a:cs typeface="+mn-cs"/>
-              </a:rPr>
-              <a:t>Markov decision process (MDP)</a:t>
-            </a:r>
-            <a:endParaRPr kumimoji="0" lang="en-US" sz="3200" b="0" i="0" u="none" strike="noStrike" kern="1200" cap="none" spc="0" normalizeH="0" baseline="0" noProof="0" dirty="0">
-              <a:ln>
-                <a:noFill/>
-              </a:ln>
-              <a:solidFill>
-                <a:prstClr val="black"/>
-              </a:solidFill>
-              <a:effectLst/>
-              <a:uLnTx/>
-              <a:uFillTx/>
-              <a:latin typeface="Palatino Linotype" panose="02040502050505030304" pitchFamily="18" charset="0"/>
-              <a:ea typeface="+mn-ea"/>
-              <a:cs typeface="+mn-cs"/>
-            </a:endParaRPr>
-          </a:p>
-        </p:txBody>
-      </p:sp>
       <p:sp>
         <p:nvSpPr>
           <p:cNvPr id="19" name="Rectangle 18">
@@ -22683,6 +23483,143 @@
           </a:fontRef>
         </p:style>
       </p:cxnSp>
+      <p:sp>
+        <p:nvSpPr>
+          <p:cNvPr id="6" name="TextBox 5">
+            <a:extLst>
+              <a:ext uri="{FF2B5EF4-FFF2-40B4-BE49-F238E27FC236}">
+                <a16:creationId xmlns:a16="http://schemas.microsoft.com/office/drawing/2014/main" id="{683CCDBB-AAF8-1A4A-D45D-A9E67D8095DB}"/>
+              </a:ext>
+            </a:extLst>
+          </p:cNvPr>
+          <p:cNvSpPr txBox="1"/>
+          <p:nvPr/>
+        </p:nvSpPr>
+        <p:spPr>
+          <a:xfrm>
+            <a:off x="351972" y="228146"/>
+            <a:ext cx="10512877" cy="584775"/>
+          </a:xfrm>
+          <a:prstGeom prst="rect">
+            <a:avLst/>
+          </a:prstGeom>
+          <a:noFill/>
+          <a:effectLst>
+            <a:outerShdw blurRad="50800" dist="38100" dir="2700000" algn="tl" rotWithShape="0">
+              <a:prstClr val="black">
+                <a:alpha val="40000"/>
+              </a:prstClr>
+            </a:outerShdw>
+          </a:effectLst>
+        </p:spPr>
+        <p:txBody>
+          <a:bodyPr wrap="square">
+            <a:spAutoFit/>
+          </a:bodyPr>
+          <a:lstStyle/>
+          <a:p>
+            <a:pPr marL="0" marR="0" lvl="0" indent="0" algn="l" defTabSz="914400" rtl="0" eaLnBrk="1" fontAlgn="auto" latinLnBrk="0" hangingPunct="1">
+              <a:lnSpc>
+                <a:spcPct val="100000"/>
+              </a:lnSpc>
+              <a:spcBef>
+                <a:spcPts val="0"/>
+              </a:spcBef>
+              <a:spcAft>
+                <a:spcPts val="0"/>
+              </a:spcAft>
+              <a:buClrTx/>
+              <a:buSzTx/>
+              <a:buFontTx/>
+              <a:buNone/>
+              <a:tabLst/>
+              <a:defRPr/>
+            </a:pPr>
+            <a:r>
+              <a:rPr kumimoji="0" lang="en-US" sz="3200" b="1" i="0" u="none" strike="noStrike" kern="1200" cap="none" spc="0" normalizeH="0" baseline="0" noProof="0" dirty="0">
+                <a:ln>
+                  <a:noFill/>
+                </a:ln>
+                <a:solidFill>
+                  <a:srgbClr val="FFFFFF"/>
+                </a:solidFill>
+                <a:effectLst/>
+                <a:uLnTx/>
+                <a:uFillTx/>
+                <a:latin typeface="Palatino Linotype" panose="02040502050505030304" pitchFamily="18" charset="0"/>
+                <a:ea typeface="+mn-ea"/>
+                <a:cs typeface="+mn-cs"/>
+              </a:rPr>
+              <a:t>MDP</a:t>
+            </a:r>
+            <a:r>
+              <a:rPr kumimoji="0" lang="en-US" sz="3200" i="0" u="none" strike="noStrike" kern="1200" cap="none" spc="0" normalizeH="0" baseline="0" noProof="0" dirty="0">
+                <a:ln>
+                  <a:noFill/>
+                </a:ln>
+                <a:solidFill>
+                  <a:srgbClr val="FFFFFF"/>
+                </a:solidFill>
+                <a:effectLst/>
+                <a:uLnTx/>
+                <a:uFillTx/>
+                <a:latin typeface="Palatino Linotype" panose="02040502050505030304" pitchFamily="18" charset="0"/>
+                <a:ea typeface="+mn-ea"/>
+                <a:cs typeface="+mn-cs"/>
+              </a:rPr>
+              <a:t>:</a:t>
+            </a:r>
+            <a:r>
+              <a:rPr kumimoji="0" lang="en-US" sz="3200" b="1" i="0" u="none" strike="noStrike" kern="1200" cap="none" spc="0" normalizeH="0" baseline="0" noProof="0" dirty="0">
+                <a:ln>
+                  <a:noFill/>
+                </a:ln>
+                <a:solidFill>
+                  <a:srgbClr val="FFFFFF"/>
+                </a:solidFill>
+                <a:effectLst/>
+                <a:uLnTx/>
+                <a:uFillTx/>
+                <a:latin typeface="Palatino Linotype" panose="02040502050505030304" pitchFamily="18" charset="0"/>
+                <a:ea typeface="+mn-ea"/>
+                <a:cs typeface="+mn-cs"/>
+              </a:rPr>
+              <a:t> </a:t>
+            </a:r>
+            <a:r>
+              <a:rPr kumimoji="0" lang="en-US" sz="3200" i="0" u="none" strike="noStrike" kern="1200" cap="none" spc="0" normalizeH="0" baseline="0" noProof="0" dirty="0">
+                <a:ln>
+                  <a:noFill/>
+                </a:ln>
+                <a:solidFill>
+                  <a:srgbClr val="FFFFFF"/>
+                </a:solidFill>
+                <a:effectLst/>
+                <a:uLnTx/>
+                <a:uFillTx/>
+                <a:latin typeface="Palatino Linotype" panose="02040502050505030304" pitchFamily="18" charset="0"/>
+                <a:ea typeface="+mn-ea"/>
+                <a:cs typeface="+mn-cs"/>
+              </a:rPr>
+              <a:t>Markov decision process</a:t>
+            </a:r>
+            <a:endParaRPr kumimoji="0" lang="en-US" sz="3200" i="0" u="none" strike="noStrike" kern="1200" cap="none" spc="0" normalizeH="0" baseline="0" noProof="0" dirty="0">
+              <a:ln>
+                <a:noFill/>
+              </a:ln>
+              <a:solidFill>
+                <a:prstClr val="black"/>
+              </a:solidFill>
+              <a:effectLst/>
+              <a:uLnTx/>
+              <a:uFillTx/>
+              <a:latin typeface="Palatino Linotype" panose="02040502050505030304" pitchFamily="18" charset="0"/>
+              <a:ea typeface="+mn-ea"/>
+              <a:cs typeface="+mn-cs"/>
+            </a:endParaRPr>
+          </a:p>
+        </p:txBody>
+      </p:sp>
     </p:spTree>
     <p:extLst>
       <p:ext uri="{BB962C8B-B14F-4D97-AF65-F5344CB8AC3E}">
@@ -22768,92 +23705,6 @@
           </a:prstGeom>
         </p:spPr>
       </p:pic>
-      <p:sp>
-        <p:nvSpPr>
-          <p:cNvPr id="3" name="TextBox 2">
-            <a:extLst>
-              <a:ext uri="{FF2B5EF4-FFF2-40B4-BE49-F238E27FC236}">
-                <a16:creationId xmlns:a16="http://schemas.microsoft.com/office/drawing/2014/main" id="{FE4F237B-BAA4-07B9-78F4-A29825A24B73}"/>
-              </a:ext>
-            </a:extLst>
-          </p:cNvPr>
-          <p:cNvSpPr txBox="1"/>
-          <p:nvPr/>
-        </p:nvSpPr>
-        <p:spPr>
-          <a:xfrm>
-            <a:off x="351972" y="228146"/>
-            <a:ext cx="10512877" cy="584775"/>
-          </a:xfrm>
-          <a:prstGeom prst="rect">
-            <a:avLst/>
-          </a:prstGeom>
-          <a:noFill/>
-          <a:effectLst>
-            <a:outerShdw blurRad="50800" dist="38100" dir="2700000" algn="tl" rotWithShape="0">
-              <a:prstClr val="black">
-                <a:alpha val="40000"/>
-              </a:prstClr>
-            </a:outerShdw>
-          </a:effectLst>
-        </p:spPr>
-        <p:txBody>
-          <a:bodyPr wrap="square">
-            <a:spAutoFit/>
-          </a:bodyPr>
-          <a:lstStyle/>
-          <a:p>
-            <a:pPr marL="0" marR="0" lvl="0" indent="0" algn="l" defTabSz="914400" rtl="0" eaLnBrk="1" fontAlgn="auto" latinLnBrk="0" hangingPunct="1">
-              <a:lnSpc>
-                <a:spcPct val="100000"/>
-              </a:lnSpc>
-              <a:spcBef>
-                <a:spcPts val="0"/>
-              </a:spcBef>
-              <a:spcAft>
-                <a:spcPts val="0"/>
-              </a:spcAft>
-              <a:buClrTx/>
-              <a:buSzTx/>
-              <a:buFontTx/>
-              <a:buNone/>
-              <a:tabLst/>
-              <a:defRPr/>
-            </a:pPr>
-            <a:r>
-              <a:rPr kumimoji="0" lang="en-US" sz="3200" b="1" i="0" u="none" strike="noStrike" kern="1200" cap="none" spc="0" normalizeH="0" baseline="0" noProof="0" dirty="0">
-                <a:ln>
-                  <a:noFill/>
-                </a:ln>
-                <a:solidFill>
-                  <a:srgbClr val="FFFFFF"/>
-                </a:solidFill>
-                <a:effectLst/>
-                <a:uLnTx/>
-                <a:uFillTx/>
-                <a:latin typeface="Palatino Linotype" panose="02040502050505030304" pitchFamily="18" charset="0"/>
-                <a:ea typeface="+mn-ea"/>
-                <a:cs typeface="+mn-cs"/>
-              </a:rPr>
-              <a:t>Markov decision process (MDP)</a:t>
-            </a:r>
-            <a:endParaRPr kumimoji="0" lang="en-US" sz="3200" b="0" i="0" u="none" strike="noStrike" kern="1200" cap="none" spc="0" normalizeH="0" baseline="0" noProof="0" dirty="0">
-              <a:ln>
-                <a:noFill/>
-              </a:ln>
-              <a:solidFill>
-                <a:prstClr val="black"/>
-              </a:solidFill>
-              <a:effectLst/>
-              <a:uLnTx/>
-              <a:uFillTx/>
-              <a:latin typeface="Palatino Linotype" panose="02040502050505030304" pitchFamily="18" charset="0"/>
-              <a:ea typeface="+mn-ea"/>
-              <a:cs typeface="+mn-cs"/>
-            </a:endParaRPr>
-          </a:p>
-        </p:txBody>
-      </p:sp>
       <p:sp>
         <p:nvSpPr>
           <p:cNvPr id="2" name="Rectangle 1">
@@ -23315,6 +24166,143 @@
           </p:style>
         </p:cxnSp>
       </p:grpSp>
+      <p:sp>
+        <p:nvSpPr>
+          <p:cNvPr id="11" name="TextBox 10">
+            <a:extLst>
+              <a:ext uri="{FF2B5EF4-FFF2-40B4-BE49-F238E27FC236}">
+                <a16:creationId xmlns:a16="http://schemas.microsoft.com/office/drawing/2014/main" id="{B5491B55-004B-7981-C348-2BE1E1F7A931}"/>
+              </a:ext>
+            </a:extLst>
+          </p:cNvPr>
+          <p:cNvSpPr txBox="1"/>
+          <p:nvPr/>
+        </p:nvSpPr>
+        <p:spPr>
+          <a:xfrm>
+            <a:off x="351972" y="228146"/>
+            <a:ext cx="10512877" cy="584775"/>
+          </a:xfrm>
+          <a:prstGeom prst="rect">
+            <a:avLst/>
+          </a:prstGeom>
+          <a:noFill/>
+          <a:effectLst>
+            <a:outerShdw blurRad="50800" dist="38100" dir="2700000" algn="tl" rotWithShape="0">
+              <a:prstClr val="black">
+                <a:alpha val="40000"/>
+              </a:prstClr>
+            </a:outerShdw>
+          </a:effectLst>
+        </p:spPr>
+        <p:txBody>
+          <a:bodyPr wrap="square">
+            <a:spAutoFit/>
+          </a:bodyPr>
+          <a:lstStyle/>
+          <a:p>
+            <a:pPr marL="0" marR="0" lvl="0" indent="0" algn="l" defTabSz="914400" rtl="0" eaLnBrk="1" fontAlgn="auto" latinLnBrk="0" hangingPunct="1">
+              <a:lnSpc>
+                <a:spcPct val="100000"/>
+              </a:lnSpc>
+              <a:spcBef>
+                <a:spcPts val="0"/>
+              </a:spcBef>
+              <a:spcAft>
+                <a:spcPts val="0"/>
+              </a:spcAft>
+              <a:buClrTx/>
+              <a:buSzTx/>
+              <a:buFontTx/>
+              <a:buNone/>
+              <a:tabLst/>
+              <a:defRPr/>
+            </a:pPr>
+            <a:r>
+              <a:rPr kumimoji="0" lang="en-US" sz="3200" b="1" i="0" u="none" strike="noStrike" kern="1200" cap="none" spc="0" normalizeH="0" baseline="0" noProof="0" dirty="0">
+                <a:ln>
+                  <a:noFill/>
+                </a:ln>
+                <a:solidFill>
+                  <a:srgbClr val="FFFFFF"/>
+                </a:solidFill>
+                <a:effectLst/>
+                <a:uLnTx/>
+                <a:uFillTx/>
+                <a:latin typeface="Palatino Linotype" panose="02040502050505030304" pitchFamily="18" charset="0"/>
+                <a:ea typeface="+mn-ea"/>
+                <a:cs typeface="+mn-cs"/>
+              </a:rPr>
+              <a:t>MDP</a:t>
+            </a:r>
+            <a:r>
+              <a:rPr kumimoji="0" lang="en-US" sz="3200" i="0" u="none" strike="noStrike" kern="1200" cap="none" spc="0" normalizeH="0" baseline="0" noProof="0" dirty="0">
+                <a:ln>
+                  <a:noFill/>
+                </a:ln>
+                <a:solidFill>
+                  <a:srgbClr val="FFFFFF"/>
+                </a:solidFill>
+                <a:effectLst/>
+                <a:uLnTx/>
+                <a:uFillTx/>
+                <a:latin typeface="Palatino Linotype" panose="02040502050505030304" pitchFamily="18" charset="0"/>
+                <a:ea typeface="+mn-ea"/>
+                <a:cs typeface="+mn-cs"/>
+              </a:rPr>
+              <a:t>:</a:t>
+            </a:r>
+            <a:r>
+              <a:rPr kumimoji="0" lang="en-US" sz="3200" b="1" i="0" u="none" strike="noStrike" kern="1200" cap="none" spc="0" normalizeH="0" baseline="0" noProof="0" dirty="0">
+                <a:ln>
+                  <a:noFill/>
+                </a:ln>
+                <a:solidFill>
+                  <a:srgbClr val="FFFFFF"/>
+                </a:solidFill>
+                <a:effectLst/>
+                <a:uLnTx/>
+                <a:uFillTx/>
+                <a:latin typeface="Palatino Linotype" panose="02040502050505030304" pitchFamily="18" charset="0"/>
+                <a:ea typeface="+mn-ea"/>
+                <a:cs typeface="+mn-cs"/>
+              </a:rPr>
+              <a:t> </a:t>
+            </a:r>
+            <a:r>
+              <a:rPr kumimoji="0" lang="en-US" sz="3200" i="0" u="none" strike="noStrike" kern="1200" cap="none" spc="0" normalizeH="0" baseline="0" noProof="0" dirty="0">
+                <a:ln>
+                  <a:noFill/>
+                </a:ln>
+                <a:solidFill>
+                  <a:srgbClr val="FFFFFF"/>
+                </a:solidFill>
+                <a:effectLst/>
+                <a:uLnTx/>
+                <a:uFillTx/>
+                <a:latin typeface="Palatino Linotype" panose="02040502050505030304" pitchFamily="18" charset="0"/>
+                <a:ea typeface="+mn-ea"/>
+                <a:cs typeface="+mn-cs"/>
+              </a:rPr>
+              <a:t>Markov decision process</a:t>
+            </a:r>
+            <a:endParaRPr kumimoji="0" lang="en-US" sz="3200" i="0" u="none" strike="noStrike" kern="1200" cap="none" spc="0" normalizeH="0" baseline="0" noProof="0" dirty="0">
+              <a:ln>
+                <a:noFill/>
+              </a:ln>
+              <a:solidFill>
+                <a:prstClr val="black"/>
+              </a:solidFill>
+              <a:effectLst/>
+              <a:uLnTx/>
+              <a:uFillTx/>
+              <a:latin typeface="Palatino Linotype" panose="02040502050505030304" pitchFamily="18" charset="0"/>
+              <a:ea typeface="+mn-ea"/>
+              <a:cs typeface="+mn-cs"/>
+            </a:endParaRPr>
+          </a:p>
+        </p:txBody>
+      </p:sp>
     </p:spTree>
     <p:extLst>
       <p:ext uri="{BB962C8B-B14F-4D97-AF65-F5344CB8AC3E}">
@@ -23400,92 +24388,6 @@
           </a:prstGeom>
         </p:spPr>
       </p:pic>
-      <p:sp>
-        <p:nvSpPr>
-          <p:cNvPr id="3" name="TextBox 2">
-            <a:extLst>
-              <a:ext uri="{FF2B5EF4-FFF2-40B4-BE49-F238E27FC236}">
-                <a16:creationId xmlns:a16="http://schemas.microsoft.com/office/drawing/2014/main" id="{FE4F237B-BAA4-07B9-78F4-A29825A24B73}"/>
-              </a:ext>
-            </a:extLst>
-          </p:cNvPr>
-          <p:cNvSpPr txBox="1"/>
-          <p:nvPr/>
-        </p:nvSpPr>
-        <p:spPr>
-          <a:xfrm>
-            <a:off x="351972" y="228146"/>
-            <a:ext cx="10512877" cy="584775"/>
-          </a:xfrm>
-          <a:prstGeom prst="rect">
-            <a:avLst/>
-          </a:prstGeom>
-          <a:noFill/>
-          <a:effectLst>
-            <a:outerShdw blurRad="50800" dist="38100" dir="2700000" algn="tl" rotWithShape="0">
-              <a:prstClr val="black">
-                <a:alpha val="40000"/>
-              </a:prstClr>
-            </a:outerShdw>
-          </a:effectLst>
-        </p:spPr>
-        <p:txBody>
-          <a:bodyPr wrap="square">
-            <a:spAutoFit/>
-          </a:bodyPr>
-          <a:lstStyle/>
-          <a:p>
-            <a:pPr marL="0" marR="0" lvl="0" indent="0" algn="l" defTabSz="914400" rtl="0" eaLnBrk="1" fontAlgn="auto" latinLnBrk="0" hangingPunct="1">
-              <a:lnSpc>
-                <a:spcPct val="100000"/>
-              </a:lnSpc>
-              <a:spcBef>
-                <a:spcPts val="0"/>
-              </a:spcBef>
-              <a:spcAft>
-                <a:spcPts val="0"/>
-              </a:spcAft>
-              <a:buClrTx/>
-              <a:buSzTx/>
-              <a:buFontTx/>
-              <a:buNone/>
-              <a:tabLst/>
-              <a:defRPr/>
-            </a:pPr>
-            <a:r>
-              <a:rPr kumimoji="0" lang="en-US" sz="3200" b="1" i="0" u="none" strike="noStrike" kern="1200" cap="none" spc="0" normalizeH="0" baseline="0" noProof="0" dirty="0">
-                <a:ln>
-                  <a:noFill/>
-                </a:ln>
-                <a:solidFill>
-                  <a:srgbClr val="FFFFFF"/>
-                </a:solidFill>
-                <a:effectLst/>
-                <a:uLnTx/>
-                <a:uFillTx/>
-                <a:latin typeface="Palatino Linotype" panose="02040502050505030304" pitchFamily="18" charset="0"/>
-                <a:ea typeface="+mn-ea"/>
-                <a:cs typeface="+mn-cs"/>
-              </a:rPr>
-              <a:t>Markov decision process (MDP)</a:t>
-            </a:r>
-            <a:endParaRPr kumimoji="0" lang="en-US" sz="3200" b="0" i="0" u="none" strike="noStrike" kern="1200" cap="none" spc="0" normalizeH="0" baseline="0" noProof="0" dirty="0">
-              <a:ln>
-                <a:noFill/>
-              </a:ln>
-              <a:solidFill>
-                <a:prstClr val="black"/>
-              </a:solidFill>
-              <a:effectLst/>
-              <a:uLnTx/>
-              <a:uFillTx/>
-              <a:latin typeface="Palatino Linotype" panose="02040502050505030304" pitchFamily="18" charset="0"/>
-              <a:ea typeface="+mn-ea"/>
-              <a:cs typeface="+mn-cs"/>
-            </a:endParaRPr>
-          </a:p>
-        </p:txBody>
-      </p:sp>
       <p:sp>
         <p:nvSpPr>
           <p:cNvPr id="2" name="Rectangle 1">
@@ -24113,6 +25015,143 @@
           </p:style>
         </p:cxnSp>
       </p:grpSp>
+      <p:sp>
+        <p:nvSpPr>
+          <p:cNvPr id="19" name="TextBox 18">
+            <a:extLst>
+              <a:ext uri="{FF2B5EF4-FFF2-40B4-BE49-F238E27FC236}">
+                <a16:creationId xmlns:a16="http://schemas.microsoft.com/office/drawing/2014/main" id="{AA6E7F09-CB84-1F62-8789-4F7E6CA7D7EE}"/>
+              </a:ext>
+            </a:extLst>
+          </p:cNvPr>
+          <p:cNvSpPr txBox="1"/>
+          <p:nvPr/>
+        </p:nvSpPr>
+        <p:spPr>
+          <a:xfrm>
+            <a:off x="351972" y="228146"/>
+            <a:ext cx="10512877" cy="584775"/>
+          </a:xfrm>
+          <a:prstGeom prst="rect">
+            <a:avLst/>
+          </a:prstGeom>
+          <a:noFill/>
+          <a:effectLst>
+            <a:outerShdw blurRad="50800" dist="38100" dir="2700000" algn="tl" rotWithShape="0">
+              <a:prstClr val="black">
+                <a:alpha val="40000"/>
+              </a:prstClr>
+            </a:outerShdw>
+          </a:effectLst>
+        </p:spPr>
+        <p:txBody>
+          <a:bodyPr wrap="square">
+            <a:spAutoFit/>
+          </a:bodyPr>
+          <a:lstStyle/>
+          <a:p>
+            <a:pPr marL="0" marR="0" lvl="0" indent="0" algn="l" defTabSz="914400" rtl="0" eaLnBrk="1" fontAlgn="auto" latinLnBrk="0" hangingPunct="1">
+              <a:lnSpc>
+                <a:spcPct val="100000"/>
+              </a:lnSpc>
+              <a:spcBef>
+                <a:spcPts val="0"/>
+              </a:spcBef>
+              <a:spcAft>
+                <a:spcPts val="0"/>
+              </a:spcAft>
+              <a:buClrTx/>
+              <a:buSzTx/>
+              <a:buFontTx/>
+              <a:buNone/>
+              <a:tabLst/>
+              <a:defRPr/>
+            </a:pPr>
+            <a:r>
+              <a:rPr kumimoji="0" lang="en-US" sz="3200" b="1" i="0" u="none" strike="noStrike" kern="1200" cap="none" spc="0" normalizeH="0" baseline="0" noProof="0" dirty="0">
+                <a:ln>
+                  <a:noFill/>
+                </a:ln>
+                <a:solidFill>
+                  <a:srgbClr val="FFFFFF"/>
+                </a:solidFill>
+                <a:effectLst/>
+                <a:uLnTx/>
+                <a:uFillTx/>
+                <a:latin typeface="Palatino Linotype" panose="02040502050505030304" pitchFamily="18" charset="0"/>
+                <a:ea typeface="+mn-ea"/>
+                <a:cs typeface="+mn-cs"/>
+              </a:rPr>
+              <a:t>MDP</a:t>
+            </a:r>
+            <a:r>
+              <a:rPr kumimoji="0" lang="en-US" sz="3200" i="0" u="none" strike="noStrike" kern="1200" cap="none" spc="0" normalizeH="0" baseline="0" noProof="0" dirty="0">
+                <a:ln>
+                  <a:noFill/>
+                </a:ln>
+                <a:solidFill>
+                  <a:srgbClr val="FFFFFF"/>
+                </a:solidFill>
+                <a:effectLst/>
+                <a:uLnTx/>
+                <a:uFillTx/>
+                <a:latin typeface="Palatino Linotype" panose="02040502050505030304" pitchFamily="18" charset="0"/>
+                <a:ea typeface="+mn-ea"/>
+                <a:cs typeface="+mn-cs"/>
+              </a:rPr>
+              <a:t>:</a:t>
+            </a:r>
+            <a:r>
+              <a:rPr kumimoji="0" lang="en-US" sz="3200" b="1" i="0" u="none" strike="noStrike" kern="1200" cap="none" spc="0" normalizeH="0" baseline="0" noProof="0" dirty="0">
+                <a:ln>
+                  <a:noFill/>
+                </a:ln>
+                <a:solidFill>
+                  <a:srgbClr val="FFFFFF"/>
+                </a:solidFill>
+                <a:effectLst/>
+                <a:uLnTx/>
+                <a:uFillTx/>
+                <a:latin typeface="Palatino Linotype" panose="02040502050505030304" pitchFamily="18" charset="0"/>
+                <a:ea typeface="+mn-ea"/>
+                <a:cs typeface="+mn-cs"/>
+              </a:rPr>
+              <a:t> </a:t>
+            </a:r>
+            <a:r>
+              <a:rPr kumimoji="0" lang="en-US" sz="3200" i="0" u="none" strike="noStrike" kern="1200" cap="none" spc="0" normalizeH="0" baseline="0" noProof="0" dirty="0">
+                <a:ln>
+                  <a:noFill/>
+                </a:ln>
+                <a:solidFill>
+                  <a:srgbClr val="FFFFFF"/>
+                </a:solidFill>
+                <a:effectLst/>
+                <a:uLnTx/>
+                <a:uFillTx/>
+                <a:latin typeface="Palatino Linotype" panose="02040502050505030304" pitchFamily="18" charset="0"/>
+                <a:ea typeface="+mn-ea"/>
+                <a:cs typeface="+mn-cs"/>
+              </a:rPr>
+              <a:t>Markov decision process</a:t>
+            </a:r>
+            <a:endParaRPr kumimoji="0" lang="en-US" sz="3200" i="0" u="none" strike="noStrike" kern="1200" cap="none" spc="0" normalizeH="0" baseline="0" noProof="0" dirty="0">
+              <a:ln>
+                <a:noFill/>
+              </a:ln>
+              <a:solidFill>
+                <a:prstClr val="black"/>
+              </a:solidFill>
+              <a:effectLst/>
+              <a:uLnTx/>
+              <a:uFillTx/>
+              <a:latin typeface="Palatino Linotype" panose="02040502050505030304" pitchFamily="18" charset="0"/>
+              <a:ea typeface="+mn-ea"/>
+              <a:cs typeface="+mn-cs"/>
+            </a:endParaRPr>
+          </a:p>
+        </p:txBody>
+      </p:sp>
     </p:spTree>
     <p:extLst>
       <p:ext uri="{BB962C8B-B14F-4D97-AF65-F5344CB8AC3E}">
@@ -24281,92 +25320,6 @@
           </a:prstGeom>
         </p:spPr>
       </p:pic>
-      <p:sp>
-        <p:nvSpPr>
-          <p:cNvPr id="3" name="TextBox 2">
-            <a:extLst>
-              <a:ext uri="{FF2B5EF4-FFF2-40B4-BE49-F238E27FC236}">
-                <a16:creationId xmlns:a16="http://schemas.microsoft.com/office/drawing/2014/main" id="{FE4F237B-BAA4-07B9-78F4-A29825A24B73}"/>
-              </a:ext>
-            </a:extLst>
-          </p:cNvPr>
-          <p:cNvSpPr txBox="1"/>
-          <p:nvPr/>
-        </p:nvSpPr>
-        <p:spPr>
-          <a:xfrm>
-            <a:off x="351972" y="228146"/>
-            <a:ext cx="10512877" cy="584775"/>
-          </a:xfrm>
-          <a:prstGeom prst="rect">
-            <a:avLst/>
-          </a:prstGeom>
-          <a:noFill/>
-          <a:effectLst>
-            <a:outerShdw blurRad="50800" dist="38100" dir="2700000" algn="tl" rotWithShape="0">
-              <a:prstClr val="black">
-                <a:alpha val="40000"/>
-              </a:prstClr>
-            </a:outerShdw>
-          </a:effectLst>
-        </p:spPr>
-        <p:txBody>
-          <a:bodyPr wrap="square">
-            <a:spAutoFit/>
-          </a:bodyPr>
-          <a:lstStyle/>
-          <a:p>
-            <a:pPr marL="0" marR="0" lvl="0" indent="0" algn="l" defTabSz="914400" rtl="0" eaLnBrk="1" fontAlgn="auto" latinLnBrk="0" hangingPunct="1">
-              <a:lnSpc>
-                <a:spcPct val="100000"/>
-              </a:lnSpc>
-              <a:spcBef>
-                <a:spcPts val="0"/>
-              </a:spcBef>
-              <a:spcAft>
-                <a:spcPts val="0"/>
-              </a:spcAft>
-              <a:buClrTx/>
-              <a:buSzTx/>
-              <a:buFontTx/>
-              <a:buNone/>
-              <a:tabLst/>
-              <a:defRPr/>
-            </a:pPr>
-            <a:r>
-              <a:rPr kumimoji="0" lang="en-US" sz="3200" b="1" i="0" u="none" strike="noStrike" kern="1200" cap="none" spc="0" normalizeH="0" baseline="0" noProof="0" dirty="0">
-                <a:ln>
-                  <a:noFill/>
-                </a:ln>
-                <a:solidFill>
-                  <a:srgbClr val="FFFFFF"/>
-                </a:solidFill>
-                <a:effectLst/>
-                <a:uLnTx/>
-                <a:uFillTx/>
-                <a:latin typeface="Palatino Linotype" panose="02040502050505030304" pitchFamily="18" charset="0"/>
-                <a:ea typeface="+mn-ea"/>
-                <a:cs typeface="+mn-cs"/>
-              </a:rPr>
-              <a:t>Markov decision process (MDP)</a:t>
-            </a:r>
-            <a:endParaRPr kumimoji="0" lang="en-US" sz="3200" b="0" i="0" u="none" strike="noStrike" kern="1200" cap="none" spc="0" normalizeH="0" baseline="0" noProof="0" dirty="0">
-              <a:ln>
-                <a:noFill/>
-              </a:ln>
-              <a:solidFill>
-                <a:prstClr val="black"/>
-              </a:solidFill>
-              <a:effectLst/>
-              <a:uLnTx/>
-              <a:uFillTx/>
-              <a:latin typeface="Palatino Linotype" panose="02040502050505030304" pitchFamily="18" charset="0"/>
-              <a:ea typeface="+mn-ea"/>
-              <a:cs typeface="+mn-cs"/>
-            </a:endParaRPr>
-          </a:p>
-        </p:txBody>
-      </p:sp>
       <p:grpSp>
         <p:nvGrpSpPr>
           <p:cNvPr id="28" name="Group 27">
@@ -25418,6 +26371,143 @@
           </p:style>
         </p:cxnSp>
       </p:grpSp>
+      <p:sp>
+        <p:nvSpPr>
+          <p:cNvPr id="2" name="TextBox 1">
+            <a:extLst>
+              <a:ext uri="{FF2B5EF4-FFF2-40B4-BE49-F238E27FC236}">
+                <a16:creationId xmlns:a16="http://schemas.microsoft.com/office/drawing/2014/main" id="{DABA59E4-AB3E-E705-1432-B83B9073B1D3}"/>
+              </a:ext>
+            </a:extLst>
+          </p:cNvPr>
+          <p:cNvSpPr txBox="1"/>
+          <p:nvPr/>
+        </p:nvSpPr>
+        <p:spPr>
+          <a:xfrm>
+            <a:off x="351972" y="228146"/>
+            <a:ext cx="10512877" cy="584775"/>
+          </a:xfrm>
+          <a:prstGeom prst="rect">
+            <a:avLst/>
+          </a:prstGeom>
+          <a:noFill/>
+          <a:effectLst>
+            <a:outerShdw blurRad="50800" dist="38100" dir="2700000" algn="tl" rotWithShape="0">
+              <a:prstClr val="black">
+                <a:alpha val="40000"/>
+              </a:prstClr>
+            </a:outerShdw>
+          </a:effectLst>
+        </p:spPr>
+        <p:txBody>
+          <a:bodyPr wrap="square">
+            <a:spAutoFit/>
+          </a:bodyPr>
+          <a:lstStyle/>
+          <a:p>
+            <a:pPr marL="0" marR="0" lvl="0" indent="0" algn="l" defTabSz="914400" rtl="0" eaLnBrk="1" fontAlgn="auto" latinLnBrk="0" hangingPunct="1">
+              <a:lnSpc>
+                <a:spcPct val="100000"/>
+              </a:lnSpc>
+              <a:spcBef>
+                <a:spcPts val="0"/>
+              </a:spcBef>
+              <a:spcAft>
+                <a:spcPts val="0"/>
+              </a:spcAft>
+              <a:buClrTx/>
+              <a:buSzTx/>
+              <a:buFontTx/>
+              <a:buNone/>
+              <a:tabLst/>
+              <a:defRPr/>
+            </a:pPr>
+            <a:r>
+              <a:rPr kumimoji="0" lang="en-US" sz="3200" b="1" i="0" u="none" strike="noStrike" kern="1200" cap="none" spc="0" normalizeH="0" baseline="0" noProof="0" dirty="0">
+                <a:ln>
+                  <a:noFill/>
+                </a:ln>
+                <a:solidFill>
+                  <a:srgbClr val="FFFFFF"/>
+                </a:solidFill>
+                <a:effectLst/>
+                <a:uLnTx/>
+                <a:uFillTx/>
+                <a:latin typeface="Palatino Linotype" panose="02040502050505030304" pitchFamily="18" charset="0"/>
+                <a:ea typeface="+mn-ea"/>
+                <a:cs typeface="+mn-cs"/>
+              </a:rPr>
+              <a:t>MDP</a:t>
+            </a:r>
+            <a:r>
+              <a:rPr kumimoji="0" lang="en-US" sz="3200" i="0" u="none" strike="noStrike" kern="1200" cap="none" spc="0" normalizeH="0" baseline="0" noProof="0" dirty="0">
+                <a:ln>
+                  <a:noFill/>
+                </a:ln>
+                <a:solidFill>
+                  <a:srgbClr val="FFFFFF"/>
+                </a:solidFill>
+                <a:effectLst/>
+                <a:uLnTx/>
+                <a:uFillTx/>
+                <a:latin typeface="Palatino Linotype" panose="02040502050505030304" pitchFamily="18" charset="0"/>
+                <a:ea typeface="+mn-ea"/>
+                <a:cs typeface="+mn-cs"/>
+              </a:rPr>
+              <a:t>:</a:t>
+            </a:r>
+            <a:r>
+              <a:rPr kumimoji="0" lang="en-US" sz="3200" b="1" i="0" u="none" strike="noStrike" kern="1200" cap="none" spc="0" normalizeH="0" baseline="0" noProof="0" dirty="0">
+                <a:ln>
+                  <a:noFill/>
+                </a:ln>
+                <a:solidFill>
+                  <a:srgbClr val="FFFFFF"/>
+                </a:solidFill>
+                <a:effectLst/>
+                <a:uLnTx/>
+                <a:uFillTx/>
+                <a:latin typeface="Palatino Linotype" panose="02040502050505030304" pitchFamily="18" charset="0"/>
+                <a:ea typeface="+mn-ea"/>
+                <a:cs typeface="+mn-cs"/>
+              </a:rPr>
+              <a:t> </a:t>
+            </a:r>
+            <a:r>
+              <a:rPr kumimoji="0" lang="en-US" sz="3200" i="0" u="none" strike="noStrike" kern="1200" cap="none" spc="0" normalizeH="0" baseline="0" noProof="0" dirty="0">
+                <a:ln>
+                  <a:noFill/>
+                </a:ln>
+                <a:solidFill>
+                  <a:srgbClr val="FFFFFF"/>
+                </a:solidFill>
+                <a:effectLst/>
+                <a:uLnTx/>
+                <a:uFillTx/>
+                <a:latin typeface="Palatino Linotype" panose="02040502050505030304" pitchFamily="18" charset="0"/>
+                <a:ea typeface="+mn-ea"/>
+                <a:cs typeface="+mn-cs"/>
+              </a:rPr>
+              <a:t>Markov decision process</a:t>
+            </a:r>
+            <a:endParaRPr kumimoji="0" lang="en-US" sz="3200" i="0" u="none" strike="noStrike" kern="1200" cap="none" spc="0" normalizeH="0" baseline="0" noProof="0" dirty="0">
+              <a:ln>
+                <a:noFill/>
+              </a:ln>
+              <a:solidFill>
+                <a:prstClr val="black"/>
+              </a:solidFill>
+              <a:effectLst/>
+              <a:uLnTx/>
+              <a:uFillTx/>
+              <a:latin typeface="Palatino Linotype" panose="02040502050505030304" pitchFamily="18" charset="0"/>
+              <a:ea typeface="+mn-ea"/>
+              <a:cs typeface="+mn-cs"/>
+            </a:endParaRPr>
+          </a:p>
+        </p:txBody>
+      </p:sp>
     </p:spTree>
     <p:extLst>
       <p:ext uri="{BB962C8B-B14F-4D97-AF65-F5344CB8AC3E}">
@@ -25723,7 +26813,41 @@
                 <a:ea typeface="+mn-ea"/>
                 <a:cs typeface="+mn-cs"/>
               </a:rPr>
-              <a:t>Real-world problem: </a:t>
+              <a:t>Real-world problem</a:t>
+            </a:r>
+            <a:r>
+              <a:rPr kumimoji="0" lang="en-US" sz="3200" i="0" u="none" strike="noStrike" kern="1200" cap="none" spc="0" normalizeH="0" baseline="0" noProof="0" dirty="0">
+                <a:ln>
+                  <a:noFill/>
+                </a:ln>
+                <a:solidFill>
+                  <a:srgbClr val="FFFFFF"/>
+                </a:solidFill>
+                <a:effectLst/>
+                <a:uLnTx/>
+                <a:uFillTx/>
+                <a:latin typeface="Palatino Linotype" panose="02040502050505030304" pitchFamily="18" charset="0"/>
+                <a:ea typeface="+mn-ea"/>
+                <a:cs typeface="+mn-cs"/>
+              </a:rPr>
+              <a:t>:</a:t>
+            </a:r>
+            <a:r>
+              <a:rPr kumimoji="0" lang="en-US" sz="3200" b="1" i="0" u="none" strike="noStrike" kern="1200" cap="none" spc="0" normalizeH="0" baseline="0" noProof="0" dirty="0">
+                <a:ln>
+                  <a:noFill/>
+                </a:ln>
+                <a:solidFill>
+                  <a:srgbClr val="FFFFFF"/>
+                </a:solidFill>
+                <a:effectLst/>
+                <a:uLnTx/>
+                <a:uFillTx/>
+                <a:latin typeface="Palatino Linotype" panose="02040502050505030304" pitchFamily="18" charset="0"/>
+                <a:ea typeface="+mn-ea"/>
+                <a:cs typeface="+mn-cs"/>
+              </a:rPr>
+              <a:t> </a:t>
             </a:r>
             <a:r>
               <a:rPr kumimoji="0" lang="en-US" sz="3200" b="0" i="0" u="none" strike="noStrike" kern="1200" cap="none" spc="0" normalizeH="0" baseline="0" noProof="0" dirty="0">
@@ -26323,7 +27447,41 @@
                 <a:ea typeface="+mn-ea"/>
                 <a:cs typeface="+mn-cs"/>
               </a:rPr>
-              <a:t>Real-world problem: </a:t>
+              <a:t>Real-world problem</a:t>
+            </a:r>
+            <a:r>
+              <a:rPr kumimoji="0" lang="en-US" sz="3200" i="0" u="none" strike="noStrike" kern="1200" cap="none" spc="0" normalizeH="0" baseline="0" noProof="0" dirty="0">
+                <a:ln>
+                  <a:noFill/>
+                </a:ln>
+                <a:solidFill>
+                  <a:srgbClr val="FFFFFF"/>
+                </a:solidFill>
+                <a:effectLst/>
+                <a:uLnTx/>
+                <a:uFillTx/>
+                <a:latin typeface="Palatino Linotype" panose="02040502050505030304" pitchFamily="18" charset="0"/>
+                <a:ea typeface="+mn-ea"/>
+                <a:cs typeface="+mn-cs"/>
+              </a:rPr>
+              <a:t>:</a:t>
+            </a:r>
+            <a:r>
+              <a:rPr kumimoji="0" lang="en-US" sz="3200" b="1" i="0" u="none" strike="noStrike" kern="1200" cap="none" spc="0" normalizeH="0" baseline="0" noProof="0" dirty="0">
+                <a:ln>
+                  <a:noFill/>
+                </a:ln>
+                <a:solidFill>
+                  <a:srgbClr val="FFFFFF"/>
+                </a:solidFill>
+                <a:effectLst/>
+                <a:uLnTx/>
+                <a:uFillTx/>
+                <a:latin typeface="Palatino Linotype" panose="02040502050505030304" pitchFamily="18" charset="0"/>
+                <a:ea typeface="+mn-ea"/>
+                <a:cs typeface="+mn-cs"/>
+              </a:rPr>
+              <a:t> </a:t>
             </a:r>
             <a:r>
               <a:rPr kumimoji="0" lang="en-US" sz="3200" b="0" i="0" u="none" strike="noStrike" kern="1200" cap="none" spc="0" normalizeH="0" baseline="0" noProof="0" dirty="0">
@@ -26769,6 +27927,91 @@
           </p:style>
         </p:cxnSp>
       </p:grpSp>
+      <p:sp>
+        <p:nvSpPr>
+          <p:cNvPr id="9" name="TextBox 8">
+            <a:extLst>
+              <a:ext uri="{FF2B5EF4-FFF2-40B4-BE49-F238E27FC236}">
+                <a16:creationId xmlns:a16="http://schemas.microsoft.com/office/drawing/2014/main" id="{879686DA-6D73-217F-6B8D-14E75C942C6E}"/>
+              </a:ext>
+            </a:extLst>
+          </p:cNvPr>
+          <p:cNvSpPr txBox="1"/>
+          <p:nvPr/>
+        </p:nvSpPr>
+        <p:spPr>
+          <a:xfrm>
+            <a:off x="351972" y="-686711"/>
+            <a:ext cx="11268528" cy="584775"/>
+          </a:xfrm>
+          <a:prstGeom prst="rect">
+            <a:avLst/>
+          </a:prstGeom>
+          <a:noFill/>
+          <a:effectLst>
+            <a:outerShdw blurRad="50800" dist="38100" dir="2700000" algn="tl" rotWithShape="0">
+              <a:prstClr val="black">
+                <a:alpha val="40000"/>
+              </a:prstClr>
+            </a:outerShdw>
+          </a:effectLst>
+        </p:spPr>
+        <p:txBody>
+          <a:bodyPr wrap="square">
+            <a:spAutoFit/>
+          </a:bodyPr>
+          <a:lstStyle/>
+          <a:p>
+            <a:pPr rtl="0">
+              <a:spcBef>
+                <a:spcPts val="0"/>
+              </a:spcBef>
+              <a:spcAft>
+                <a:spcPts val="0"/>
+              </a:spcAft>
+            </a:pPr>
+            <a:r>
+              <a:rPr lang="en-US" sz="3200" b="1" i="0" u="none" strike="noStrike" dirty="0">
+                <a:solidFill>
+                  <a:srgbClr val="FFFFFF"/>
+                </a:solidFill>
+                <a:latin typeface="Palatino Linotype" panose="02040502050505030304" pitchFamily="18" charset="0"/>
+              </a:rPr>
+              <a:t>POMDP</a:t>
+            </a:r>
+            <a:r>
+              <a:rPr lang="en-US" sz="3200" i="0" u="none" strike="noStrike" dirty="0">
+                <a:solidFill>
+                  <a:srgbClr val="FFFFFF"/>
+                </a:solidFill>
+                <a:latin typeface="Palatino Linotype" panose="02040502050505030304" pitchFamily="18" charset="0"/>
+              </a:rPr>
+              <a:t>:</a:t>
+            </a:r>
+            <a:r>
+              <a:rPr lang="en-US" sz="3200" b="1" i="0" u="none" strike="noStrike" dirty="0">
+                <a:solidFill>
+                  <a:srgbClr val="FFFFFF"/>
+                </a:solidFill>
+                <a:latin typeface="Palatino Linotype" panose="02040502050505030304" pitchFamily="18" charset="0"/>
+              </a:rPr>
+              <a:t> </a:t>
+            </a:r>
+            <a:r>
+              <a:rPr lang="en-US" sz="3200" i="0" u="none" strike="noStrike" dirty="0">
+                <a:solidFill>
+                  <a:srgbClr val="FFFFFF"/>
+                </a:solidFill>
+                <a:latin typeface="Palatino Linotype" panose="02040502050505030304" pitchFamily="18" charset="0"/>
+              </a:rPr>
+              <a:t>Partially observable Markov decision process</a:t>
+            </a:r>
+            <a:endParaRPr lang="en-US" sz="3200" dirty="0">
+              <a:latin typeface="Palatino Linotype" panose="02040502050505030304" pitchFamily="18" charset="0"/>
+            </a:endParaRPr>
+          </a:p>
+        </p:txBody>
+      </p:sp>
     </p:spTree>
     <p:extLst>
       <p:ext uri="{BB962C8B-B14F-4D97-AF65-F5344CB8AC3E}">

</xml_diff>

<commit_message>
Slight adjustment to right-hand lane markers
</commit_message>
<xml_diff>
--- a/slides/MDPs to POMDPs.pptx
+++ b/slides/MDPs to POMDPs.pptx
@@ -15,12 +15,12 @@
     <p:sldId id="518" r:id="rId6"/>
     <p:sldId id="541" r:id="rId7"/>
     <p:sldId id="540" r:id="rId8"/>
-    <p:sldId id="542" r:id="rId9"/>
-    <p:sldId id="543" r:id="rId10"/>
-    <p:sldId id="544" r:id="rId11"/>
-    <p:sldId id="545" r:id="rId12"/>
-    <p:sldId id="546" r:id="rId13"/>
-    <p:sldId id="547" r:id="rId14"/>
+    <p:sldId id="408" r:id="rId9"/>
+    <p:sldId id="410" r:id="rId10"/>
+    <p:sldId id="381" r:id="rId11"/>
+    <p:sldId id="401" r:id="rId12"/>
+    <p:sldId id="402" r:id="rId13"/>
+    <p:sldId id="403" r:id="rId14"/>
     <p:sldId id="548" r:id="rId15"/>
     <p:sldId id="485" r:id="rId16"/>
     <p:sldId id="486" r:id="rId17"/>
@@ -240,7 +240,7 @@
           <a:p>
             <a:fld id="{C15D5F90-0918-4142-9ABA-85B04AA6C1A0}" type="datetimeFigureOut">
               <a:rPr lang="en-US" smtClean="0"/>
-              <a:t>11/15/2023</a:t>
+              <a:t>11/16/2023</a:t>
             </a:fld>
             <a:endParaRPr lang="en-US"/>
           </a:p>
@@ -4092,7 +4092,7 @@
           <a:p>
             <a:fld id="{846CE7D5-CF57-46EF-B807-FDD0502418D4}" type="datetimeFigureOut">
               <a:rPr lang="en-US" smtClean="0"/>
-              <a:t>11/15/2023</a:t>
+              <a:t>11/16/2023</a:t>
             </a:fld>
             <a:endParaRPr lang="en-US"/>
           </a:p>
@@ -4260,7 +4260,7 @@
           <a:p>
             <a:fld id="{846CE7D5-CF57-46EF-B807-FDD0502418D4}" type="datetimeFigureOut">
               <a:rPr lang="en-US" smtClean="0"/>
-              <a:t>11/15/2023</a:t>
+              <a:t>11/16/2023</a:t>
             </a:fld>
             <a:endParaRPr lang="en-US"/>
           </a:p>
@@ -4438,7 +4438,7 @@
           <a:p>
             <a:fld id="{846CE7D5-CF57-46EF-B807-FDD0502418D4}" type="datetimeFigureOut">
               <a:rPr lang="en-US" smtClean="0"/>
-              <a:t>11/15/2023</a:t>
+              <a:t>11/16/2023</a:t>
             </a:fld>
             <a:endParaRPr lang="en-US"/>
           </a:p>
@@ -4606,7 +4606,7 @@
           <a:p>
             <a:fld id="{846CE7D5-CF57-46EF-B807-FDD0502418D4}" type="datetimeFigureOut">
               <a:rPr lang="en-US" smtClean="0"/>
-              <a:t>11/15/2023</a:t>
+              <a:t>11/16/2023</a:t>
             </a:fld>
             <a:endParaRPr lang="en-US"/>
           </a:p>
@@ -4851,7 +4851,7 @@
           <a:p>
             <a:fld id="{846CE7D5-CF57-46EF-B807-FDD0502418D4}" type="datetimeFigureOut">
               <a:rPr lang="en-US" smtClean="0"/>
-              <a:t>11/15/2023</a:t>
+              <a:t>11/16/2023</a:t>
             </a:fld>
             <a:endParaRPr lang="en-US"/>
           </a:p>
@@ -5080,7 +5080,7 @@
           <a:p>
             <a:fld id="{846CE7D5-CF57-46EF-B807-FDD0502418D4}" type="datetimeFigureOut">
               <a:rPr lang="en-US" smtClean="0"/>
-              <a:t>11/15/2023</a:t>
+              <a:t>11/16/2023</a:t>
             </a:fld>
             <a:endParaRPr lang="en-US"/>
           </a:p>
@@ -5444,7 +5444,7 @@
           <a:p>
             <a:fld id="{846CE7D5-CF57-46EF-B807-FDD0502418D4}" type="datetimeFigureOut">
               <a:rPr lang="en-US" smtClean="0"/>
-              <a:t>11/15/2023</a:t>
+              <a:t>11/16/2023</a:t>
             </a:fld>
             <a:endParaRPr lang="en-US"/>
           </a:p>
@@ -5561,7 +5561,7 @@
           <a:p>
             <a:fld id="{846CE7D5-CF57-46EF-B807-FDD0502418D4}" type="datetimeFigureOut">
               <a:rPr lang="en-US" smtClean="0"/>
-              <a:t>11/15/2023</a:t>
+              <a:t>11/16/2023</a:t>
             </a:fld>
             <a:endParaRPr lang="en-US"/>
           </a:p>
@@ -5656,7 +5656,7 @@
           <a:p>
             <a:fld id="{846CE7D5-CF57-46EF-B807-FDD0502418D4}" type="datetimeFigureOut">
               <a:rPr lang="en-US" smtClean="0"/>
-              <a:t>11/15/2023</a:t>
+              <a:t>11/16/2023</a:t>
             </a:fld>
             <a:endParaRPr lang="en-US"/>
           </a:p>
@@ -5931,7 +5931,7 @@
           <a:p>
             <a:fld id="{846CE7D5-CF57-46EF-B807-FDD0502418D4}" type="datetimeFigureOut">
               <a:rPr lang="en-US" smtClean="0"/>
-              <a:t>11/15/2023</a:t>
+              <a:t>11/16/2023</a:t>
             </a:fld>
             <a:endParaRPr lang="en-US"/>
           </a:p>
@@ -6186,7 +6186,7 @@
           <a:p>
             <a:fld id="{846CE7D5-CF57-46EF-B807-FDD0502418D4}" type="datetimeFigureOut">
               <a:rPr lang="en-US" smtClean="0"/>
-              <a:t>11/15/2023</a:t>
+              <a:t>11/16/2023</a:t>
             </a:fld>
             <a:endParaRPr lang="en-US"/>
           </a:p>
@@ -6397,7 +6397,7 @@
           <a:p>
             <a:fld id="{846CE7D5-CF57-46EF-B807-FDD0502418D4}" type="datetimeFigureOut">
               <a:rPr lang="en-US" smtClean="0"/>
-              <a:t>11/15/2023</a:t>
+              <a:t>11/16/2023</a:t>
             </a:fld>
             <a:endParaRPr lang="en-US"/>
           </a:p>
@@ -8630,10 +8630,10 @@
       </p:grpSp>
       <p:grpSp>
         <p:nvGrpSpPr>
-          <p:cNvPr id="25" name="Group 24">
+          <p:cNvPr id="28" name="Group 27">
             <a:extLst>
               <a:ext uri="{FF2B5EF4-FFF2-40B4-BE49-F238E27FC236}">
-                <a16:creationId xmlns:a16="http://schemas.microsoft.com/office/drawing/2014/main" id="{C04BAB1C-40A7-51C6-19C0-882F9479BD2D}"/>
+                <a16:creationId xmlns:a16="http://schemas.microsoft.com/office/drawing/2014/main" id="{C78B9296-B563-7C51-D3C6-96FBB4CD4377}"/>
               </a:ext>
             </a:extLst>
           </p:cNvPr>
@@ -8642,7 +8642,7 @@
         </p:nvGrpSpPr>
         <p:grpSpPr>
           <a:xfrm>
-            <a:off x="1294350" y="2433816"/>
+            <a:off x="1277683" y="2433816"/>
             <a:ext cx="28352" cy="2823398"/>
             <a:chOff x="1995377" y="2433816"/>
             <a:chExt cx="28352" cy="2823398"/>
@@ -8650,10 +8650,10 @@
         </p:grpSpPr>
         <p:cxnSp>
           <p:nvCxnSpPr>
-            <p:cNvPr id="26" name="Straight Connector 25">
+            <p:cNvPr id="29" name="Straight Connector 28">
               <a:extLst>
                 <a:ext uri="{FF2B5EF4-FFF2-40B4-BE49-F238E27FC236}">
-                  <a16:creationId xmlns:a16="http://schemas.microsoft.com/office/drawing/2014/main" id="{1107DAD2-F831-410C-30AB-21A007EA24D0}"/>
+                  <a16:creationId xmlns:a16="http://schemas.microsoft.com/office/drawing/2014/main" id="{A45A28B2-E05D-961E-6B98-789851820C46}"/>
                 </a:ext>
               </a:extLst>
             </p:cNvPr>
@@ -8693,10 +8693,10 @@
         </p:cxnSp>
         <p:cxnSp>
           <p:nvCxnSpPr>
-            <p:cNvPr id="27" name="Straight Connector 26">
+            <p:cNvPr id="30" name="Straight Connector 29">
               <a:extLst>
                 <a:ext uri="{FF2B5EF4-FFF2-40B4-BE49-F238E27FC236}">
-                  <a16:creationId xmlns:a16="http://schemas.microsoft.com/office/drawing/2014/main" id="{EC813DE6-5B31-2FF6-4791-151CDCFF3E4C}"/>
+                  <a16:creationId xmlns:a16="http://schemas.microsoft.com/office/drawing/2014/main" id="{A5EE0E9D-06C9-1208-A7D9-3A9E3E2A781E}"/>
                 </a:ext>
               </a:extLst>
             </p:cNvPr>
@@ -8738,7 +8738,7 @@
     </p:spTree>
     <p:extLst>
       <p:ext uri="{BB962C8B-B14F-4D97-AF65-F5344CB8AC3E}">
-        <p14:creationId xmlns:p14="http://schemas.microsoft.com/office/powerpoint/2010/main" val="3393095028"/>
+        <p14:creationId xmlns:p14="http://schemas.microsoft.com/office/powerpoint/2010/main" val="286194014"/>
       </p:ext>
     </p:extLst>
   </p:cSld>
@@ -9466,113 +9466,6 @@
           </p:style>
         </p:cxnSp>
       </p:grpSp>
-      <p:grpSp>
-        <p:nvGrpSpPr>
-          <p:cNvPr id="10" name="Group 9">
-            <a:extLst>
-              <a:ext uri="{FF2B5EF4-FFF2-40B4-BE49-F238E27FC236}">
-                <a16:creationId xmlns:a16="http://schemas.microsoft.com/office/drawing/2014/main" id="{BD361C45-BE38-BEEB-31F2-A0CFBBDFE58A}"/>
-              </a:ext>
-            </a:extLst>
-          </p:cNvPr>
-          <p:cNvGrpSpPr/>
-          <p:nvPr/>
-        </p:nvGrpSpPr>
-        <p:grpSpPr>
-          <a:xfrm>
-            <a:off x="1294350" y="2433816"/>
-            <a:ext cx="28352" cy="2823398"/>
-            <a:chOff x="1995377" y="2433816"/>
-            <a:chExt cx="28352" cy="2823398"/>
-          </a:xfrm>
-        </p:grpSpPr>
-        <p:cxnSp>
-          <p:nvCxnSpPr>
-            <p:cNvPr id="16" name="Straight Connector 15">
-              <a:extLst>
-                <a:ext uri="{FF2B5EF4-FFF2-40B4-BE49-F238E27FC236}">
-                  <a16:creationId xmlns:a16="http://schemas.microsoft.com/office/drawing/2014/main" id="{DC60BB58-9585-471B-A1DC-7FC54AEE3FAB}"/>
-                </a:ext>
-              </a:extLst>
-            </p:cNvPr>
-            <p:cNvCxnSpPr>
-              <a:cxnSpLocks/>
-            </p:cNvCxnSpPr>
-            <p:nvPr/>
-          </p:nvCxnSpPr>
-          <p:spPr>
-            <a:xfrm>
-              <a:off x="2023729" y="2433817"/>
-              <a:ext cx="0" cy="2823397"/>
-            </a:xfrm>
-            <a:prstGeom prst="line">
-              <a:avLst/>
-            </a:prstGeom>
-            <a:ln>
-              <a:solidFill>
-                <a:schemeClr val="bg1"/>
-              </a:solidFill>
-            </a:ln>
-          </p:spPr>
-          <p:style>
-            <a:lnRef idx="1">
-              <a:schemeClr val="accent1"/>
-            </a:lnRef>
-            <a:fillRef idx="0">
-              <a:schemeClr val="accent1"/>
-            </a:fillRef>
-            <a:effectRef idx="0">
-              <a:schemeClr val="accent1"/>
-            </a:effectRef>
-            <a:fontRef idx="minor">
-              <a:schemeClr val="tx1"/>
-            </a:fontRef>
-          </p:style>
-        </p:cxnSp>
-        <p:cxnSp>
-          <p:nvCxnSpPr>
-            <p:cNvPr id="17" name="Straight Connector 16">
-              <a:extLst>
-                <a:ext uri="{FF2B5EF4-FFF2-40B4-BE49-F238E27FC236}">
-                  <a16:creationId xmlns:a16="http://schemas.microsoft.com/office/drawing/2014/main" id="{BB94FE23-B904-6C8C-8798-2278A15C5F86}"/>
-                </a:ext>
-              </a:extLst>
-            </p:cNvPr>
-            <p:cNvCxnSpPr>
-              <a:cxnSpLocks/>
-            </p:cNvCxnSpPr>
-            <p:nvPr/>
-          </p:nvCxnSpPr>
-          <p:spPr>
-            <a:xfrm>
-              <a:off x="1995377" y="2433816"/>
-              <a:ext cx="0" cy="2823397"/>
-            </a:xfrm>
-            <a:prstGeom prst="line">
-              <a:avLst/>
-            </a:prstGeom>
-            <a:ln>
-              <a:solidFill>
-                <a:schemeClr val="bg1"/>
-              </a:solidFill>
-            </a:ln>
-          </p:spPr>
-          <p:style>
-            <a:lnRef idx="1">
-              <a:schemeClr val="accent1"/>
-            </a:lnRef>
-            <a:fillRef idx="0">
-              <a:schemeClr val="accent1"/>
-            </a:fillRef>
-            <a:effectRef idx="0">
-              <a:schemeClr val="accent1"/>
-            </a:effectRef>
-            <a:fontRef idx="minor">
-              <a:schemeClr val="tx1"/>
-            </a:fontRef>
-          </p:style>
-        </p:cxnSp>
-      </p:grpSp>
       <p:pic>
         <p:nvPicPr>
           <p:cNvPr id="19" name="Picture 18" descr="A diagram of a mathematical process&#10;&#10;Description automatically generated with medium confidence">
@@ -9603,10 +9496,117 @@
           </a:prstGeom>
         </p:spPr>
       </p:pic>
+      <p:grpSp>
+        <p:nvGrpSpPr>
+          <p:cNvPr id="20" name="Group 19">
+            <a:extLst>
+              <a:ext uri="{FF2B5EF4-FFF2-40B4-BE49-F238E27FC236}">
+                <a16:creationId xmlns:a16="http://schemas.microsoft.com/office/drawing/2014/main" id="{9ED351AB-9BD4-0476-F8F7-E65FE211FD1D}"/>
+              </a:ext>
+            </a:extLst>
+          </p:cNvPr>
+          <p:cNvGrpSpPr/>
+          <p:nvPr/>
+        </p:nvGrpSpPr>
+        <p:grpSpPr>
+          <a:xfrm>
+            <a:off x="1277683" y="2433816"/>
+            <a:ext cx="28352" cy="2823398"/>
+            <a:chOff x="1995377" y="2433816"/>
+            <a:chExt cx="28352" cy="2823398"/>
+          </a:xfrm>
+        </p:grpSpPr>
+        <p:cxnSp>
+          <p:nvCxnSpPr>
+            <p:cNvPr id="21" name="Straight Connector 20">
+              <a:extLst>
+                <a:ext uri="{FF2B5EF4-FFF2-40B4-BE49-F238E27FC236}">
+                  <a16:creationId xmlns:a16="http://schemas.microsoft.com/office/drawing/2014/main" id="{225EBAEB-DFF2-7EC6-9365-E184578365B9}"/>
+                </a:ext>
+              </a:extLst>
+            </p:cNvPr>
+            <p:cNvCxnSpPr>
+              <a:cxnSpLocks/>
+            </p:cNvCxnSpPr>
+            <p:nvPr/>
+          </p:nvCxnSpPr>
+          <p:spPr>
+            <a:xfrm>
+              <a:off x="2023729" y="2433817"/>
+              <a:ext cx="0" cy="2823397"/>
+            </a:xfrm>
+            <a:prstGeom prst="line">
+              <a:avLst/>
+            </a:prstGeom>
+            <a:ln>
+              <a:solidFill>
+                <a:schemeClr val="bg1"/>
+              </a:solidFill>
+            </a:ln>
+          </p:spPr>
+          <p:style>
+            <a:lnRef idx="1">
+              <a:schemeClr val="accent1"/>
+            </a:lnRef>
+            <a:fillRef idx="0">
+              <a:schemeClr val="accent1"/>
+            </a:fillRef>
+            <a:effectRef idx="0">
+              <a:schemeClr val="accent1"/>
+            </a:effectRef>
+            <a:fontRef idx="minor">
+              <a:schemeClr val="tx1"/>
+            </a:fontRef>
+          </p:style>
+        </p:cxnSp>
+        <p:cxnSp>
+          <p:nvCxnSpPr>
+            <p:cNvPr id="22" name="Straight Connector 21">
+              <a:extLst>
+                <a:ext uri="{FF2B5EF4-FFF2-40B4-BE49-F238E27FC236}">
+                  <a16:creationId xmlns:a16="http://schemas.microsoft.com/office/drawing/2014/main" id="{97F6128E-F049-0378-9524-EC111DF11D7A}"/>
+                </a:ext>
+              </a:extLst>
+            </p:cNvPr>
+            <p:cNvCxnSpPr>
+              <a:cxnSpLocks/>
+            </p:cNvCxnSpPr>
+            <p:nvPr/>
+          </p:nvCxnSpPr>
+          <p:spPr>
+            <a:xfrm>
+              <a:off x="1995377" y="2433816"/>
+              <a:ext cx="0" cy="2823397"/>
+            </a:xfrm>
+            <a:prstGeom prst="line">
+              <a:avLst/>
+            </a:prstGeom>
+            <a:ln>
+              <a:solidFill>
+                <a:schemeClr val="bg1"/>
+              </a:solidFill>
+            </a:ln>
+          </p:spPr>
+          <p:style>
+            <a:lnRef idx="1">
+              <a:schemeClr val="accent1"/>
+            </a:lnRef>
+            <a:fillRef idx="0">
+              <a:schemeClr val="accent1"/>
+            </a:fillRef>
+            <a:effectRef idx="0">
+              <a:schemeClr val="accent1"/>
+            </a:effectRef>
+            <a:fontRef idx="minor">
+              <a:schemeClr val="tx1"/>
+            </a:fontRef>
+          </p:style>
+        </p:cxnSp>
+      </p:grpSp>
     </p:spTree>
     <p:extLst>
       <p:ext uri="{BB962C8B-B14F-4D97-AF65-F5344CB8AC3E}">
-        <p14:creationId xmlns:p14="http://schemas.microsoft.com/office/powerpoint/2010/main" val="2699046969"/>
+        <p14:creationId xmlns:p14="http://schemas.microsoft.com/office/powerpoint/2010/main" val="2356661021"/>
       </p:ext>
     </p:extLst>
   </p:cSld>
@@ -11435,113 +11435,6 @@
           </p:style>
         </p:cxnSp>
       </p:grpSp>
-      <p:grpSp>
-        <p:nvGrpSpPr>
-          <p:cNvPr id="9" name="Group 8">
-            <a:extLst>
-              <a:ext uri="{FF2B5EF4-FFF2-40B4-BE49-F238E27FC236}">
-                <a16:creationId xmlns:a16="http://schemas.microsoft.com/office/drawing/2014/main" id="{09312D26-7853-9A0E-CB31-6ECD7943D0EC}"/>
-              </a:ext>
-            </a:extLst>
-          </p:cNvPr>
-          <p:cNvGrpSpPr/>
-          <p:nvPr/>
-        </p:nvGrpSpPr>
-        <p:grpSpPr>
-          <a:xfrm>
-            <a:off x="1294350" y="2433816"/>
-            <a:ext cx="28352" cy="2823398"/>
-            <a:chOff x="1995377" y="2433816"/>
-            <a:chExt cx="28352" cy="2823398"/>
-          </a:xfrm>
-        </p:grpSpPr>
-        <p:cxnSp>
-          <p:nvCxnSpPr>
-            <p:cNvPr id="34" name="Straight Connector 33">
-              <a:extLst>
-                <a:ext uri="{FF2B5EF4-FFF2-40B4-BE49-F238E27FC236}">
-                  <a16:creationId xmlns:a16="http://schemas.microsoft.com/office/drawing/2014/main" id="{0F06979E-2C51-267C-2CE6-859A9F9E29EE}"/>
-                </a:ext>
-              </a:extLst>
-            </p:cNvPr>
-            <p:cNvCxnSpPr>
-              <a:cxnSpLocks/>
-            </p:cNvCxnSpPr>
-            <p:nvPr/>
-          </p:nvCxnSpPr>
-          <p:spPr>
-            <a:xfrm>
-              <a:off x="2023729" y="2433817"/>
-              <a:ext cx="0" cy="2823397"/>
-            </a:xfrm>
-            <a:prstGeom prst="line">
-              <a:avLst/>
-            </a:prstGeom>
-            <a:ln>
-              <a:solidFill>
-                <a:schemeClr val="bg1"/>
-              </a:solidFill>
-            </a:ln>
-          </p:spPr>
-          <p:style>
-            <a:lnRef idx="1">
-              <a:schemeClr val="accent1"/>
-            </a:lnRef>
-            <a:fillRef idx="0">
-              <a:schemeClr val="accent1"/>
-            </a:fillRef>
-            <a:effectRef idx="0">
-              <a:schemeClr val="accent1"/>
-            </a:effectRef>
-            <a:fontRef idx="minor">
-              <a:schemeClr val="tx1"/>
-            </a:fontRef>
-          </p:style>
-        </p:cxnSp>
-        <p:cxnSp>
-          <p:nvCxnSpPr>
-            <p:cNvPr id="35" name="Straight Connector 34">
-              <a:extLst>
-                <a:ext uri="{FF2B5EF4-FFF2-40B4-BE49-F238E27FC236}">
-                  <a16:creationId xmlns:a16="http://schemas.microsoft.com/office/drawing/2014/main" id="{D45A0EE9-30BE-B1E5-31D4-DC66331177E4}"/>
-                </a:ext>
-              </a:extLst>
-            </p:cNvPr>
-            <p:cNvCxnSpPr>
-              <a:cxnSpLocks/>
-            </p:cNvCxnSpPr>
-            <p:nvPr/>
-          </p:nvCxnSpPr>
-          <p:spPr>
-            <a:xfrm>
-              <a:off x="1995377" y="2433816"/>
-              <a:ext cx="0" cy="2823397"/>
-            </a:xfrm>
-            <a:prstGeom prst="line">
-              <a:avLst/>
-            </a:prstGeom>
-            <a:ln>
-              <a:solidFill>
-                <a:schemeClr val="bg1"/>
-              </a:solidFill>
-            </a:ln>
-          </p:spPr>
-          <p:style>
-            <a:lnRef idx="1">
-              <a:schemeClr val="accent1"/>
-            </a:lnRef>
-            <a:fillRef idx="0">
-              <a:schemeClr val="accent1"/>
-            </a:fillRef>
-            <a:effectRef idx="0">
-              <a:schemeClr val="accent1"/>
-            </a:effectRef>
-            <a:fontRef idx="minor">
-              <a:schemeClr val="tx1"/>
-            </a:fontRef>
-          </p:style>
-        </p:cxnSp>
-      </p:grpSp>
       <p:pic>
         <p:nvPicPr>
           <p:cNvPr id="36" name="Picture 35" descr="A diagram of a mathematical process&#10;&#10;Description automatically generated with medium confidence">
@@ -11572,10 +11465,117 @@
           </a:prstGeom>
         </p:spPr>
       </p:pic>
+      <p:grpSp>
+        <p:nvGrpSpPr>
+          <p:cNvPr id="37" name="Group 36">
+            <a:extLst>
+              <a:ext uri="{FF2B5EF4-FFF2-40B4-BE49-F238E27FC236}">
+                <a16:creationId xmlns:a16="http://schemas.microsoft.com/office/drawing/2014/main" id="{CB172B67-4E80-3D02-D1B4-080D65F52DBC}"/>
+              </a:ext>
+            </a:extLst>
+          </p:cNvPr>
+          <p:cNvGrpSpPr/>
+          <p:nvPr/>
+        </p:nvGrpSpPr>
+        <p:grpSpPr>
+          <a:xfrm>
+            <a:off x="1277683" y="2433816"/>
+            <a:ext cx="28352" cy="2823398"/>
+            <a:chOff x="1995377" y="2433816"/>
+            <a:chExt cx="28352" cy="2823398"/>
+          </a:xfrm>
+        </p:grpSpPr>
+        <p:cxnSp>
+          <p:nvCxnSpPr>
+            <p:cNvPr id="38" name="Straight Connector 37">
+              <a:extLst>
+                <a:ext uri="{FF2B5EF4-FFF2-40B4-BE49-F238E27FC236}">
+                  <a16:creationId xmlns:a16="http://schemas.microsoft.com/office/drawing/2014/main" id="{AC317B52-F747-46A7-4E8E-88F622A82BD4}"/>
+                </a:ext>
+              </a:extLst>
+            </p:cNvPr>
+            <p:cNvCxnSpPr>
+              <a:cxnSpLocks/>
+            </p:cNvCxnSpPr>
+            <p:nvPr/>
+          </p:nvCxnSpPr>
+          <p:spPr>
+            <a:xfrm>
+              <a:off x="2023729" y="2433817"/>
+              <a:ext cx="0" cy="2823397"/>
+            </a:xfrm>
+            <a:prstGeom prst="line">
+              <a:avLst/>
+            </a:prstGeom>
+            <a:ln>
+              <a:solidFill>
+                <a:schemeClr val="bg1"/>
+              </a:solidFill>
+            </a:ln>
+          </p:spPr>
+          <p:style>
+            <a:lnRef idx="1">
+              <a:schemeClr val="accent1"/>
+            </a:lnRef>
+            <a:fillRef idx="0">
+              <a:schemeClr val="accent1"/>
+            </a:fillRef>
+            <a:effectRef idx="0">
+              <a:schemeClr val="accent1"/>
+            </a:effectRef>
+            <a:fontRef idx="minor">
+              <a:schemeClr val="tx1"/>
+            </a:fontRef>
+          </p:style>
+        </p:cxnSp>
+        <p:cxnSp>
+          <p:nvCxnSpPr>
+            <p:cNvPr id="39" name="Straight Connector 38">
+              <a:extLst>
+                <a:ext uri="{FF2B5EF4-FFF2-40B4-BE49-F238E27FC236}">
+                  <a16:creationId xmlns:a16="http://schemas.microsoft.com/office/drawing/2014/main" id="{9B57C1EF-E7D8-E01C-660E-F483CE9A1203}"/>
+                </a:ext>
+              </a:extLst>
+            </p:cNvPr>
+            <p:cNvCxnSpPr>
+              <a:cxnSpLocks/>
+            </p:cNvCxnSpPr>
+            <p:nvPr/>
+          </p:nvCxnSpPr>
+          <p:spPr>
+            <a:xfrm>
+              <a:off x="1995377" y="2433816"/>
+              <a:ext cx="0" cy="2823397"/>
+            </a:xfrm>
+            <a:prstGeom prst="line">
+              <a:avLst/>
+            </a:prstGeom>
+            <a:ln>
+              <a:solidFill>
+                <a:schemeClr val="bg1"/>
+              </a:solidFill>
+            </a:ln>
+          </p:spPr>
+          <p:style>
+            <a:lnRef idx="1">
+              <a:schemeClr val="accent1"/>
+            </a:lnRef>
+            <a:fillRef idx="0">
+              <a:schemeClr val="accent1"/>
+            </a:fillRef>
+            <a:effectRef idx="0">
+              <a:schemeClr val="accent1"/>
+            </a:effectRef>
+            <a:fontRef idx="minor">
+              <a:schemeClr val="tx1"/>
+            </a:fontRef>
+          </p:style>
+        </p:cxnSp>
+      </p:grpSp>
     </p:spTree>
     <p:extLst>
       <p:ext uri="{BB962C8B-B14F-4D97-AF65-F5344CB8AC3E}">
-        <p14:creationId xmlns:p14="http://schemas.microsoft.com/office/powerpoint/2010/main" val="4056895358"/>
+        <p14:creationId xmlns:p14="http://schemas.microsoft.com/office/powerpoint/2010/main" val="309564034"/>
       </p:ext>
     </p:extLst>
   </p:cSld>
@@ -13404,113 +13404,6 @@
           </p:style>
         </p:cxnSp>
       </p:grpSp>
-      <p:grpSp>
-        <p:nvGrpSpPr>
-          <p:cNvPr id="58" name="Group 57">
-            <a:extLst>
-              <a:ext uri="{FF2B5EF4-FFF2-40B4-BE49-F238E27FC236}">
-                <a16:creationId xmlns:a16="http://schemas.microsoft.com/office/drawing/2014/main" id="{0CA89F27-EE47-469F-2DF2-F55990B069EE}"/>
-              </a:ext>
-            </a:extLst>
-          </p:cNvPr>
-          <p:cNvGrpSpPr/>
-          <p:nvPr/>
-        </p:nvGrpSpPr>
-        <p:grpSpPr>
-          <a:xfrm>
-            <a:off x="1294350" y="2433816"/>
-            <a:ext cx="28352" cy="2823398"/>
-            <a:chOff x="1995377" y="2433816"/>
-            <a:chExt cx="28352" cy="2823398"/>
-          </a:xfrm>
-        </p:grpSpPr>
-        <p:cxnSp>
-          <p:nvCxnSpPr>
-            <p:cNvPr id="59" name="Straight Connector 58">
-              <a:extLst>
-                <a:ext uri="{FF2B5EF4-FFF2-40B4-BE49-F238E27FC236}">
-                  <a16:creationId xmlns:a16="http://schemas.microsoft.com/office/drawing/2014/main" id="{08EEAC40-032C-22E6-6ADF-1B0BBA429645}"/>
-                </a:ext>
-              </a:extLst>
-            </p:cNvPr>
-            <p:cNvCxnSpPr>
-              <a:cxnSpLocks/>
-            </p:cNvCxnSpPr>
-            <p:nvPr/>
-          </p:nvCxnSpPr>
-          <p:spPr>
-            <a:xfrm>
-              <a:off x="2023729" y="2433817"/>
-              <a:ext cx="0" cy="2823397"/>
-            </a:xfrm>
-            <a:prstGeom prst="line">
-              <a:avLst/>
-            </a:prstGeom>
-            <a:ln>
-              <a:solidFill>
-                <a:schemeClr val="bg1"/>
-              </a:solidFill>
-            </a:ln>
-          </p:spPr>
-          <p:style>
-            <a:lnRef idx="1">
-              <a:schemeClr val="accent1"/>
-            </a:lnRef>
-            <a:fillRef idx="0">
-              <a:schemeClr val="accent1"/>
-            </a:fillRef>
-            <a:effectRef idx="0">
-              <a:schemeClr val="accent1"/>
-            </a:effectRef>
-            <a:fontRef idx="minor">
-              <a:schemeClr val="tx1"/>
-            </a:fontRef>
-          </p:style>
-        </p:cxnSp>
-        <p:cxnSp>
-          <p:nvCxnSpPr>
-            <p:cNvPr id="60" name="Straight Connector 59">
-              <a:extLst>
-                <a:ext uri="{FF2B5EF4-FFF2-40B4-BE49-F238E27FC236}">
-                  <a16:creationId xmlns:a16="http://schemas.microsoft.com/office/drawing/2014/main" id="{52A79FA3-10A2-21BD-57EC-225D1BD61396}"/>
-                </a:ext>
-              </a:extLst>
-            </p:cNvPr>
-            <p:cNvCxnSpPr>
-              <a:cxnSpLocks/>
-            </p:cNvCxnSpPr>
-            <p:nvPr/>
-          </p:nvCxnSpPr>
-          <p:spPr>
-            <a:xfrm>
-              <a:off x="1995377" y="2433816"/>
-              <a:ext cx="0" cy="2823397"/>
-            </a:xfrm>
-            <a:prstGeom prst="line">
-              <a:avLst/>
-            </a:prstGeom>
-            <a:ln>
-              <a:solidFill>
-                <a:schemeClr val="bg1"/>
-              </a:solidFill>
-            </a:ln>
-          </p:spPr>
-          <p:style>
-            <a:lnRef idx="1">
-              <a:schemeClr val="accent1"/>
-            </a:lnRef>
-            <a:fillRef idx="0">
-              <a:schemeClr val="accent1"/>
-            </a:fillRef>
-            <a:effectRef idx="0">
-              <a:schemeClr val="accent1"/>
-            </a:effectRef>
-            <a:fontRef idx="minor">
-              <a:schemeClr val="tx1"/>
-            </a:fontRef>
-          </p:style>
-        </p:cxnSp>
-      </p:grpSp>
       <p:pic>
         <p:nvPicPr>
           <p:cNvPr id="36" name="Picture 35" descr="A blue line drawing of a car&#10;&#10;Description automatically generated">
@@ -13578,10 +13471,117 @@
           </a:prstGeom>
         </p:spPr>
       </p:pic>
+      <p:grpSp>
+        <p:nvGrpSpPr>
+          <p:cNvPr id="62" name="Group 61">
+            <a:extLst>
+              <a:ext uri="{FF2B5EF4-FFF2-40B4-BE49-F238E27FC236}">
+                <a16:creationId xmlns:a16="http://schemas.microsoft.com/office/drawing/2014/main" id="{07A8D0ED-483C-1ED6-1BF7-B777A493FBA4}"/>
+              </a:ext>
+            </a:extLst>
+          </p:cNvPr>
+          <p:cNvGrpSpPr/>
+          <p:nvPr/>
+        </p:nvGrpSpPr>
+        <p:grpSpPr>
+          <a:xfrm>
+            <a:off x="1277683" y="2433816"/>
+            <a:ext cx="28352" cy="2823398"/>
+            <a:chOff x="1995377" y="2433816"/>
+            <a:chExt cx="28352" cy="2823398"/>
+          </a:xfrm>
+        </p:grpSpPr>
+        <p:cxnSp>
+          <p:nvCxnSpPr>
+            <p:cNvPr id="63" name="Straight Connector 62">
+              <a:extLst>
+                <a:ext uri="{FF2B5EF4-FFF2-40B4-BE49-F238E27FC236}">
+                  <a16:creationId xmlns:a16="http://schemas.microsoft.com/office/drawing/2014/main" id="{593DCFDD-DDCE-A3C8-B355-2070584E6871}"/>
+                </a:ext>
+              </a:extLst>
+            </p:cNvPr>
+            <p:cNvCxnSpPr>
+              <a:cxnSpLocks/>
+            </p:cNvCxnSpPr>
+            <p:nvPr/>
+          </p:nvCxnSpPr>
+          <p:spPr>
+            <a:xfrm>
+              <a:off x="2023729" y="2433817"/>
+              <a:ext cx="0" cy="2823397"/>
+            </a:xfrm>
+            <a:prstGeom prst="line">
+              <a:avLst/>
+            </a:prstGeom>
+            <a:ln>
+              <a:solidFill>
+                <a:schemeClr val="bg1"/>
+              </a:solidFill>
+            </a:ln>
+          </p:spPr>
+          <p:style>
+            <a:lnRef idx="1">
+              <a:schemeClr val="accent1"/>
+            </a:lnRef>
+            <a:fillRef idx="0">
+              <a:schemeClr val="accent1"/>
+            </a:fillRef>
+            <a:effectRef idx="0">
+              <a:schemeClr val="accent1"/>
+            </a:effectRef>
+            <a:fontRef idx="minor">
+              <a:schemeClr val="tx1"/>
+            </a:fontRef>
+          </p:style>
+        </p:cxnSp>
+        <p:cxnSp>
+          <p:nvCxnSpPr>
+            <p:cNvPr id="64" name="Straight Connector 63">
+              <a:extLst>
+                <a:ext uri="{FF2B5EF4-FFF2-40B4-BE49-F238E27FC236}">
+                  <a16:creationId xmlns:a16="http://schemas.microsoft.com/office/drawing/2014/main" id="{25E7EA37-E5E7-699C-61D5-9450611F7DEB}"/>
+                </a:ext>
+              </a:extLst>
+            </p:cNvPr>
+            <p:cNvCxnSpPr>
+              <a:cxnSpLocks/>
+            </p:cNvCxnSpPr>
+            <p:nvPr/>
+          </p:nvCxnSpPr>
+          <p:spPr>
+            <a:xfrm>
+              <a:off x="1995377" y="2433816"/>
+              <a:ext cx="0" cy="2823397"/>
+            </a:xfrm>
+            <a:prstGeom prst="line">
+              <a:avLst/>
+            </a:prstGeom>
+            <a:ln>
+              <a:solidFill>
+                <a:schemeClr val="bg1"/>
+              </a:solidFill>
+            </a:ln>
+          </p:spPr>
+          <p:style>
+            <a:lnRef idx="1">
+              <a:schemeClr val="accent1"/>
+            </a:lnRef>
+            <a:fillRef idx="0">
+              <a:schemeClr val="accent1"/>
+            </a:fillRef>
+            <a:effectRef idx="0">
+              <a:schemeClr val="accent1"/>
+            </a:effectRef>
+            <a:fontRef idx="minor">
+              <a:schemeClr val="tx1"/>
+            </a:fontRef>
+          </p:style>
+        </p:cxnSp>
+      </p:grpSp>
     </p:spTree>
     <p:extLst>
       <p:ext uri="{BB962C8B-B14F-4D97-AF65-F5344CB8AC3E}">
-        <p14:creationId xmlns:p14="http://schemas.microsoft.com/office/powerpoint/2010/main" val="3224157582"/>
+        <p14:creationId xmlns:p14="http://schemas.microsoft.com/office/powerpoint/2010/main" val="1484113448"/>
       </p:ext>
     </p:extLst>
   </p:cSld>
@@ -24157,13 +24157,13 @@
   <p:clrMapOvr>
     <a:masterClrMapping/>
   </p:clrMapOvr>
-  <mc:AlternateContent xmlns:mc="http://schemas.openxmlformats.org/markup-compatibility/2006">
-    <mc:Choice xmlns:p159="http://schemas.microsoft.com/office/powerpoint/2015/09/main" Requires="p159">
+  <mc:AlternateContent xmlns:mc="http://schemas.openxmlformats.org/markup-compatibility/2006" xmlns:p159="http://schemas.microsoft.com/office/powerpoint/2015/09/main">
+    <mc:Choice Requires="p159">
       <p:transition xmlns:p14="http://schemas.microsoft.com/office/powerpoint/2010/main" spd="slow" p14:dur="2000">
         <p159:morph option="byObject"/>
       </p:transition>
     </mc:Choice>
-    <mc:Fallback>
+    <mc:Fallback xmlns="">
       <p:transition spd="slow">
         <p:fade/>
       </p:transition>
@@ -25021,13 +25021,13 @@
   <p:clrMapOvr>
     <a:masterClrMapping/>
   </p:clrMapOvr>
-  <mc:AlternateContent xmlns:mc="http://schemas.openxmlformats.org/markup-compatibility/2006">
-    <mc:Choice xmlns:p159="http://schemas.microsoft.com/office/powerpoint/2015/09/main" Requires="p159">
+  <mc:AlternateContent xmlns:mc="http://schemas.openxmlformats.org/markup-compatibility/2006" xmlns:p159="http://schemas.microsoft.com/office/powerpoint/2015/09/main">
+    <mc:Choice Requires="p159">
       <p:transition xmlns:p14="http://schemas.microsoft.com/office/powerpoint/2010/main" spd="slow" p14:dur="2000">
         <p159:morph option="byObject"/>
       </p:transition>
     </mc:Choice>
-    <mc:Fallback>
+    <mc:Fallback xmlns="">
       <p:transition spd="slow">
         <p:fade/>
       </p:transition>
@@ -26051,13 +26051,13 @@
   <p:clrMapOvr>
     <a:masterClrMapping/>
   </p:clrMapOvr>
-  <mc:AlternateContent xmlns:mc="http://schemas.openxmlformats.org/markup-compatibility/2006">
-    <mc:Choice xmlns:p159="http://schemas.microsoft.com/office/powerpoint/2015/09/main" Requires="p159">
+  <mc:AlternateContent xmlns:mc="http://schemas.openxmlformats.org/markup-compatibility/2006" xmlns:p159="http://schemas.microsoft.com/office/powerpoint/2015/09/main">
+    <mc:Choice Requires="p159">
       <p:transition xmlns:p14="http://schemas.microsoft.com/office/powerpoint/2010/main" spd="slow" p14:dur="2000">
         <p159:morph option="byObject"/>
       </p:transition>
     </mc:Choice>
-    <mc:Fallback>
+    <mc:Fallback xmlns="">
       <p:transition spd="slow">
         <p:fade/>
       </p:transition>
@@ -26526,113 +26526,6 @@
           </p:style>
         </p:cxnSp>
       </p:grpSp>
-      <p:grpSp>
-        <p:nvGrpSpPr>
-          <p:cNvPr id="14" name="Group 13">
-            <a:extLst>
-              <a:ext uri="{FF2B5EF4-FFF2-40B4-BE49-F238E27FC236}">
-                <a16:creationId xmlns:a16="http://schemas.microsoft.com/office/drawing/2014/main" id="{46FE5E2F-BF91-86C0-8EBC-5071DDF726F8}"/>
-              </a:ext>
-            </a:extLst>
-          </p:cNvPr>
-          <p:cNvGrpSpPr/>
-          <p:nvPr/>
-        </p:nvGrpSpPr>
-        <p:grpSpPr>
-          <a:xfrm>
-            <a:off x="1294350" y="2433816"/>
-            <a:ext cx="28352" cy="2823398"/>
-            <a:chOff x="1995377" y="2433816"/>
-            <a:chExt cx="28352" cy="2823398"/>
-          </a:xfrm>
-        </p:grpSpPr>
-        <p:cxnSp>
-          <p:nvCxnSpPr>
-            <p:cNvPr id="8" name="Straight Connector 7">
-              <a:extLst>
-                <a:ext uri="{FF2B5EF4-FFF2-40B4-BE49-F238E27FC236}">
-                  <a16:creationId xmlns:a16="http://schemas.microsoft.com/office/drawing/2014/main" id="{52F2D38B-4987-91B5-05AD-C88420F373EA}"/>
-                </a:ext>
-              </a:extLst>
-            </p:cNvPr>
-            <p:cNvCxnSpPr>
-              <a:cxnSpLocks/>
-            </p:cNvCxnSpPr>
-            <p:nvPr/>
-          </p:nvCxnSpPr>
-          <p:spPr>
-            <a:xfrm>
-              <a:off x="2023729" y="2433817"/>
-              <a:ext cx="0" cy="2823397"/>
-            </a:xfrm>
-            <a:prstGeom prst="line">
-              <a:avLst/>
-            </a:prstGeom>
-            <a:ln>
-              <a:solidFill>
-                <a:schemeClr val="bg1"/>
-              </a:solidFill>
-            </a:ln>
-          </p:spPr>
-          <p:style>
-            <a:lnRef idx="1">
-              <a:schemeClr val="accent1"/>
-            </a:lnRef>
-            <a:fillRef idx="0">
-              <a:schemeClr val="accent1"/>
-            </a:fillRef>
-            <a:effectRef idx="0">
-              <a:schemeClr val="accent1"/>
-            </a:effectRef>
-            <a:fontRef idx="minor">
-              <a:schemeClr val="tx1"/>
-            </a:fontRef>
-          </p:style>
-        </p:cxnSp>
-        <p:cxnSp>
-          <p:nvCxnSpPr>
-            <p:cNvPr id="9" name="Straight Connector 8">
-              <a:extLst>
-                <a:ext uri="{FF2B5EF4-FFF2-40B4-BE49-F238E27FC236}">
-                  <a16:creationId xmlns:a16="http://schemas.microsoft.com/office/drawing/2014/main" id="{90CA55EA-BD9F-E8BA-D5AA-5D0A82E397B7}"/>
-                </a:ext>
-              </a:extLst>
-            </p:cNvPr>
-            <p:cNvCxnSpPr>
-              <a:cxnSpLocks/>
-            </p:cNvCxnSpPr>
-            <p:nvPr/>
-          </p:nvCxnSpPr>
-          <p:spPr>
-            <a:xfrm>
-              <a:off x="1995377" y="2433816"/>
-              <a:ext cx="0" cy="2823397"/>
-            </a:xfrm>
-            <a:prstGeom prst="line">
-              <a:avLst/>
-            </a:prstGeom>
-            <a:ln>
-              <a:solidFill>
-                <a:schemeClr val="bg1"/>
-              </a:solidFill>
-            </a:ln>
-          </p:spPr>
-          <p:style>
-            <a:lnRef idx="1">
-              <a:schemeClr val="accent1"/>
-            </a:lnRef>
-            <a:fillRef idx="0">
-              <a:schemeClr val="accent1"/>
-            </a:fillRef>
-            <a:effectRef idx="0">
-              <a:schemeClr val="accent1"/>
-            </a:effectRef>
-            <a:fontRef idx="minor">
-              <a:schemeClr val="tx1"/>
-            </a:fontRef>
-          </p:style>
-        </p:cxnSp>
-      </p:grpSp>
       <p:pic>
         <p:nvPicPr>
           <p:cNvPr id="13" name="Picture 12" descr="A blue line drawing of a car&#10;&#10;Description automatically generated">
@@ -27560,6 +27453,113 @@
               </a:solidFill>
               <a:prstDash val="lgDash"/>
               <a:tailEnd type="triangle"/>
+            </a:ln>
+          </p:spPr>
+          <p:style>
+            <a:lnRef idx="1">
+              <a:schemeClr val="accent1"/>
+            </a:lnRef>
+            <a:fillRef idx="0">
+              <a:schemeClr val="accent1"/>
+            </a:fillRef>
+            <a:effectRef idx="0">
+              <a:schemeClr val="accent1"/>
+            </a:effectRef>
+            <a:fontRef idx="minor">
+              <a:schemeClr val="tx1"/>
+            </a:fontRef>
+          </p:style>
+        </p:cxnSp>
+      </p:grpSp>
+      <p:grpSp>
+        <p:nvGrpSpPr>
+          <p:cNvPr id="18" name="Group 17">
+            <a:extLst>
+              <a:ext uri="{FF2B5EF4-FFF2-40B4-BE49-F238E27FC236}">
+                <a16:creationId xmlns:a16="http://schemas.microsoft.com/office/drawing/2014/main" id="{47898221-4D19-E365-5852-541109D1437C}"/>
+              </a:ext>
+            </a:extLst>
+          </p:cNvPr>
+          <p:cNvGrpSpPr/>
+          <p:nvPr/>
+        </p:nvGrpSpPr>
+        <p:grpSpPr>
+          <a:xfrm>
+            <a:off x="1277683" y="2433816"/>
+            <a:ext cx="28352" cy="2823398"/>
+            <a:chOff x="1995377" y="2433816"/>
+            <a:chExt cx="28352" cy="2823398"/>
+          </a:xfrm>
+        </p:grpSpPr>
+        <p:cxnSp>
+          <p:nvCxnSpPr>
+            <p:cNvPr id="19" name="Straight Connector 18">
+              <a:extLst>
+                <a:ext uri="{FF2B5EF4-FFF2-40B4-BE49-F238E27FC236}">
+                  <a16:creationId xmlns:a16="http://schemas.microsoft.com/office/drawing/2014/main" id="{F892311D-E959-5A9E-711F-D33471EA1D83}"/>
+                </a:ext>
+              </a:extLst>
+            </p:cNvPr>
+            <p:cNvCxnSpPr>
+              <a:cxnSpLocks/>
+            </p:cNvCxnSpPr>
+            <p:nvPr/>
+          </p:nvCxnSpPr>
+          <p:spPr>
+            <a:xfrm>
+              <a:off x="2023729" y="2433817"/>
+              <a:ext cx="0" cy="2823397"/>
+            </a:xfrm>
+            <a:prstGeom prst="line">
+              <a:avLst/>
+            </a:prstGeom>
+            <a:ln>
+              <a:solidFill>
+                <a:schemeClr val="bg1"/>
+              </a:solidFill>
+            </a:ln>
+          </p:spPr>
+          <p:style>
+            <a:lnRef idx="1">
+              <a:schemeClr val="accent1"/>
+            </a:lnRef>
+            <a:fillRef idx="0">
+              <a:schemeClr val="accent1"/>
+            </a:fillRef>
+            <a:effectRef idx="0">
+              <a:schemeClr val="accent1"/>
+            </a:effectRef>
+            <a:fontRef idx="minor">
+              <a:schemeClr val="tx1"/>
+            </a:fontRef>
+          </p:style>
+        </p:cxnSp>
+        <p:cxnSp>
+          <p:nvCxnSpPr>
+            <p:cNvPr id="20" name="Straight Connector 19">
+              <a:extLst>
+                <a:ext uri="{FF2B5EF4-FFF2-40B4-BE49-F238E27FC236}">
+                  <a16:creationId xmlns:a16="http://schemas.microsoft.com/office/drawing/2014/main" id="{1399B9B5-0C73-0D1B-7A50-C8B75CEEE2C1}"/>
+                </a:ext>
+              </a:extLst>
+            </p:cNvPr>
+            <p:cNvCxnSpPr>
+              <a:cxnSpLocks/>
+            </p:cNvCxnSpPr>
+            <p:nvPr/>
+          </p:nvCxnSpPr>
+          <p:spPr>
+            <a:xfrm>
+              <a:off x="1995377" y="2433816"/>
+              <a:ext cx="0" cy="2823397"/>
+            </a:xfrm>
+            <a:prstGeom prst="line">
+              <a:avLst/>
+            </a:prstGeom>
+            <a:ln>
+              <a:solidFill>
+                <a:schemeClr val="bg1"/>
+              </a:solidFill>
             </a:ln>
           </p:spPr>
           <p:style>
@@ -28250,7 +28250,7 @@
         </p:nvGrpSpPr>
         <p:grpSpPr>
           <a:xfrm>
-            <a:off x="1294350" y="2433816"/>
+            <a:off x="1277683" y="2433816"/>
             <a:ext cx="28352" cy="2823398"/>
             <a:chOff x="1995377" y="2433816"/>
             <a:chExt cx="28352" cy="2823398"/>
@@ -28382,7 +28382,7 @@
     </p:spTree>
     <p:extLst>
       <p:ext uri="{BB962C8B-B14F-4D97-AF65-F5344CB8AC3E}">
-        <p14:creationId xmlns:p14="http://schemas.microsoft.com/office/powerpoint/2010/main" val="525716050"/>
+        <p14:creationId xmlns:p14="http://schemas.microsoft.com/office/powerpoint/2010/main" val="3005282111"/>
       </p:ext>
     </p:extLst>
   </p:cSld>
@@ -29169,10 +29169,10 @@
       </p:grpSp>
       <p:grpSp>
         <p:nvGrpSpPr>
-          <p:cNvPr id="21" name="Group 20">
+          <p:cNvPr id="27" name="Group 26">
             <a:extLst>
               <a:ext uri="{FF2B5EF4-FFF2-40B4-BE49-F238E27FC236}">
-                <a16:creationId xmlns:a16="http://schemas.microsoft.com/office/drawing/2014/main" id="{14FA9CB4-E917-A033-33FC-534D07D69570}"/>
+                <a16:creationId xmlns:a16="http://schemas.microsoft.com/office/drawing/2014/main" id="{CFA3DDD8-5924-A7B2-4A0E-F93D882D2493}"/>
               </a:ext>
             </a:extLst>
           </p:cNvPr>
@@ -29181,7 +29181,7 @@
         </p:nvGrpSpPr>
         <p:grpSpPr>
           <a:xfrm>
-            <a:off x="1294350" y="2433816"/>
+            <a:off x="1277683" y="2433816"/>
             <a:ext cx="28352" cy="2823398"/>
             <a:chOff x="1995377" y="2433816"/>
             <a:chExt cx="28352" cy="2823398"/>
@@ -29189,10 +29189,10 @@
         </p:grpSpPr>
         <p:cxnSp>
           <p:nvCxnSpPr>
-            <p:cNvPr id="22" name="Straight Connector 21">
+            <p:cNvPr id="28" name="Straight Connector 27">
               <a:extLst>
                 <a:ext uri="{FF2B5EF4-FFF2-40B4-BE49-F238E27FC236}">
-                  <a16:creationId xmlns:a16="http://schemas.microsoft.com/office/drawing/2014/main" id="{3B87CAA0-7EB1-10B3-673B-E2A5410F42B8}"/>
+                  <a16:creationId xmlns:a16="http://schemas.microsoft.com/office/drawing/2014/main" id="{4202F0C3-9A53-99AC-93FD-469F5827B6AD}"/>
                 </a:ext>
               </a:extLst>
             </p:cNvPr>
@@ -29232,10 +29232,10 @@
         </p:cxnSp>
         <p:cxnSp>
           <p:nvCxnSpPr>
-            <p:cNvPr id="23" name="Straight Connector 22">
+            <p:cNvPr id="29" name="Straight Connector 28">
               <a:extLst>
                 <a:ext uri="{FF2B5EF4-FFF2-40B4-BE49-F238E27FC236}">
-                  <a16:creationId xmlns:a16="http://schemas.microsoft.com/office/drawing/2014/main" id="{D12588AC-CFE6-D800-80B9-E6F100180919}"/>
+                  <a16:creationId xmlns:a16="http://schemas.microsoft.com/office/drawing/2014/main" id="{431C58D4-870E-6B01-BFB3-406909C977C6}"/>
                 </a:ext>
               </a:extLst>
             </p:cNvPr>
@@ -29277,7 +29277,7 @@
     </p:spTree>
     <p:extLst>
       <p:ext uri="{BB962C8B-B14F-4D97-AF65-F5344CB8AC3E}">
-        <p14:creationId xmlns:p14="http://schemas.microsoft.com/office/powerpoint/2010/main" val="3509697532"/>
+        <p14:creationId xmlns:p14="http://schemas.microsoft.com/office/powerpoint/2010/main" val="1880393090"/>
       </p:ext>
     </p:extLst>
   </p:cSld>

</xml_diff>